<commit_message>
Updated kithen analogy in PowerPoint and added C# code and test
</commit_message>
<xml_diff>
--- a/Async and await presentation.pptx
+++ b/Async and await presentation.pptx
@@ -4522,14 +4522,14 @@
           <p:nvPr>
             <p:extLst>
               <p:ext uri="{D42A27DB-BD31-4B8C-83A1-F6EECF244321}">
-                <p14:modId xmlns:p14="http://schemas.microsoft.com/office/powerpoint/2010/main" val="3928103089"/>
+                <p14:modId xmlns:p14="http://schemas.microsoft.com/office/powerpoint/2010/main" val="4114786290"/>
               </p:ext>
             </p:extLst>
           </p:nvPr>
         </p:nvGraphicFramePr>
         <p:xfrm>
           <a:off x="198782" y="963519"/>
-          <a:ext cx="11570971" cy="4206240"/>
+          <a:ext cx="11570971" cy="4011153"/>
         </p:xfrm>
         <a:graphic>
           <a:graphicData uri="http://schemas.openxmlformats.org/drawingml/2006/table">
@@ -4578,18 +4578,13 @@
                         <a:buNone/>
                       </a:pPr>
                       <a:r>
-                        <a:rPr lang="en-GB" sz="1800" b="1" u="sng" dirty="0">
+                        <a:rPr lang="en-GB" sz="1400" b="1" u="sng" dirty="0">
                           <a:solidFill>
                             <a:schemeClr val="tx1"/>
                           </a:solidFill>
                         </a:rPr>
                         <a:t>Thread 1 </a:t>
                       </a:r>
-                      <a:endParaRPr lang="en-GB" sz="1600" b="1" u="sng" dirty="0">
-                        <a:solidFill>
-                          <a:schemeClr val="tx1"/>
-                        </a:solidFill>
-                      </a:endParaRPr>
                     </a:p>
                     <a:p>
                       <a:pPr marL="342900" indent="-342900">
@@ -4597,7 +4592,7 @@
                         <a:buChar char="•"/>
                       </a:pPr>
                       <a:r>
-                        <a:rPr lang="en-GB" sz="1800" b="1" dirty="0">
+                        <a:rPr lang="en-GB" sz="1400" b="1" dirty="0">
                           <a:solidFill>
                             <a:schemeClr val="accent2"/>
                           </a:solidFill>
@@ -4605,7 +4600,7 @@
                         <a:t>Heat a saucepan of water until it starts boiling   </a:t>
                       </a:r>
                       <a:r>
-                        <a:rPr lang="en-GB" sz="1800" b="0" dirty="0">
+                        <a:rPr lang="en-GB" sz="1400" b="0" dirty="0">
                           <a:solidFill>
                             <a:schemeClr val="tx1"/>
                           </a:solidFill>
@@ -4632,7 +4627,7 @@
                         <a:defRPr/>
                       </a:pPr>
                       <a:r>
-                        <a:rPr lang="en-GB" sz="1800" b="1" dirty="0">
+                        <a:rPr lang="en-GB" sz="1400" b="1" dirty="0">
                           <a:solidFill>
                             <a:srgbClr val="00B050"/>
                           </a:solidFill>
@@ -4640,7 +4635,7 @@
                         <a:t>Cook fresh pasta</a:t>
                       </a:r>
                       <a:r>
-                        <a:rPr lang="en-GB" sz="1800" b="0" dirty="0">
+                        <a:rPr lang="en-GB" sz="1400" b="0" dirty="0">
                           <a:solidFill>
                             <a:schemeClr val="tx1"/>
                           </a:solidFill>
@@ -4667,7 +4662,7 @@
                         <a:defRPr/>
                       </a:pPr>
                       <a:r>
-                        <a:rPr lang="en-GB" sz="1800" b="1" dirty="0">
+                        <a:rPr lang="en-GB" sz="1400" b="1" dirty="0">
                           <a:solidFill>
                             <a:srgbClr val="00B050"/>
                           </a:solidFill>
@@ -4675,7 +4670,7 @@
                         <a:t>Drain the water from the pasta </a:t>
                       </a:r>
                       <a:r>
-                        <a:rPr lang="en-GB" sz="1800" b="0" dirty="0">
+                        <a:rPr lang="en-GB" sz="1400" b="0" dirty="0">
                           <a:solidFill>
                             <a:schemeClr val="tx1"/>
                           </a:solidFill>
@@ -4702,7 +4697,7 @@
                         <a:defRPr/>
                       </a:pPr>
                       <a:r>
-                        <a:rPr lang="en-GB" sz="1800" b="1" dirty="0">
+                        <a:rPr lang="en-GB" sz="1400" b="1" dirty="0">
                           <a:solidFill>
                             <a:srgbClr val="00B050"/>
                           </a:solidFill>
@@ -4710,7 +4705,7 @@
                         <a:t>Place pasta in a dish and add sauce </a:t>
                       </a:r>
                       <a:r>
-                        <a:rPr lang="en-GB" sz="1800" b="0" dirty="0">
+                        <a:rPr lang="en-GB" sz="1400" b="0" dirty="0">
                           <a:solidFill>
                             <a:schemeClr val="tx1"/>
                           </a:solidFill>
@@ -4737,7 +4732,7 @@
                         <a:defRPr/>
                       </a:pPr>
                       <a:r>
-                        <a:rPr lang="en-GB" sz="1800" b="1" dirty="0">
+                        <a:rPr lang="en-GB" sz="1400" b="1" dirty="0">
                           <a:solidFill>
                             <a:schemeClr val="tx1"/>
                           </a:solidFill>
@@ -4745,7 +4740,7 @@
                         <a:t>Wait for thread 4 to finished grating cheese </a:t>
                       </a:r>
                       <a:r>
-                        <a:rPr lang="en-GB" sz="1800" b="0" dirty="0">
+                        <a:rPr lang="en-GB" sz="1400" b="0" dirty="0">
                           <a:solidFill>
                             <a:schemeClr val="tx1"/>
                           </a:solidFill>
@@ -4772,7 +4767,7 @@
                         <a:defRPr/>
                       </a:pPr>
                       <a:r>
-                        <a:rPr lang="en-GB" sz="1800" b="1" dirty="0">
+                        <a:rPr lang="en-GB" sz="1400" b="1" dirty="0">
                           <a:solidFill>
                             <a:srgbClr val="00B050"/>
                           </a:solidFill>
@@ -4780,7 +4775,7 @@
                         <a:t>Add cheese to pasta</a:t>
                       </a:r>
                       <a:r>
-                        <a:rPr lang="en-GB" sz="1800" b="0" dirty="0">
+                        <a:rPr lang="en-GB" sz="1400" b="0" dirty="0">
                           <a:solidFill>
                             <a:schemeClr val="tx1"/>
                           </a:solidFill>
@@ -4807,7 +4802,7 @@
                         <a:defRPr/>
                       </a:pPr>
                       <a:r>
-                        <a:rPr lang="en-GB" sz="1800" b="1" dirty="0">
+                        <a:rPr lang="en-GB" sz="1400" b="1" dirty="0">
                           <a:solidFill>
                             <a:schemeClr val="tx1"/>
                           </a:solidFill>
@@ -4815,7 +4810,7 @@
                         <a:t>Wait for thread 2 to finished pre-heating oven </a:t>
                       </a:r>
                       <a:r>
-                        <a:rPr lang="en-GB" sz="1800" b="0" dirty="0">
+                        <a:rPr lang="en-GB" sz="1400" b="0" dirty="0">
                           <a:solidFill>
                             <a:schemeClr val="tx1"/>
                           </a:solidFill>
@@ -4842,7 +4837,7 @@
                         <a:defRPr/>
                       </a:pPr>
                       <a:r>
-                        <a:rPr lang="en-GB" sz="1800" b="1" dirty="0">
+                        <a:rPr lang="en-GB" sz="1400" b="1" dirty="0">
                           <a:solidFill>
                             <a:schemeClr val="accent2"/>
                           </a:solidFill>
@@ -4850,7 +4845,7 @@
                         <a:t>Place dish in oven and bake </a:t>
                       </a:r>
                       <a:r>
-                        <a:rPr lang="en-GB" sz="1800" b="0" dirty="0">
+                        <a:rPr lang="en-GB" sz="1400" b="0" dirty="0">
                           <a:solidFill>
                             <a:schemeClr val="tx1"/>
                           </a:solidFill>
@@ -4859,11 +4854,86 @@
                       </a:r>
                     </a:p>
                     <a:p>
+                      <a:pPr marL="342900" marR="0" lvl="0" indent="-342900" algn="l" defTabSz="914400" rtl="0" eaLnBrk="1" fontAlgn="auto" latinLnBrk="0" hangingPunct="1">
+                        <a:lnSpc>
+                          <a:spcPct val="100000"/>
+                        </a:lnSpc>
+                        <a:spcBef>
+                          <a:spcPts val="0"/>
+                        </a:spcBef>
+                        <a:spcAft>
+                          <a:spcPts val="0"/>
+                        </a:spcAft>
+                        <a:buClrTx/>
+                        <a:buSzTx/>
+                        <a:buFont typeface="Arial" panose="020B0604020202020204" pitchFamily="34" charset="0"/>
+                        <a:buChar char="•"/>
+                        <a:tabLst/>
+                        <a:defRPr/>
+                      </a:pPr>
+                      <a:r>
+                        <a:rPr lang="en-GB" sz="1400" b="1" dirty="0">
+                          <a:solidFill>
+                            <a:schemeClr val="tx1"/>
+                          </a:solidFill>
+                        </a:rPr>
+                        <a:t>Wait for thread 3 </a:t>
+                      </a:r>
+                      <a:r>
+                        <a:rPr lang="en-GB" sz="1400" b="1">
+                          <a:solidFill>
+                            <a:schemeClr val="tx1"/>
+                          </a:solidFill>
+                        </a:rPr>
+                        <a:t>to finish </a:t>
+                      </a:r>
+                      <a:r>
+                        <a:rPr lang="en-GB" sz="1400" b="1" dirty="0">
+                          <a:solidFill>
+                            <a:schemeClr val="tx1"/>
+                          </a:solidFill>
+                        </a:rPr>
+                        <a:t>dessert </a:t>
+                      </a:r>
+                      <a:r>
+                        <a:rPr lang="en-GB" sz="1400" b="0" dirty="0">
+                          <a:solidFill>
+                            <a:schemeClr val="tx1"/>
+                          </a:solidFill>
+                        </a:rPr>
+                        <a:t>(0 mins)</a:t>
+                      </a:r>
+                    </a:p>
+                    <a:p>
+                      <a:pPr marL="342900" marR="0" lvl="0" indent="-342900" algn="l" defTabSz="914400" rtl="0" eaLnBrk="1" fontAlgn="auto" latinLnBrk="0" hangingPunct="1">
+                        <a:lnSpc>
+                          <a:spcPct val="100000"/>
+                        </a:lnSpc>
+                        <a:spcBef>
+                          <a:spcPts val="0"/>
+                        </a:spcBef>
+                        <a:spcAft>
+                          <a:spcPts val="0"/>
+                        </a:spcAft>
+                        <a:buClrTx/>
+                        <a:buSzTx/>
+                        <a:buFont typeface="Arial" panose="020B0604020202020204" pitchFamily="34" charset="0"/>
+                        <a:buChar char="•"/>
+                        <a:tabLst/>
+                        <a:defRPr/>
+                      </a:pPr>
+                      <a:endParaRPr lang="en-GB" sz="1400" b="0" dirty="0">
+                        <a:solidFill>
+                          <a:schemeClr val="tx1"/>
+                        </a:solidFill>
+                      </a:endParaRPr>
+                    </a:p>
+                    <a:p>
                       <a:pPr marL="0" indent="0">
                         <a:buFont typeface="Arial" panose="020B0604020202020204" pitchFamily="34" charset="0"/>
                         <a:buNone/>
                       </a:pPr>
-                      <a:endParaRPr lang="en-GB" sz="1800" b="0" dirty="0">
+                      <a:endParaRPr lang="en-GB" sz="1400" b="0" dirty="0">
                         <a:solidFill>
                           <a:schemeClr val="tx1"/>
                         </a:solidFill>
@@ -4875,7 +4945,7 @@
                         <a:buNone/>
                       </a:pPr>
                       <a:r>
-                        <a:rPr lang="en-GB" sz="1800" b="0" dirty="0">
+                        <a:rPr lang="en-GB" sz="1400" b="0" dirty="0">
                           <a:solidFill>
                             <a:schemeClr val="tx1"/>
                           </a:solidFill>
@@ -4883,7 +4953,7 @@
                         <a:t>Time taken for thread 1: </a:t>
                       </a:r>
                       <a:r>
-                        <a:rPr lang="en-GB" sz="1800" b="1" dirty="0">
+                        <a:rPr lang="en-GB" sz="1400" b="1" dirty="0">
                           <a:solidFill>
                             <a:schemeClr val="tx1"/>
                           </a:solidFill>
@@ -4924,7 +4994,7 @@
                         <a:defRPr/>
                       </a:pPr>
                       <a:r>
-                        <a:rPr lang="en-GB" sz="1800" b="1" i="0" u="sng" dirty="0">
+                        <a:rPr lang="en-GB" sz="1400" b="1" i="0" u="sng" dirty="0">
                           <a:solidFill>
                             <a:schemeClr val="tx1"/>
                           </a:solidFill>
@@ -4951,7 +5021,7 @@
                         <a:defRPr/>
                       </a:pPr>
                       <a:r>
-                        <a:rPr lang="en-GB" sz="1800" b="1" dirty="0">
+                        <a:rPr lang="en-GB" sz="1400" b="1" dirty="0">
                           <a:solidFill>
                             <a:schemeClr val="accent2"/>
                           </a:solidFill>
@@ -4959,14 +5029,14 @@
                         <a:t>Pre-heat oven to 200°C </a:t>
                       </a:r>
                       <a:r>
-                        <a:rPr lang="en-GB" sz="1800" b="0" dirty="0">
+                        <a:rPr lang="en-GB" sz="1400" b="0" dirty="0">
                           <a:solidFill>
                             <a:schemeClr val="tx1"/>
                           </a:solidFill>
                         </a:rPr>
                         <a:t>(15 mins) </a:t>
                       </a:r>
-                      <a:endParaRPr lang="en-GB" sz="1800" b="0" dirty="0">
+                      <a:endParaRPr lang="en-GB" sz="1400" b="0" dirty="0">
                         <a:solidFill>
                           <a:schemeClr val="lt1"/>
                         </a:solidFill>
@@ -4990,7 +5060,7 @@
                         <a:tabLst/>
                         <a:defRPr/>
                       </a:pPr>
-                      <a:endParaRPr lang="en-GB" sz="1800" b="0" dirty="0">
+                      <a:endParaRPr lang="en-GB" sz="1400" b="0" dirty="0">
                         <a:solidFill>
                           <a:schemeClr val="lt1"/>
                         </a:solidFill>
@@ -5014,7 +5084,7 @@
                         <a:tabLst/>
                         <a:defRPr/>
                       </a:pPr>
-                      <a:endParaRPr lang="en-GB" sz="1800" b="0" dirty="0">
+                      <a:endParaRPr lang="en-GB" sz="1400" b="0" dirty="0">
                         <a:solidFill>
                           <a:schemeClr val="lt1"/>
                         </a:solidFill>
@@ -5038,7 +5108,7 @@
                         <a:tabLst/>
                         <a:defRPr/>
                       </a:pPr>
-                      <a:endParaRPr lang="en-GB" sz="1800" b="0" dirty="0">
+                      <a:endParaRPr lang="en-GB" sz="1400" b="0" dirty="0">
                         <a:solidFill>
                           <a:schemeClr val="tx1"/>
                         </a:solidFill>
@@ -5062,7 +5132,7 @@
                         <a:tabLst/>
                         <a:defRPr/>
                       </a:pPr>
-                      <a:endParaRPr lang="en-GB" sz="1800" b="0" dirty="0">
+                      <a:endParaRPr lang="en-GB" sz="1400" b="0" dirty="0">
                         <a:solidFill>
                           <a:schemeClr val="tx1"/>
                         </a:solidFill>
@@ -5086,7 +5156,7 @@
                         <a:tabLst/>
                         <a:defRPr/>
                       </a:pPr>
-                      <a:endParaRPr lang="en-GB" sz="1800" b="0" dirty="0">
+                      <a:endParaRPr lang="en-GB" sz="1400" b="0" dirty="0">
                         <a:solidFill>
                           <a:schemeClr val="tx1"/>
                         </a:solidFill>
@@ -5110,7 +5180,7 @@
                         <a:tabLst/>
                         <a:defRPr/>
                       </a:pPr>
-                      <a:endParaRPr lang="en-GB" sz="1800" b="0" dirty="0">
+                      <a:endParaRPr lang="en-GB" sz="1400" b="0" dirty="0">
                         <a:solidFill>
                           <a:schemeClr val="tx1"/>
                         </a:solidFill>
@@ -5134,7 +5204,7 @@
                         <a:tabLst/>
                         <a:defRPr/>
                       </a:pPr>
-                      <a:endParaRPr lang="en-GB" sz="1800" b="0" dirty="0">
+                      <a:endParaRPr lang="en-GB" sz="1400" b="0" dirty="0">
                         <a:solidFill>
                           <a:schemeClr val="tx1"/>
                         </a:solidFill>
@@ -5158,7 +5228,7 @@
                         <a:tabLst/>
                         <a:defRPr/>
                       </a:pPr>
-                      <a:endParaRPr lang="en-GB" sz="1800" b="0" dirty="0">
+                      <a:endParaRPr lang="en-GB" sz="1400" b="0" dirty="0">
                         <a:solidFill>
                           <a:schemeClr val="tx1"/>
                         </a:solidFill>
@@ -5182,7 +5252,7 @@
                         <a:tabLst/>
                         <a:defRPr/>
                       </a:pPr>
-                      <a:endParaRPr lang="en-GB" sz="1800" b="0" dirty="0">
+                      <a:endParaRPr lang="en-GB" sz="1400" b="0" dirty="0">
                         <a:solidFill>
                           <a:schemeClr val="tx1"/>
                         </a:solidFill>
@@ -5207,14 +5277,14 @@
                         <a:defRPr/>
                       </a:pPr>
                       <a:br>
-                        <a:rPr lang="en-GB" sz="1800" b="0" dirty="0">
+                        <a:rPr lang="en-GB" sz="1400" b="0" dirty="0">
                           <a:solidFill>
                             <a:schemeClr val="tx1"/>
                           </a:solidFill>
                         </a:rPr>
                       </a:br>
                       <a:r>
-                        <a:rPr lang="en-GB" sz="1800" b="0" dirty="0">
+                        <a:rPr lang="en-GB" sz="1400" b="0" dirty="0">
                           <a:solidFill>
                             <a:schemeClr val="tx1"/>
                           </a:solidFill>
@@ -5222,7 +5292,7 @@
                         <a:t>Time taken for thread 2: </a:t>
                       </a:r>
                       <a:r>
-                        <a:rPr lang="en-GB" sz="1800" b="1" dirty="0">
+                        <a:rPr lang="en-GB" sz="1400" b="1" dirty="0">
                           <a:solidFill>
                             <a:schemeClr val="tx1"/>
                           </a:solidFill>
@@ -5280,7 +5350,7 @@
                         <a:defRPr/>
                       </a:pPr>
                       <a:r>
-                        <a:rPr lang="en-GB" sz="1800" b="1" u="sng" dirty="0">
+                        <a:rPr lang="en-GB" sz="1400" b="1" u="sng" dirty="0">
                           <a:solidFill>
                             <a:schemeClr val="tx1"/>
                           </a:solidFill>
@@ -5307,7 +5377,7 @@
                         <a:defRPr/>
                       </a:pPr>
                       <a:r>
-                        <a:rPr lang="en-GB" sz="1800" b="1" dirty="0">
+                        <a:rPr lang="en-GB" sz="1400" b="1" dirty="0">
                           <a:solidFill>
                             <a:srgbClr val="00B050"/>
                           </a:solidFill>
@@ -5315,7 +5385,7 @@
                         <a:t>Prepare the dessert </a:t>
                       </a:r>
                       <a:r>
-                        <a:rPr lang="en-GB" sz="1800" b="0" dirty="0">
+                        <a:rPr lang="en-GB" sz="1400" b="0" dirty="0">
                           <a:solidFill>
                             <a:schemeClr val="tx1"/>
                           </a:solidFill>
@@ -5341,7 +5411,7 @@
                         <a:tabLst/>
                         <a:defRPr/>
                       </a:pPr>
-                      <a:endParaRPr lang="en-GB" sz="1800" b="0" dirty="0">
+                      <a:endParaRPr lang="en-GB" sz="1400" b="0" dirty="0">
                         <a:solidFill>
                           <a:schemeClr val="tx1"/>
                         </a:solidFill>
@@ -5365,7 +5435,7 @@
                         <a:tabLst/>
                         <a:defRPr/>
                       </a:pPr>
-                      <a:endParaRPr lang="en-GB" sz="1800" b="0" dirty="0">
+                      <a:endParaRPr lang="en-GB" sz="1400" b="0" dirty="0">
                         <a:solidFill>
                           <a:schemeClr val="tx1"/>
                         </a:solidFill>
@@ -5389,7 +5459,7 @@
                         <a:tabLst/>
                         <a:defRPr/>
                       </a:pPr>
-                      <a:endParaRPr lang="en-GB" sz="1800" b="0" dirty="0">
+                      <a:endParaRPr lang="en-GB" sz="1400" b="0" dirty="0">
                         <a:solidFill>
                           <a:schemeClr val="tx1"/>
                         </a:solidFill>
@@ -5413,7 +5483,7 @@
                         <a:tabLst/>
                         <a:defRPr/>
                       </a:pPr>
-                      <a:endParaRPr lang="en-GB" sz="1800" b="0" dirty="0">
+                      <a:endParaRPr lang="en-GB" sz="1400" b="0" dirty="0">
                         <a:solidFill>
                           <a:schemeClr val="tx1"/>
                         </a:solidFill>
@@ -5437,7 +5507,7 @@
                         <a:tabLst/>
                         <a:defRPr/>
                       </a:pPr>
-                      <a:endParaRPr lang="en-GB" sz="1800" b="0" dirty="0">
+                      <a:endParaRPr lang="en-GB" sz="1400" b="0" dirty="0">
                         <a:solidFill>
                           <a:schemeClr val="tx1"/>
                         </a:solidFill>
@@ -5461,7 +5531,7 @@
                         <a:tabLst/>
                         <a:defRPr/>
                       </a:pPr>
-                      <a:endParaRPr lang="en-GB" sz="1800" b="0" dirty="0">
+                      <a:endParaRPr lang="en-GB" sz="1400" b="0" dirty="0">
                         <a:solidFill>
                           <a:schemeClr val="tx1"/>
                         </a:solidFill>
@@ -5485,7 +5555,7 @@
                         <a:tabLst/>
                         <a:defRPr/>
                       </a:pPr>
-                      <a:endParaRPr lang="en-GB" sz="1800" b="0" dirty="0">
+                      <a:endParaRPr lang="en-GB" sz="1400" b="0" dirty="0">
                         <a:solidFill>
                           <a:schemeClr val="tx1"/>
                         </a:solidFill>
@@ -5509,7 +5579,7 @@
                         <a:tabLst/>
                         <a:defRPr/>
                       </a:pPr>
-                      <a:endParaRPr lang="en-GB" sz="1800" b="0" dirty="0">
+                      <a:endParaRPr lang="en-GB" sz="1400" b="0" dirty="0">
                         <a:solidFill>
                           <a:schemeClr val="tx1"/>
                         </a:solidFill>
@@ -5533,7 +5603,7 @@
                         <a:tabLst/>
                         <a:defRPr/>
                       </a:pPr>
-                      <a:endParaRPr lang="en-GB" sz="1800" b="0" dirty="0">
+                      <a:endParaRPr lang="en-GB" sz="1400" b="0" dirty="0">
                         <a:solidFill>
                           <a:schemeClr val="tx1"/>
                         </a:solidFill>
@@ -5557,7 +5627,7 @@
                         <a:tabLst/>
                         <a:defRPr/>
                       </a:pPr>
-                      <a:endParaRPr lang="en-GB" sz="1800" b="0" dirty="0">
+                      <a:endParaRPr lang="en-GB" sz="1400" b="0" dirty="0">
                         <a:solidFill>
                           <a:schemeClr val="tx1"/>
                         </a:solidFill>
@@ -5582,7 +5652,7 @@
                         <a:defRPr/>
                       </a:pPr>
                       <a:r>
-                        <a:rPr lang="en-GB" sz="1800" b="0" dirty="0">
+                        <a:rPr lang="en-GB" sz="1400" b="0" dirty="0">
                           <a:solidFill>
                             <a:schemeClr val="tx1"/>
                           </a:solidFill>
@@ -5590,7 +5660,7 @@
                         <a:t>Time taken for thread 3: </a:t>
                       </a:r>
                       <a:r>
-                        <a:rPr lang="en-GB" sz="1800" b="1" dirty="0">
+                        <a:rPr lang="en-GB" sz="1400" b="1" dirty="0">
                           <a:solidFill>
                             <a:schemeClr val="tx1"/>
                           </a:solidFill>
@@ -5648,7 +5718,7 @@
                         <a:defRPr/>
                       </a:pPr>
                       <a:r>
-                        <a:rPr lang="en-GB" sz="1800" b="1" u="sng" dirty="0">
+                        <a:rPr lang="en-GB" sz="1400" b="1" u="sng" dirty="0">
                           <a:solidFill>
                             <a:schemeClr val="tx1"/>
                           </a:solidFill>
@@ -5675,7 +5745,7 @@
                         <a:defRPr/>
                       </a:pPr>
                       <a:r>
-                        <a:rPr lang="en-GB" sz="1800" b="1" dirty="0">
+                        <a:rPr lang="en-GB" sz="1400" b="1" dirty="0">
                           <a:solidFill>
                             <a:srgbClr val="00B050"/>
                           </a:solidFill>
@@ -5683,7 +5753,7 @@
                         <a:t>Grate cheese </a:t>
                       </a:r>
                       <a:r>
-                        <a:rPr lang="en-GB" sz="1800" b="0" dirty="0">
+                        <a:rPr lang="en-GB" sz="1400" b="0" dirty="0">
                           <a:solidFill>
                             <a:schemeClr val="tx1"/>
                           </a:solidFill>
@@ -5709,7 +5779,7 @@
                         <a:tabLst/>
                         <a:defRPr/>
                       </a:pPr>
-                      <a:endParaRPr lang="en-GB" sz="1800" b="0" dirty="0">
+                      <a:endParaRPr lang="en-GB" sz="1400" b="0" dirty="0">
                         <a:solidFill>
                           <a:schemeClr val="tx1"/>
                         </a:solidFill>
@@ -5733,7 +5803,7 @@
                         <a:tabLst/>
                         <a:defRPr/>
                       </a:pPr>
-                      <a:endParaRPr lang="en-GB" sz="1800" b="0" dirty="0">
+                      <a:endParaRPr lang="en-GB" sz="1400" b="0" dirty="0">
                         <a:solidFill>
                           <a:schemeClr val="tx1"/>
                         </a:solidFill>
@@ -5757,7 +5827,7 @@
                         <a:tabLst/>
                         <a:defRPr/>
                       </a:pPr>
-                      <a:endParaRPr lang="en-GB" sz="1800" b="0" dirty="0">
+                      <a:endParaRPr lang="en-GB" sz="1400" b="0" dirty="0">
                         <a:solidFill>
                           <a:schemeClr val="tx1"/>
                         </a:solidFill>
@@ -5781,7 +5851,7 @@
                         <a:tabLst/>
                         <a:defRPr/>
                       </a:pPr>
-                      <a:endParaRPr lang="en-GB" sz="1800" b="0" dirty="0">
+                      <a:endParaRPr lang="en-GB" sz="1400" b="0" dirty="0">
                         <a:solidFill>
                           <a:schemeClr val="tx1"/>
                         </a:solidFill>
@@ -5805,7 +5875,7 @@
                         <a:tabLst/>
                         <a:defRPr/>
                       </a:pPr>
-                      <a:endParaRPr lang="en-GB" sz="1800" b="0" dirty="0">
+                      <a:endParaRPr lang="en-GB" sz="1400" b="0" dirty="0">
                         <a:solidFill>
                           <a:schemeClr val="tx1"/>
                         </a:solidFill>
@@ -5829,7 +5899,7 @@
                         <a:tabLst/>
                         <a:defRPr/>
                       </a:pPr>
-                      <a:endParaRPr lang="en-GB" sz="1800" b="0" dirty="0">
+                      <a:endParaRPr lang="en-GB" sz="1400" b="0" dirty="0">
                         <a:solidFill>
                           <a:schemeClr val="tx1"/>
                         </a:solidFill>
@@ -5853,7 +5923,7 @@
                         <a:tabLst/>
                         <a:defRPr/>
                       </a:pPr>
-                      <a:endParaRPr lang="en-GB" sz="1800" b="0" dirty="0">
+                      <a:endParaRPr lang="en-GB" sz="1400" b="0" dirty="0">
                         <a:solidFill>
                           <a:schemeClr val="tx1"/>
                         </a:solidFill>
@@ -5877,7 +5947,7 @@
                         <a:tabLst/>
                         <a:defRPr/>
                       </a:pPr>
-                      <a:endParaRPr lang="en-GB" sz="1800" b="0" dirty="0">
+                      <a:endParaRPr lang="en-GB" sz="1400" b="0" dirty="0">
                         <a:solidFill>
                           <a:schemeClr val="tx1"/>
                         </a:solidFill>
@@ -5901,7 +5971,7 @@
                         <a:tabLst/>
                         <a:defRPr/>
                       </a:pPr>
-                      <a:endParaRPr lang="en-GB" sz="1800" b="0" dirty="0">
+                      <a:endParaRPr lang="en-GB" sz="1400" b="0" dirty="0">
                         <a:solidFill>
                           <a:schemeClr val="tx1"/>
                         </a:solidFill>
@@ -5925,7 +5995,7 @@
                         <a:tabLst/>
                         <a:defRPr/>
                       </a:pPr>
-                      <a:endParaRPr lang="en-GB" sz="1800" b="0" dirty="0">
+                      <a:endParaRPr lang="en-GB" sz="1400" b="0" dirty="0">
                         <a:solidFill>
                           <a:schemeClr val="tx1"/>
                         </a:solidFill>
@@ -5949,7 +6019,7 @@
                         <a:tabLst/>
                         <a:defRPr/>
                       </a:pPr>
-                      <a:endParaRPr lang="en-GB" sz="1800" b="0" dirty="0">
+                      <a:endParaRPr lang="en-GB" sz="1400" b="0" dirty="0">
                         <a:solidFill>
                           <a:schemeClr val="tx1"/>
                         </a:solidFill>
@@ -5974,7 +6044,7 @@
                         <a:defRPr/>
                       </a:pPr>
                       <a:r>
-                        <a:rPr lang="en-GB" sz="1800" b="0" dirty="0">
+                        <a:rPr lang="en-GB" sz="1400" b="0" dirty="0">
                           <a:solidFill>
                             <a:schemeClr val="tx1"/>
                           </a:solidFill>
@@ -6001,7 +6071,7 @@
                         <a:defRPr/>
                       </a:pPr>
                       <a:r>
-                        <a:rPr lang="en-GB" sz="1800" b="1" dirty="0">
+                        <a:rPr lang="en-GB" sz="1400" b="1" dirty="0">
                           <a:solidFill>
                             <a:schemeClr val="tx1"/>
                           </a:solidFill>
@@ -6259,7 +6329,7 @@
           <p:nvPr>
             <p:extLst>
               <p:ext uri="{D42A27DB-BD31-4B8C-83A1-F6EECF244321}">
-                <p14:modId xmlns:p14="http://schemas.microsoft.com/office/powerpoint/2010/main" val="3280481250"/>
+                <p14:modId xmlns:p14="http://schemas.microsoft.com/office/powerpoint/2010/main" val="1462535844"/>
               </p:ext>
             </p:extLst>
           </p:nvPr>
@@ -6619,6 +6689,41 @@
                           </a:solidFill>
                         </a:rPr>
                         <a:t>(15 mins)</a:t>
+                      </a:r>
+                    </a:p>
+                    <a:p>
+                      <a:pPr marL="342900" marR="0" lvl="0" indent="-342900" algn="l" defTabSz="914400" rtl="0" eaLnBrk="1" fontAlgn="auto" latinLnBrk="0" hangingPunct="1">
+                        <a:lnSpc>
+                          <a:spcPct val="100000"/>
+                        </a:lnSpc>
+                        <a:spcBef>
+                          <a:spcPts val="0"/>
+                        </a:spcBef>
+                        <a:spcAft>
+                          <a:spcPts val="0"/>
+                        </a:spcAft>
+                        <a:buClrTx/>
+                        <a:buSzTx/>
+                        <a:buFont typeface="Arial" panose="020B0604020202020204" pitchFamily="34" charset="0"/>
+                        <a:buChar char="•"/>
+                        <a:tabLst/>
+                        <a:defRPr/>
+                      </a:pPr>
+                      <a:r>
+                        <a:rPr lang="en-GB" sz="1800" b="1" dirty="0">
+                          <a:solidFill>
+                            <a:schemeClr val="tx1"/>
+                          </a:solidFill>
+                        </a:rPr>
+                        <a:t>Wait for thread 2 to finish dessert </a:t>
+                      </a:r>
+                      <a:r>
+                        <a:rPr lang="en-GB" sz="1800" b="0" dirty="0">
+                          <a:solidFill>
+                            <a:schemeClr val="tx1"/>
+                          </a:solidFill>
+                        </a:rPr>
+                        <a:t>(0 mins)</a:t>
                       </a:r>
                     </a:p>
                     <a:p>

</xml_diff>

<commit_message>
Improved kitchen analogy and PowerPoint
</commit_message>
<xml_diff>
--- a/Async and await presentation.pptx
+++ b/Async and await presentation.pptx
@@ -4877,23 +4877,7 @@
                             <a:schemeClr val="tx1"/>
                           </a:solidFill>
                         </a:rPr>
-                        <a:t>Wait for thread 3 </a:t>
-                      </a:r>
-                      <a:r>
-                        <a:rPr lang="en-GB" sz="1400" b="1">
-                          <a:solidFill>
-                            <a:schemeClr val="tx1"/>
-                          </a:solidFill>
-                        </a:rPr>
-                        <a:t>to finish </a:t>
-                      </a:r>
-                      <a:r>
-                        <a:rPr lang="en-GB" sz="1400" b="1" dirty="0">
-                          <a:solidFill>
-                            <a:schemeClr val="tx1"/>
-                          </a:solidFill>
-                        </a:rPr>
-                        <a:t>dessert </a:t>
+                        <a:t>Wait for thread 3 to finish dessert </a:t>
                       </a:r>
                       <a:r>
                         <a:rPr lang="en-GB" sz="1400" b="0" dirty="0">
@@ -6130,8 +6114,8 @@
         </p:nvSpPr>
         <p:spPr>
           <a:xfrm>
-            <a:off x="285226" y="5176007"/>
-            <a:ext cx="11641731" cy="1354217"/>
+            <a:off x="285226" y="4540264"/>
+            <a:ext cx="11641731" cy="1631216"/>
           </a:xfrm>
           <a:prstGeom prst="rect">
             <a:avLst/>
@@ -6206,6 +6190,9 @@
               <a:rPr lang="en-GB" sz="1600" dirty="0"/>
               <a:t>Thread 4 only grates the cheese, a minor CPU-bound task which it complete in parallel to Threads 1 and 3.</a:t>
             </a:r>
+          </a:p>
+          <a:p>
+            <a:endParaRPr lang="en-GB" dirty="0"/>
           </a:p>
           <a:p>
             <a:r>
@@ -7568,7 +7555,7 @@
             </a:r>
             <a:r>
               <a:rPr lang="en-GB" b="1" dirty="0"/>
-              <a:t>still saving 35 mins</a:t>
+              <a:t>still saving 37 mins</a:t>
             </a:r>
             <a:r>
               <a:rPr lang="en-GB" dirty="0"/>

</xml_diff>

<commit_message>
Refactor and added more slides to PowerPoint
</commit_message>
<xml_diff>
--- a/Async and await presentation.pptx
+++ b/Async and await presentation.pptx
@@ -17,13 +17,22 @@
     <p:sldId id="265" r:id="rId11"/>
     <p:sldId id="267" r:id="rId12"/>
     <p:sldId id="268" r:id="rId13"/>
-    <p:sldId id="269" r:id="rId14"/>
-    <p:sldId id="270" r:id="rId15"/>
-    <p:sldId id="274" r:id="rId16"/>
-    <p:sldId id="272" r:id="rId17"/>
-    <p:sldId id="273" r:id="rId18"/>
-    <p:sldId id="275" r:id="rId19"/>
-    <p:sldId id="276" r:id="rId20"/>
+    <p:sldId id="278" r:id="rId14"/>
+    <p:sldId id="279" r:id="rId15"/>
+    <p:sldId id="269" r:id="rId16"/>
+    <p:sldId id="280" r:id="rId17"/>
+    <p:sldId id="281" r:id="rId18"/>
+    <p:sldId id="270" r:id="rId19"/>
+    <p:sldId id="282" r:id="rId20"/>
+    <p:sldId id="283" r:id="rId21"/>
+    <p:sldId id="274" r:id="rId22"/>
+    <p:sldId id="284" r:id="rId23"/>
+    <p:sldId id="285" r:id="rId24"/>
+    <p:sldId id="272" r:id="rId25"/>
+    <p:sldId id="273" r:id="rId26"/>
+    <p:sldId id="275" r:id="rId27"/>
+    <p:sldId id="276" r:id="rId28"/>
+    <p:sldId id="277" r:id="rId29"/>
   </p:sldIdLst>
   <p:sldSz cx="12192000" cy="6858000"/>
   <p:notesSz cx="6858000" cy="9144000"/>
@@ -4174,6 +4183,198 @@
         </p:nvSpPr>
         <p:spPr>
           <a:xfrm>
+            <a:off x="92766" y="0"/>
+            <a:ext cx="11781182" cy="461665"/>
+          </a:xfrm>
+          <a:prstGeom prst="rect">
+            <a:avLst/>
+          </a:prstGeom>
+          <a:noFill/>
+        </p:spPr>
+        <p:txBody>
+          <a:bodyPr wrap="square" rtlCol="0">
+            <a:spAutoFit/>
+          </a:bodyPr>
+          <a:lstStyle/>
+          <a:p>
+            <a:r>
+              <a:rPr lang="en-GB" sz="2400" b="1" dirty="0"/>
+              <a:t>C# code</a:t>
+            </a:r>
+            <a:endParaRPr lang="en-GB" sz="2400" dirty="0"/>
+          </a:p>
+        </p:txBody>
+      </p:sp>
+      <p:pic>
+        <p:nvPicPr>
+          <p:cNvPr id="2" name="Picture 1">
+            <a:extLst>
+              <a:ext uri="{FF2B5EF4-FFF2-40B4-BE49-F238E27FC236}">
+                <a16:creationId xmlns:a16="http://schemas.microsoft.com/office/drawing/2014/main" id="{F0E53A2A-621B-4FCE-9DF0-AB7FF5FFC932}"/>
+              </a:ext>
+            </a:extLst>
+          </p:cNvPr>
+          <p:cNvPicPr>
+            <a:picLocks noChangeAspect="1"/>
+          </p:cNvPicPr>
+          <p:nvPr/>
+        </p:nvPicPr>
+        <p:blipFill>
+          <a:blip r:embed="rId2"/>
+          <a:stretch>
+            <a:fillRect/>
+          </a:stretch>
+        </p:blipFill>
+        <p:spPr>
+          <a:xfrm>
+            <a:off x="92766" y="1128887"/>
+            <a:ext cx="12099234" cy="3795243"/>
+          </a:xfrm>
+          <a:prstGeom prst="rect">
+            <a:avLst/>
+          </a:prstGeom>
+        </p:spPr>
+      </p:pic>
+    </p:spTree>
+    <p:extLst>
+      <p:ext uri="{BB962C8B-B14F-4D97-AF65-F5344CB8AC3E}">
+        <p14:creationId xmlns:p14="http://schemas.microsoft.com/office/powerpoint/2010/main" val="958901359"/>
+      </p:ext>
+    </p:extLst>
+  </p:cSld>
+  <p:clrMapOvr>
+    <a:masterClrMapping/>
+  </p:clrMapOvr>
+</p:sld>
+</file>
+
+<file path=ppt/slides/slide14.xml><?xml version="1.0" encoding="utf-8"?>
+<p:sld xmlns:a="http://schemas.openxmlformats.org/drawingml/2006/main" xmlns:r="http://schemas.openxmlformats.org/officeDocument/2006/relationships" xmlns:p="http://schemas.openxmlformats.org/presentationml/2006/main">
+  <p:cSld>
+    <p:spTree>
+      <p:nvGrpSpPr>
+        <p:cNvPr id="1" name=""/>
+        <p:cNvGrpSpPr/>
+        <p:nvPr/>
+      </p:nvGrpSpPr>
+      <p:grpSpPr>
+        <a:xfrm>
+          <a:off x="0" y="0"/>
+          <a:ext cx="0" cy="0"/>
+          <a:chOff x="0" y="0"/>
+          <a:chExt cx="0" cy="0"/>
+        </a:xfrm>
+      </p:grpSpPr>
+      <p:sp>
+        <p:nvSpPr>
+          <p:cNvPr id="4" name="TextBox 3">
+            <a:extLst>
+              <a:ext uri="{FF2B5EF4-FFF2-40B4-BE49-F238E27FC236}">
+                <a16:creationId xmlns:a16="http://schemas.microsoft.com/office/drawing/2014/main" id="{18767206-9205-42D0-A2AE-5A1017D4CB08}"/>
+              </a:ext>
+            </a:extLst>
+          </p:cNvPr>
+          <p:cNvSpPr txBox="1"/>
+          <p:nvPr/>
+        </p:nvSpPr>
+        <p:spPr>
+          <a:xfrm>
+            <a:off x="92766" y="0"/>
+            <a:ext cx="11781182" cy="461665"/>
+          </a:xfrm>
+          <a:prstGeom prst="rect">
+            <a:avLst/>
+          </a:prstGeom>
+          <a:noFill/>
+        </p:spPr>
+        <p:txBody>
+          <a:bodyPr wrap="square" rtlCol="0">
+            <a:spAutoFit/>
+          </a:bodyPr>
+          <a:lstStyle/>
+          <a:p>
+            <a:r>
+              <a:rPr lang="en-GB" sz="2400" b="1" dirty="0"/>
+              <a:t>Console output (it’s ridiculous)</a:t>
+            </a:r>
+            <a:endParaRPr lang="en-GB" sz="2400" dirty="0"/>
+          </a:p>
+        </p:txBody>
+      </p:sp>
+      <p:pic>
+        <p:nvPicPr>
+          <p:cNvPr id="3" name="Picture 2">
+            <a:extLst>
+              <a:ext uri="{FF2B5EF4-FFF2-40B4-BE49-F238E27FC236}">
+                <a16:creationId xmlns:a16="http://schemas.microsoft.com/office/drawing/2014/main" id="{E1D53F19-A8EF-4396-8991-47377EBD5ECE}"/>
+              </a:ext>
+            </a:extLst>
+          </p:cNvPr>
+          <p:cNvPicPr>
+            <a:picLocks noChangeAspect="1"/>
+          </p:cNvPicPr>
+          <p:nvPr/>
+        </p:nvPicPr>
+        <p:blipFill>
+          <a:blip r:embed="rId2"/>
+          <a:stretch>
+            <a:fillRect/>
+          </a:stretch>
+        </p:blipFill>
+        <p:spPr>
+          <a:xfrm>
+            <a:off x="92766" y="461664"/>
+            <a:ext cx="10590076" cy="6396335"/>
+          </a:xfrm>
+          <a:prstGeom prst="rect">
+            <a:avLst/>
+          </a:prstGeom>
+        </p:spPr>
+      </p:pic>
+    </p:spTree>
+    <p:extLst>
+      <p:ext uri="{BB962C8B-B14F-4D97-AF65-F5344CB8AC3E}">
+        <p14:creationId xmlns:p14="http://schemas.microsoft.com/office/powerpoint/2010/main" val="3830813071"/>
+      </p:ext>
+    </p:extLst>
+  </p:cSld>
+  <p:clrMapOvr>
+    <a:masterClrMapping/>
+  </p:clrMapOvr>
+</p:sld>
+</file>
+
+<file path=ppt/slides/slide15.xml><?xml version="1.0" encoding="utf-8"?>
+<p:sld xmlns:a="http://schemas.openxmlformats.org/drawingml/2006/main" xmlns:r="http://schemas.openxmlformats.org/officeDocument/2006/relationships" xmlns:p="http://schemas.openxmlformats.org/presentationml/2006/main">
+  <p:cSld>
+    <p:spTree>
+      <p:nvGrpSpPr>
+        <p:cNvPr id="1" name=""/>
+        <p:cNvGrpSpPr/>
+        <p:nvPr/>
+      </p:nvGrpSpPr>
+      <p:grpSpPr>
+        <a:xfrm>
+          <a:off x="0" y="0"/>
+          <a:ext cx="0" cy="0"/>
+          <a:chOff x="0" y="0"/>
+          <a:chExt cx="0" cy="0"/>
+        </a:xfrm>
+      </p:grpSpPr>
+      <p:sp>
+        <p:nvSpPr>
+          <p:cNvPr id="4" name="TextBox 3">
+            <a:extLst>
+              <a:ext uri="{FF2B5EF4-FFF2-40B4-BE49-F238E27FC236}">
+                <a16:creationId xmlns:a16="http://schemas.microsoft.com/office/drawing/2014/main" id="{18767206-9205-42D0-A2AE-5A1017D4CB08}"/>
+              </a:ext>
+            </a:extLst>
+          </p:cNvPr>
+          <p:cNvSpPr txBox="1"/>
+          <p:nvPr/>
+        </p:nvSpPr>
+        <p:spPr>
+          <a:xfrm>
             <a:off x="145775" y="132522"/>
             <a:ext cx="11781182" cy="6586418"/>
           </a:xfrm>
@@ -4455,7 +4656,199 @@
 </p:sld>
 </file>
 
-<file path=ppt/slides/slide14.xml><?xml version="1.0" encoding="utf-8"?>
+<file path=ppt/slides/slide16.xml><?xml version="1.0" encoding="utf-8"?>
+<p:sld xmlns:a="http://schemas.openxmlformats.org/drawingml/2006/main" xmlns:r="http://schemas.openxmlformats.org/officeDocument/2006/relationships" xmlns:p="http://schemas.openxmlformats.org/presentationml/2006/main">
+  <p:cSld>
+    <p:spTree>
+      <p:nvGrpSpPr>
+        <p:cNvPr id="1" name=""/>
+        <p:cNvGrpSpPr/>
+        <p:nvPr/>
+      </p:nvGrpSpPr>
+      <p:grpSpPr>
+        <a:xfrm>
+          <a:off x="0" y="0"/>
+          <a:ext cx="0" cy="0"/>
+          <a:chOff x="0" y="0"/>
+          <a:chExt cx="0" cy="0"/>
+        </a:xfrm>
+      </p:grpSpPr>
+      <p:sp>
+        <p:nvSpPr>
+          <p:cNvPr id="4" name="TextBox 3">
+            <a:extLst>
+              <a:ext uri="{FF2B5EF4-FFF2-40B4-BE49-F238E27FC236}">
+                <a16:creationId xmlns:a16="http://schemas.microsoft.com/office/drawing/2014/main" id="{18767206-9205-42D0-A2AE-5A1017D4CB08}"/>
+              </a:ext>
+            </a:extLst>
+          </p:cNvPr>
+          <p:cNvSpPr txBox="1"/>
+          <p:nvPr/>
+        </p:nvSpPr>
+        <p:spPr>
+          <a:xfrm>
+            <a:off x="92766" y="0"/>
+            <a:ext cx="11781182" cy="461665"/>
+          </a:xfrm>
+          <a:prstGeom prst="rect">
+            <a:avLst/>
+          </a:prstGeom>
+          <a:noFill/>
+        </p:spPr>
+        <p:txBody>
+          <a:bodyPr wrap="square" rtlCol="0">
+            <a:spAutoFit/>
+          </a:bodyPr>
+          <a:lstStyle/>
+          <a:p>
+            <a:r>
+              <a:rPr lang="en-GB" sz="2400" b="1" dirty="0"/>
+              <a:t>C# code</a:t>
+            </a:r>
+            <a:endParaRPr lang="en-GB" sz="2400" dirty="0"/>
+          </a:p>
+        </p:txBody>
+      </p:sp>
+      <p:pic>
+        <p:nvPicPr>
+          <p:cNvPr id="3" name="Picture 2">
+            <a:extLst>
+              <a:ext uri="{FF2B5EF4-FFF2-40B4-BE49-F238E27FC236}">
+                <a16:creationId xmlns:a16="http://schemas.microsoft.com/office/drawing/2014/main" id="{B97CC702-914B-4F62-B18E-EF99143E2B1F}"/>
+              </a:ext>
+            </a:extLst>
+          </p:cNvPr>
+          <p:cNvPicPr>
+            <a:picLocks noChangeAspect="1"/>
+          </p:cNvPicPr>
+          <p:nvPr/>
+        </p:nvPicPr>
+        <p:blipFill>
+          <a:blip r:embed="rId2"/>
+          <a:stretch>
+            <a:fillRect/>
+          </a:stretch>
+        </p:blipFill>
+        <p:spPr>
+          <a:xfrm>
+            <a:off x="55303" y="604539"/>
+            <a:ext cx="12136697" cy="4867573"/>
+          </a:xfrm>
+          <a:prstGeom prst="rect">
+            <a:avLst/>
+          </a:prstGeom>
+        </p:spPr>
+      </p:pic>
+    </p:spTree>
+    <p:extLst>
+      <p:ext uri="{BB962C8B-B14F-4D97-AF65-F5344CB8AC3E}">
+        <p14:creationId xmlns:p14="http://schemas.microsoft.com/office/powerpoint/2010/main" val="4254138918"/>
+      </p:ext>
+    </p:extLst>
+  </p:cSld>
+  <p:clrMapOvr>
+    <a:masterClrMapping/>
+  </p:clrMapOvr>
+</p:sld>
+</file>
+
+<file path=ppt/slides/slide17.xml><?xml version="1.0" encoding="utf-8"?>
+<p:sld xmlns:a="http://schemas.openxmlformats.org/drawingml/2006/main" xmlns:r="http://schemas.openxmlformats.org/officeDocument/2006/relationships" xmlns:p="http://schemas.openxmlformats.org/presentationml/2006/main">
+  <p:cSld>
+    <p:spTree>
+      <p:nvGrpSpPr>
+        <p:cNvPr id="1" name=""/>
+        <p:cNvGrpSpPr/>
+        <p:nvPr/>
+      </p:nvGrpSpPr>
+      <p:grpSpPr>
+        <a:xfrm>
+          <a:off x="0" y="0"/>
+          <a:ext cx="0" cy="0"/>
+          <a:chOff x="0" y="0"/>
+          <a:chExt cx="0" cy="0"/>
+        </a:xfrm>
+      </p:grpSpPr>
+      <p:sp>
+        <p:nvSpPr>
+          <p:cNvPr id="4" name="TextBox 3">
+            <a:extLst>
+              <a:ext uri="{FF2B5EF4-FFF2-40B4-BE49-F238E27FC236}">
+                <a16:creationId xmlns:a16="http://schemas.microsoft.com/office/drawing/2014/main" id="{18767206-9205-42D0-A2AE-5A1017D4CB08}"/>
+              </a:ext>
+            </a:extLst>
+          </p:cNvPr>
+          <p:cNvSpPr txBox="1"/>
+          <p:nvPr/>
+        </p:nvSpPr>
+        <p:spPr>
+          <a:xfrm>
+            <a:off x="92766" y="0"/>
+            <a:ext cx="11781182" cy="461665"/>
+          </a:xfrm>
+          <a:prstGeom prst="rect">
+            <a:avLst/>
+          </a:prstGeom>
+          <a:noFill/>
+        </p:spPr>
+        <p:txBody>
+          <a:bodyPr wrap="square" rtlCol="0">
+            <a:spAutoFit/>
+          </a:bodyPr>
+          <a:lstStyle/>
+          <a:p>
+            <a:r>
+              <a:rPr lang="en-GB" sz="2400" b="1" dirty="0"/>
+              <a:t>Console output (much better!)</a:t>
+            </a:r>
+            <a:endParaRPr lang="en-GB" sz="2400" dirty="0"/>
+          </a:p>
+        </p:txBody>
+      </p:sp>
+      <p:pic>
+        <p:nvPicPr>
+          <p:cNvPr id="2" name="Picture 1">
+            <a:extLst>
+              <a:ext uri="{FF2B5EF4-FFF2-40B4-BE49-F238E27FC236}">
+                <a16:creationId xmlns:a16="http://schemas.microsoft.com/office/drawing/2014/main" id="{7D32DCD1-FC14-4C9E-BBB2-C07C0D1D088C}"/>
+              </a:ext>
+            </a:extLst>
+          </p:cNvPr>
+          <p:cNvPicPr>
+            <a:picLocks noChangeAspect="1"/>
+          </p:cNvPicPr>
+          <p:nvPr/>
+        </p:nvPicPr>
+        <p:blipFill>
+          <a:blip r:embed="rId2"/>
+          <a:stretch>
+            <a:fillRect/>
+          </a:stretch>
+        </p:blipFill>
+        <p:spPr>
+          <a:xfrm>
+            <a:off x="92766" y="461665"/>
+            <a:ext cx="10403447" cy="6293656"/>
+          </a:xfrm>
+          <a:prstGeom prst="rect">
+            <a:avLst/>
+          </a:prstGeom>
+        </p:spPr>
+      </p:pic>
+    </p:spTree>
+    <p:extLst>
+      <p:ext uri="{BB962C8B-B14F-4D97-AF65-F5344CB8AC3E}">
+        <p14:creationId xmlns:p14="http://schemas.microsoft.com/office/powerpoint/2010/main" val="853559864"/>
+      </p:ext>
+    </p:extLst>
+  </p:cSld>
+  <p:clrMapOvr>
+    <a:masterClrMapping/>
+  </p:clrMapOvr>
+</p:sld>
+</file>
+
+<file path=ppt/slides/slide18.xml><?xml version="1.0" encoding="utf-8"?>
 <p:sld xmlns:a="http://schemas.openxmlformats.org/drawingml/2006/main" xmlns:r="http://schemas.openxmlformats.org/officeDocument/2006/relationships" xmlns:p="http://schemas.openxmlformats.org/presentationml/2006/main">
   <p:cSld>
     <p:spTree>
@@ -6249,7 +6642,265 @@
 </p:sld>
 </file>
 
-<file path=ppt/slides/slide15.xml><?xml version="1.0" encoding="utf-8"?>
+<file path=ppt/slides/slide19.xml><?xml version="1.0" encoding="utf-8"?>
+<p:sld xmlns:a="http://schemas.openxmlformats.org/drawingml/2006/main" xmlns:r="http://schemas.openxmlformats.org/officeDocument/2006/relationships" xmlns:p="http://schemas.openxmlformats.org/presentationml/2006/main">
+  <p:cSld>
+    <p:spTree>
+      <p:nvGrpSpPr>
+        <p:cNvPr id="1" name=""/>
+        <p:cNvGrpSpPr/>
+        <p:nvPr/>
+      </p:nvGrpSpPr>
+      <p:grpSpPr>
+        <a:xfrm>
+          <a:off x="0" y="0"/>
+          <a:ext cx="0" cy="0"/>
+          <a:chOff x="0" y="0"/>
+          <a:chExt cx="0" cy="0"/>
+        </a:xfrm>
+      </p:grpSpPr>
+      <p:sp>
+        <p:nvSpPr>
+          <p:cNvPr id="4" name="TextBox 3">
+            <a:extLst>
+              <a:ext uri="{FF2B5EF4-FFF2-40B4-BE49-F238E27FC236}">
+                <a16:creationId xmlns:a16="http://schemas.microsoft.com/office/drawing/2014/main" id="{18767206-9205-42D0-A2AE-5A1017D4CB08}"/>
+              </a:ext>
+            </a:extLst>
+          </p:cNvPr>
+          <p:cNvSpPr txBox="1"/>
+          <p:nvPr/>
+        </p:nvSpPr>
+        <p:spPr>
+          <a:xfrm>
+            <a:off x="92766" y="0"/>
+            <a:ext cx="11781182" cy="461665"/>
+          </a:xfrm>
+          <a:prstGeom prst="rect">
+            <a:avLst/>
+          </a:prstGeom>
+          <a:noFill/>
+        </p:spPr>
+        <p:txBody>
+          <a:bodyPr wrap="square" rtlCol="0">
+            <a:spAutoFit/>
+          </a:bodyPr>
+          <a:lstStyle/>
+          <a:p>
+            <a:r>
+              <a:rPr lang="en-GB" sz="2400" b="1" dirty="0"/>
+              <a:t>C# code</a:t>
+            </a:r>
+            <a:endParaRPr lang="en-GB" sz="2400" dirty="0"/>
+          </a:p>
+        </p:txBody>
+      </p:sp>
+      <p:pic>
+        <p:nvPicPr>
+          <p:cNvPr id="2" name="Picture 1">
+            <a:extLst>
+              <a:ext uri="{FF2B5EF4-FFF2-40B4-BE49-F238E27FC236}">
+                <a16:creationId xmlns:a16="http://schemas.microsoft.com/office/drawing/2014/main" id="{471C1663-CEED-4B2D-BE1A-673138594107}"/>
+              </a:ext>
+            </a:extLst>
+          </p:cNvPr>
+          <p:cNvPicPr>
+            <a:picLocks noChangeAspect="1"/>
+          </p:cNvPicPr>
+          <p:nvPr/>
+        </p:nvPicPr>
+        <p:blipFill>
+          <a:blip r:embed="rId2"/>
+          <a:stretch>
+            <a:fillRect/>
+          </a:stretch>
+        </p:blipFill>
+        <p:spPr>
+          <a:xfrm>
+            <a:off x="-1" y="561678"/>
+            <a:ext cx="12176261" cy="4696121"/>
+          </a:xfrm>
+          <a:prstGeom prst="rect">
+            <a:avLst/>
+          </a:prstGeom>
+        </p:spPr>
+      </p:pic>
+    </p:spTree>
+    <p:extLst>
+      <p:ext uri="{BB962C8B-B14F-4D97-AF65-F5344CB8AC3E}">
+        <p14:creationId xmlns:p14="http://schemas.microsoft.com/office/powerpoint/2010/main" val="1810673536"/>
+      </p:ext>
+    </p:extLst>
+  </p:cSld>
+  <p:clrMapOvr>
+    <a:masterClrMapping/>
+  </p:clrMapOvr>
+</p:sld>
+</file>
+
+<file path=ppt/slides/slide2.xml><?xml version="1.0" encoding="utf-8"?>
+<p:sld xmlns:a="http://schemas.openxmlformats.org/drawingml/2006/main" xmlns:r="http://schemas.openxmlformats.org/officeDocument/2006/relationships" xmlns:p="http://schemas.openxmlformats.org/presentationml/2006/main">
+  <p:cSld>
+    <p:spTree>
+      <p:nvGrpSpPr>
+        <p:cNvPr id="1" name=""/>
+        <p:cNvGrpSpPr/>
+        <p:nvPr/>
+      </p:nvGrpSpPr>
+      <p:grpSpPr>
+        <a:xfrm>
+          <a:off x="0" y="0"/>
+          <a:ext cx="0" cy="0"/>
+          <a:chOff x="0" y="0"/>
+          <a:chExt cx="0" cy="0"/>
+        </a:xfrm>
+      </p:grpSpPr>
+      <p:sp>
+        <p:nvSpPr>
+          <p:cNvPr id="2" name="Title 1">
+            <a:extLst>
+              <a:ext uri="{FF2B5EF4-FFF2-40B4-BE49-F238E27FC236}">
+                <a16:creationId xmlns:a16="http://schemas.microsoft.com/office/drawing/2014/main" id="{267862F2-D4D4-4F5B-B69F-65226C837768}"/>
+              </a:ext>
+            </a:extLst>
+          </p:cNvPr>
+          <p:cNvSpPr>
+            <a:spLocks noGrp="1"/>
+          </p:cNvSpPr>
+          <p:nvPr>
+            <p:ph type="ctrTitle"/>
+          </p:nvPr>
+        </p:nvSpPr>
+        <p:spPr/>
+        <p:txBody>
+          <a:bodyPr/>
+          <a:lstStyle/>
+          <a:p>
+            <a:r>
+              <a:rPr lang="en-GB" dirty="0"/>
+              <a:t>Task, Task&lt;T&gt;, Thread and </a:t>
+            </a:r>
+            <a:r>
+              <a:rPr lang="en-GB" dirty="0" err="1"/>
+              <a:t>ThreadPool</a:t>
+            </a:r>
+            <a:r>
+              <a:rPr lang="en-GB" dirty="0"/>
+              <a:t> classes in C#</a:t>
+            </a:r>
+          </a:p>
+        </p:txBody>
+      </p:sp>
+    </p:spTree>
+    <p:extLst>
+      <p:ext uri="{BB962C8B-B14F-4D97-AF65-F5344CB8AC3E}">
+        <p14:creationId xmlns:p14="http://schemas.microsoft.com/office/powerpoint/2010/main" val="2052231843"/>
+      </p:ext>
+    </p:extLst>
+  </p:cSld>
+  <p:clrMapOvr>
+    <a:masterClrMapping/>
+  </p:clrMapOvr>
+</p:sld>
+</file>
+
+<file path=ppt/slides/slide20.xml><?xml version="1.0" encoding="utf-8"?>
+<p:sld xmlns:a="http://schemas.openxmlformats.org/drawingml/2006/main" xmlns:r="http://schemas.openxmlformats.org/officeDocument/2006/relationships" xmlns:p="http://schemas.openxmlformats.org/presentationml/2006/main">
+  <p:cSld>
+    <p:spTree>
+      <p:nvGrpSpPr>
+        <p:cNvPr id="1" name=""/>
+        <p:cNvGrpSpPr/>
+        <p:nvPr/>
+      </p:nvGrpSpPr>
+      <p:grpSpPr>
+        <a:xfrm>
+          <a:off x="0" y="0"/>
+          <a:ext cx="0" cy="0"/>
+          <a:chOff x="0" y="0"/>
+          <a:chExt cx="0" cy="0"/>
+        </a:xfrm>
+      </p:grpSpPr>
+      <p:sp>
+        <p:nvSpPr>
+          <p:cNvPr id="4" name="TextBox 3">
+            <a:extLst>
+              <a:ext uri="{FF2B5EF4-FFF2-40B4-BE49-F238E27FC236}">
+                <a16:creationId xmlns:a16="http://schemas.microsoft.com/office/drawing/2014/main" id="{18767206-9205-42D0-A2AE-5A1017D4CB08}"/>
+              </a:ext>
+            </a:extLst>
+          </p:cNvPr>
+          <p:cNvSpPr txBox="1"/>
+          <p:nvPr/>
+        </p:nvSpPr>
+        <p:spPr>
+          <a:xfrm>
+            <a:off x="92766" y="0"/>
+            <a:ext cx="11781182" cy="461665"/>
+          </a:xfrm>
+          <a:prstGeom prst="rect">
+            <a:avLst/>
+          </a:prstGeom>
+          <a:noFill/>
+        </p:spPr>
+        <p:txBody>
+          <a:bodyPr wrap="square" rtlCol="0">
+            <a:spAutoFit/>
+          </a:bodyPr>
+          <a:lstStyle/>
+          <a:p>
+            <a:r>
+              <a:rPr lang="en-GB" sz="2400" b="1" dirty="0"/>
+              <a:t>Console output</a:t>
+            </a:r>
+            <a:endParaRPr lang="en-GB" sz="2400" dirty="0"/>
+          </a:p>
+        </p:txBody>
+      </p:sp>
+      <p:pic>
+        <p:nvPicPr>
+          <p:cNvPr id="3" name="Picture 2">
+            <a:extLst>
+              <a:ext uri="{FF2B5EF4-FFF2-40B4-BE49-F238E27FC236}">
+                <a16:creationId xmlns:a16="http://schemas.microsoft.com/office/drawing/2014/main" id="{0E9AC200-3883-4BCC-B509-915A2D9FA9DB}"/>
+              </a:ext>
+            </a:extLst>
+          </p:cNvPr>
+          <p:cNvPicPr>
+            <a:picLocks noChangeAspect="1"/>
+          </p:cNvPicPr>
+          <p:nvPr/>
+        </p:nvPicPr>
+        <p:blipFill>
+          <a:blip r:embed="rId2"/>
+          <a:stretch>
+            <a:fillRect/>
+          </a:stretch>
+        </p:blipFill>
+        <p:spPr>
+          <a:xfrm>
+            <a:off x="92766" y="461665"/>
+            <a:ext cx="10572750" cy="6389162"/>
+          </a:xfrm>
+          <a:prstGeom prst="rect">
+            <a:avLst/>
+          </a:prstGeom>
+        </p:spPr>
+      </p:pic>
+    </p:spTree>
+    <p:extLst>
+      <p:ext uri="{BB962C8B-B14F-4D97-AF65-F5344CB8AC3E}">
+        <p14:creationId xmlns:p14="http://schemas.microsoft.com/office/powerpoint/2010/main" val="1766141593"/>
+      </p:ext>
+    </p:extLst>
+  </p:cSld>
+  <p:clrMapOvr>
+    <a:masterClrMapping/>
+  </p:clrMapOvr>
+</p:sld>
+</file>
+
+<file path=ppt/slides/slide21.xml><?xml version="1.0" encoding="utf-8"?>
 <p:sld xmlns:a="http://schemas.openxmlformats.org/drawingml/2006/main" xmlns:r="http://schemas.openxmlformats.org/officeDocument/2006/relationships" xmlns:p="http://schemas.openxmlformats.org/presentationml/2006/main">
   <p:cSld>
     <p:spTree>
@@ -7611,7 +8262,199 @@
 </p:sld>
 </file>
 
-<file path=ppt/slides/slide16.xml><?xml version="1.0" encoding="utf-8"?>
+<file path=ppt/slides/slide22.xml><?xml version="1.0" encoding="utf-8"?>
+<p:sld xmlns:a="http://schemas.openxmlformats.org/drawingml/2006/main" xmlns:r="http://schemas.openxmlformats.org/officeDocument/2006/relationships" xmlns:p="http://schemas.openxmlformats.org/presentationml/2006/main">
+  <p:cSld>
+    <p:spTree>
+      <p:nvGrpSpPr>
+        <p:cNvPr id="1" name=""/>
+        <p:cNvGrpSpPr/>
+        <p:nvPr/>
+      </p:nvGrpSpPr>
+      <p:grpSpPr>
+        <a:xfrm>
+          <a:off x="0" y="0"/>
+          <a:ext cx="0" cy="0"/>
+          <a:chOff x="0" y="0"/>
+          <a:chExt cx="0" cy="0"/>
+        </a:xfrm>
+      </p:grpSpPr>
+      <p:sp>
+        <p:nvSpPr>
+          <p:cNvPr id="4" name="TextBox 3">
+            <a:extLst>
+              <a:ext uri="{FF2B5EF4-FFF2-40B4-BE49-F238E27FC236}">
+                <a16:creationId xmlns:a16="http://schemas.microsoft.com/office/drawing/2014/main" id="{18767206-9205-42D0-A2AE-5A1017D4CB08}"/>
+              </a:ext>
+            </a:extLst>
+          </p:cNvPr>
+          <p:cNvSpPr txBox="1"/>
+          <p:nvPr/>
+        </p:nvSpPr>
+        <p:spPr>
+          <a:xfrm>
+            <a:off x="92766" y="0"/>
+            <a:ext cx="11781182" cy="461665"/>
+          </a:xfrm>
+          <a:prstGeom prst="rect">
+            <a:avLst/>
+          </a:prstGeom>
+          <a:noFill/>
+        </p:spPr>
+        <p:txBody>
+          <a:bodyPr wrap="square" rtlCol="0">
+            <a:spAutoFit/>
+          </a:bodyPr>
+          <a:lstStyle/>
+          <a:p>
+            <a:r>
+              <a:rPr lang="en-GB" sz="2400" b="1" dirty="0"/>
+              <a:t>C# code</a:t>
+            </a:r>
+            <a:endParaRPr lang="en-GB" sz="2400" dirty="0"/>
+          </a:p>
+        </p:txBody>
+      </p:sp>
+      <p:pic>
+        <p:nvPicPr>
+          <p:cNvPr id="3" name="Picture 2">
+            <a:extLst>
+              <a:ext uri="{FF2B5EF4-FFF2-40B4-BE49-F238E27FC236}">
+                <a16:creationId xmlns:a16="http://schemas.microsoft.com/office/drawing/2014/main" id="{7F4ECC8A-89E9-42B0-8371-B0001F0B7FA5}"/>
+              </a:ext>
+            </a:extLst>
+          </p:cNvPr>
+          <p:cNvPicPr>
+            <a:picLocks noChangeAspect="1"/>
+          </p:cNvPicPr>
+          <p:nvPr/>
+        </p:nvPicPr>
+        <p:blipFill>
+          <a:blip r:embed="rId2"/>
+          <a:stretch>
+            <a:fillRect/>
+          </a:stretch>
+        </p:blipFill>
+        <p:spPr>
+          <a:xfrm>
+            <a:off x="92766" y="461665"/>
+            <a:ext cx="12099234" cy="5251191"/>
+          </a:xfrm>
+          <a:prstGeom prst="rect">
+            <a:avLst/>
+          </a:prstGeom>
+        </p:spPr>
+      </p:pic>
+    </p:spTree>
+    <p:extLst>
+      <p:ext uri="{BB962C8B-B14F-4D97-AF65-F5344CB8AC3E}">
+        <p14:creationId xmlns:p14="http://schemas.microsoft.com/office/powerpoint/2010/main" val="3741628391"/>
+      </p:ext>
+    </p:extLst>
+  </p:cSld>
+  <p:clrMapOvr>
+    <a:masterClrMapping/>
+  </p:clrMapOvr>
+</p:sld>
+</file>
+
+<file path=ppt/slides/slide23.xml><?xml version="1.0" encoding="utf-8"?>
+<p:sld xmlns:a="http://schemas.openxmlformats.org/drawingml/2006/main" xmlns:r="http://schemas.openxmlformats.org/officeDocument/2006/relationships" xmlns:p="http://schemas.openxmlformats.org/presentationml/2006/main">
+  <p:cSld>
+    <p:spTree>
+      <p:nvGrpSpPr>
+        <p:cNvPr id="1" name=""/>
+        <p:cNvGrpSpPr/>
+        <p:nvPr/>
+      </p:nvGrpSpPr>
+      <p:grpSpPr>
+        <a:xfrm>
+          <a:off x="0" y="0"/>
+          <a:ext cx="0" cy="0"/>
+          <a:chOff x="0" y="0"/>
+          <a:chExt cx="0" cy="0"/>
+        </a:xfrm>
+      </p:grpSpPr>
+      <p:sp>
+        <p:nvSpPr>
+          <p:cNvPr id="4" name="TextBox 3">
+            <a:extLst>
+              <a:ext uri="{FF2B5EF4-FFF2-40B4-BE49-F238E27FC236}">
+                <a16:creationId xmlns:a16="http://schemas.microsoft.com/office/drawing/2014/main" id="{18767206-9205-42D0-A2AE-5A1017D4CB08}"/>
+              </a:ext>
+            </a:extLst>
+          </p:cNvPr>
+          <p:cNvSpPr txBox="1"/>
+          <p:nvPr/>
+        </p:nvSpPr>
+        <p:spPr>
+          <a:xfrm>
+            <a:off x="92766" y="0"/>
+            <a:ext cx="11781182" cy="461665"/>
+          </a:xfrm>
+          <a:prstGeom prst="rect">
+            <a:avLst/>
+          </a:prstGeom>
+          <a:noFill/>
+        </p:spPr>
+        <p:txBody>
+          <a:bodyPr wrap="square" rtlCol="0">
+            <a:spAutoFit/>
+          </a:bodyPr>
+          <a:lstStyle/>
+          <a:p>
+            <a:r>
+              <a:rPr lang="en-GB" sz="2400" b="1" dirty="0"/>
+              <a:t>Console output</a:t>
+            </a:r>
+            <a:endParaRPr lang="en-GB" sz="2400" dirty="0"/>
+          </a:p>
+        </p:txBody>
+      </p:sp>
+      <p:pic>
+        <p:nvPicPr>
+          <p:cNvPr id="2" name="Picture 1">
+            <a:extLst>
+              <a:ext uri="{FF2B5EF4-FFF2-40B4-BE49-F238E27FC236}">
+                <a16:creationId xmlns:a16="http://schemas.microsoft.com/office/drawing/2014/main" id="{ADE4BFCB-E35D-465C-8495-BF8ACF04310A}"/>
+              </a:ext>
+            </a:extLst>
+          </p:cNvPr>
+          <p:cNvPicPr>
+            <a:picLocks noChangeAspect="1"/>
+          </p:cNvPicPr>
+          <p:nvPr/>
+        </p:nvPicPr>
+        <p:blipFill>
+          <a:blip r:embed="rId2"/>
+          <a:stretch>
+            <a:fillRect/>
+          </a:stretch>
+        </p:blipFill>
+        <p:spPr>
+          <a:xfrm>
+            <a:off x="92766" y="461664"/>
+            <a:ext cx="10465697" cy="6341797"/>
+          </a:xfrm>
+          <a:prstGeom prst="rect">
+            <a:avLst/>
+          </a:prstGeom>
+        </p:spPr>
+      </p:pic>
+    </p:spTree>
+    <p:extLst>
+      <p:ext uri="{BB962C8B-B14F-4D97-AF65-F5344CB8AC3E}">
+        <p14:creationId xmlns:p14="http://schemas.microsoft.com/office/powerpoint/2010/main" val="3178368922"/>
+      </p:ext>
+    </p:extLst>
+  </p:cSld>
+  <p:clrMapOvr>
+    <a:masterClrMapping/>
+  </p:clrMapOvr>
+</p:sld>
+</file>
+
+<file path=ppt/slides/slide24.xml><?xml version="1.0" encoding="utf-8"?>
 <p:sld xmlns:a="http://schemas.openxmlformats.org/drawingml/2006/main" xmlns:r="http://schemas.openxmlformats.org/officeDocument/2006/relationships" xmlns:p="http://schemas.openxmlformats.org/presentationml/2006/main">
   <p:cSld>
     <p:spTree>
@@ -7775,7 +8618,7 @@
 </p:sld>
 </file>
 
-<file path=ppt/slides/slide17.xml><?xml version="1.0" encoding="utf-8"?>
+<file path=ppt/slides/slide25.xml><?xml version="1.0" encoding="utf-8"?>
 <p:sld xmlns:a="http://schemas.openxmlformats.org/drawingml/2006/main" xmlns:r="http://schemas.openxmlformats.org/officeDocument/2006/relationships" xmlns:p="http://schemas.openxmlformats.org/presentationml/2006/main">
   <p:cSld>
     <p:spTree>
@@ -7841,11 +8684,11 @@
             </a:r>
             <a:r>
               <a:rPr lang="en-GB" sz="2200" b="1" dirty="0"/>
-              <a:t>unless you’re using ASP.NET</a:t>
+              <a:t>unless you’re using building a web application </a:t>
             </a:r>
             <a:r>
               <a:rPr lang="en-GB" sz="2200" dirty="0"/>
-              <a:t> (more on this later). </a:t>
+              <a:t>(more on this later). </a:t>
             </a:r>
           </a:p>
           <a:p>
@@ -7947,7 +8790,7 @@
 </p:sld>
 </file>
 
-<file path=ppt/slides/slide18.xml><?xml version="1.0" encoding="utf-8"?>
+<file path=ppt/slides/slide26.xml><?xml version="1.0" encoding="utf-8"?>
 <p:sld xmlns:a="http://schemas.openxmlformats.org/drawingml/2006/main" xmlns:r="http://schemas.openxmlformats.org/officeDocument/2006/relationships" xmlns:p="http://schemas.openxmlformats.org/presentationml/2006/main">
   <p:cSld>
     <p:spTree>
@@ -8159,7 +9002,7 @@
 </p:sld>
 </file>
 
-<file path=ppt/slides/slide19.xml><?xml version="1.0" encoding="utf-8"?>
+<file path=ppt/slides/slide27.xml><?xml version="1.0" encoding="utf-8"?>
 <p:sld xmlns:a="http://schemas.openxmlformats.org/drawingml/2006/main" xmlns:r="http://schemas.openxmlformats.org/officeDocument/2006/relationships" xmlns:p="http://schemas.openxmlformats.org/presentationml/2006/main">
   <p:cSld>
     <p:spTree>
@@ -9260,7 +10103,7 @@
 </p:sld>
 </file>
 
-<file path=ppt/slides/slide2.xml><?xml version="1.0" encoding="utf-8"?>
+<file path=ppt/slides/slide28.xml><?xml version="1.0" encoding="utf-8"?>
 <p:sld xmlns:a="http://schemas.openxmlformats.org/drawingml/2006/main" xmlns:r="http://schemas.openxmlformats.org/officeDocument/2006/relationships" xmlns:p="http://schemas.openxmlformats.org/presentationml/2006/main">
   <p:cSld>
     <p:spTree>
@@ -9279,36 +10122,141 @@
       </p:grpSpPr>
       <p:sp>
         <p:nvSpPr>
-          <p:cNvPr id="2" name="Title 1">
+          <p:cNvPr id="4" name="TextBox 3">
             <a:extLst>
               <a:ext uri="{FF2B5EF4-FFF2-40B4-BE49-F238E27FC236}">
-                <a16:creationId xmlns:a16="http://schemas.microsoft.com/office/drawing/2014/main" id="{267862F2-D4D4-4F5B-B69F-65226C837768}"/>
+                <a16:creationId xmlns:a16="http://schemas.microsoft.com/office/drawing/2014/main" id="{18767206-9205-42D0-A2AE-5A1017D4CB08}"/>
               </a:ext>
             </a:extLst>
           </p:cNvPr>
-          <p:cNvSpPr>
-            <a:spLocks noGrp="1"/>
-          </p:cNvSpPr>
-          <p:nvPr>
-            <p:ph type="ctrTitle"/>
-          </p:nvPr>
+          <p:cNvSpPr txBox="1"/>
+          <p:nvPr/>
         </p:nvSpPr>
-        <p:spPr/>
+        <p:spPr>
+          <a:xfrm>
+            <a:off x="278297" y="212034"/>
+            <a:ext cx="11781182" cy="6524863"/>
+          </a:xfrm>
+          <a:prstGeom prst="rect">
+            <a:avLst/>
+          </a:prstGeom>
+          <a:noFill/>
+        </p:spPr>
         <p:txBody>
-          <a:bodyPr/>
+          <a:bodyPr wrap="square" rtlCol="0">
+            <a:spAutoFit/>
+          </a:bodyPr>
           <a:lstStyle/>
           <a:p>
             <a:r>
-              <a:rPr lang="en-GB" dirty="0"/>
-              <a:t>Task, Task&lt;T&gt;, Thread and </a:t>
-            </a:r>
-            <a:r>
-              <a:rPr lang="en-GB" dirty="0" err="1"/>
-              <a:t>ThreadPool</a:t>
-            </a:r>
-            <a:r>
-              <a:rPr lang="en-GB" dirty="0"/>
-              <a:t> classes in C#</a:t>
+              <a:rPr lang="en-GB" sz="2200" b="1" dirty="0"/>
+              <a:t>Multithreading is not for everyone</a:t>
+            </a:r>
+          </a:p>
+          <a:p>
+            <a:endParaRPr lang="en-GB" sz="2200" b="1" dirty="0"/>
+          </a:p>
+          <a:p>
+            <a:r>
+              <a:rPr lang="en-GB" sz="2200" b="1" dirty="0"/>
+              <a:t>Native applications love multithreading</a:t>
+            </a:r>
+          </a:p>
+          <a:p>
+            <a:pPr marL="342900" indent="-342900">
+              <a:buFont typeface="Arial" panose="020B0604020202020204" pitchFamily="34" charset="0"/>
+              <a:buChar char="•"/>
+            </a:pPr>
+            <a:r>
+              <a:rPr lang="en-GB" sz="2200" dirty="0"/>
+              <a:t>Native applications (i.e. desktop and mobile applications) only have one user at a time. As a result, you can essentially throw threads at a problem in order to provide the best performance. This particular user having the best performance won’t affect other users. </a:t>
+            </a:r>
+          </a:p>
+          <a:p>
+            <a:pPr marL="342900" indent="-342900">
+              <a:buFont typeface="Arial" panose="020B0604020202020204" pitchFamily="34" charset="0"/>
+              <a:buChar char="•"/>
+            </a:pPr>
+            <a:r>
+              <a:rPr lang="en-GB" sz="2200" dirty="0"/>
+              <a:t>Horizontal scaling (running the application across multiple devices) is not a concept which applies here. </a:t>
+            </a:r>
+          </a:p>
+          <a:p>
+            <a:pPr marL="342900" indent="-342900">
+              <a:buFont typeface="Arial" panose="020B0604020202020204" pitchFamily="34" charset="0"/>
+              <a:buChar char="•"/>
+            </a:pPr>
+            <a:r>
+              <a:rPr lang="en-GB" sz="2200" dirty="0"/>
+              <a:t>Vertical scaling (providing greater performance when given a more powerful device) applies but isn’t going to happen unless the user themselves physically switches to a better machine. It isn’t an area to focus on.</a:t>
+            </a:r>
+          </a:p>
+          <a:p>
+            <a:pPr marL="342900" indent="-342900">
+              <a:buFont typeface="Arial" panose="020B0604020202020204" pitchFamily="34" charset="0"/>
+              <a:buChar char="•"/>
+            </a:pPr>
+            <a:endParaRPr lang="en-GB" sz="2200" dirty="0"/>
+          </a:p>
+          <a:p>
+            <a:r>
+              <a:rPr lang="en-GB" sz="2200" b="1" dirty="0"/>
+              <a:t>Multithreading will kill your web application </a:t>
+            </a:r>
+          </a:p>
+          <a:p>
+            <a:pPr marL="342900" indent="-342900">
+              <a:buFont typeface="Arial" panose="020B0604020202020204" pitchFamily="34" charset="0"/>
+              <a:buChar char="•"/>
+            </a:pPr>
+            <a:r>
+              <a:rPr lang="en-GB" sz="2200" dirty="0"/>
+              <a:t>Web applications (e.g. ASP.NET MVC / </a:t>
+            </a:r>
+            <a:r>
+              <a:rPr lang="en-GB" sz="2200" dirty="0" err="1"/>
+              <a:t>WebAPI</a:t>
+            </a:r>
+            <a:r>
+              <a:rPr lang="en-GB" sz="2200" dirty="0"/>
+              <a:t> project) need to respond to HTTP requests. </a:t>
+            </a:r>
+            <a:r>
+              <a:rPr lang="en-GB" sz="2200" b="1" dirty="0"/>
+              <a:t>Each HTTP request requires its own thread</a:t>
+            </a:r>
+            <a:r>
+              <a:rPr lang="en-GB" sz="2200" dirty="0"/>
+              <a:t>. As a result, </a:t>
+            </a:r>
+            <a:r>
+              <a:rPr lang="en-GB" sz="2200" b="1" dirty="0"/>
+              <a:t>you must only use them for handling requests</a:t>
+            </a:r>
+            <a:r>
+              <a:rPr lang="en-GB" sz="2200" dirty="0"/>
+              <a:t>.</a:t>
+            </a:r>
+          </a:p>
+          <a:p>
+            <a:pPr marL="342900" indent="-342900">
+              <a:buFont typeface="Arial" panose="020B0604020202020204" pitchFamily="34" charset="0"/>
+              <a:buChar char="•"/>
+            </a:pPr>
+            <a:r>
+              <a:rPr lang="en-GB" sz="2200" dirty="0"/>
+              <a:t>Horizontal scaling is critical to web applications. Each node in your cluster must be able to respond to as many requests as possible.</a:t>
+            </a:r>
+          </a:p>
+          <a:p>
+            <a:pPr marL="342900" indent="-342900">
+              <a:buFont typeface="Arial" panose="020B0604020202020204" pitchFamily="34" charset="0"/>
+              <a:buChar char="•"/>
+            </a:pPr>
+            <a:r>
+              <a:rPr lang="en-GB" sz="2200" dirty="0"/>
+              <a:t>Vertical scaling is expensive so you must make sure you serve the most requests possible out of your new expensive servers. </a:t>
             </a:r>
           </a:p>
         </p:txBody>
@@ -9316,7 +10264,7 @@
     </p:spTree>
     <p:extLst>
       <p:ext uri="{BB962C8B-B14F-4D97-AF65-F5344CB8AC3E}">
-        <p14:creationId xmlns:p14="http://schemas.microsoft.com/office/powerpoint/2010/main" val="2052231843"/>
+        <p14:creationId xmlns:p14="http://schemas.microsoft.com/office/powerpoint/2010/main" val="1919573543"/>
       </p:ext>
     </p:extLst>
   </p:cSld>

</xml_diff>

<commit_message>
Refactor and updated slides
</commit_message>
<xml_diff>
--- a/Async and await presentation.pptx
+++ b/Async and await presentation.pptx
@@ -22,21 +22,28 @@
     <p:sldId id="269" r:id="rId16"/>
     <p:sldId id="280" r:id="rId17"/>
     <p:sldId id="281" r:id="rId18"/>
-    <p:sldId id="270" r:id="rId19"/>
-    <p:sldId id="282" r:id="rId20"/>
-    <p:sldId id="283" r:id="rId21"/>
-    <p:sldId id="274" r:id="rId22"/>
-    <p:sldId id="284" r:id="rId23"/>
-    <p:sldId id="285" r:id="rId24"/>
-    <p:sldId id="272" r:id="rId25"/>
-    <p:sldId id="273" r:id="rId26"/>
-    <p:sldId id="275" r:id="rId27"/>
-    <p:sldId id="276" r:id="rId28"/>
-    <p:sldId id="286" r:id="rId29"/>
-    <p:sldId id="277" r:id="rId30"/>
-    <p:sldId id="287" r:id="rId31"/>
-    <p:sldId id="288" r:id="rId32"/>
-    <p:sldId id="289" r:id="rId33"/>
+    <p:sldId id="295" r:id="rId19"/>
+    <p:sldId id="270" r:id="rId20"/>
+    <p:sldId id="282" r:id="rId21"/>
+    <p:sldId id="283" r:id="rId22"/>
+    <p:sldId id="274" r:id="rId23"/>
+    <p:sldId id="284" r:id="rId24"/>
+    <p:sldId id="285" r:id="rId25"/>
+    <p:sldId id="272" r:id="rId26"/>
+    <p:sldId id="273" r:id="rId27"/>
+    <p:sldId id="275" r:id="rId28"/>
+    <p:sldId id="276" r:id="rId29"/>
+    <p:sldId id="286" r:id="rId30"/>
+    <p:sldId id="290" r:id="rId31"/>
+    <p:sldId id="277" r:id="rId32"/>
+    <p:sldId id="287" r:id="rId33"/>
+    <p:sldId id="288" r:id="rId34"/>
+    <p:sldId id="289" r:id="rId35"/>
+    <p:sldId id="293" r:id="rId36"/>
+    <p:sldId id="292" r:id="rId37"/>
+    <p:sldId id="294" r:id="rId38"/>
+    <p:sldId id="296" r:id="rId39"/>
+    <p:sldId id="297" r:id="rId40"/>
   </p:sldIdLst>
   <p:sldSz cx="12192000" cy="6858000"/>
   <p:notesSz cx="6858000" cy="9144000"/>
@@ -143,10 +150,6 @@
 </p:presentation>
 </file>
 
-<file path=ppt/revisionInfo.xml><?xml version="1.0" encoding="utf-8"?>
-<p1510:revInfo xmlns:a="http://schemas.openxmlformats.org/drawingml/2006/main" xmlns:r="http://schemas.openxmlformats.org/officeDocument/2006/relationships" xmlns:p1510="http://schemas.microsoft.com/office/powerpoint/2015/10/main"/>
-</file>
-
 <file path=ppt/slideLayouts/slideLayout1.xml><?xml version="1.0" encoding="utf-8"?>
 <p:sldLayout xmlns:a="http://schemas.openxmlformats.org/drawingml/2006/main" xmlns:r="http://schemas.openxmlformats.org/officeDocument/2006/relationships" xmlns:p="http://schemas.openxmlformats.org/presentationml/2006/main" type="title" preserve="1">
   <p:cSld name="Title Slide">
@@ -296,7 +299,7 @@
           <a:p>
             <a:fld id="{BFEF692B-FC3E-4552-B87F-4B5A00EB12B2}" type="datetimeFigureOut">
               <a:rPr lang="en-GB" smtClean="0"/>
-              <a:t>26/11/2018</a:t>
+              <a:t>29/11/2018</a:t>
             </a:fld>
             <a:endParaRPr lang="en-GB"/>
           </a:p>
@@ -496,7 +499,7 @@
           <a:p>
             <a:fld id="{BFEF692B-FC3E-4552-B87F-4B5A00EB12B2}" type="datetimeFigureOut">
               <a:rPr lang="en-GB" smtClean="0"/>
-              <a:t>26/11/2018</a:t>
+              <a:t>29/11/2018</a:t>
             </a:fld>
             <a:endParaRPr lang="en-GB"/>
           </a:p>
@@ -706,7 +709,7 @@
           <a:p>
             <a:fld id="{BFEF692B-FC3E-4552-B87F-4B5A00EB12B2}" type="datetimeFigureOut">
               <a:rPr lang="en-GB" smtClean="0"/>
-              <a:t>26/11/2018</a:t>
+              <a:t>29/11/2018</a:t>
             </a:fld>
             <a:endParaRPr lang="en-GB"/>
           </a:p>
@@ -906,7 +909,7 @@
           <a:p>
             <a:fld id="{BFEF692B-FC3E-4552-B87F-4B5A00EB12B2}" type="datetimeFigureOut">
               <a:rPr lang="en-GB" smtClean="0"/>
-              <a:t>26/11/2018</a:t>
+              <a:t>29/11/2018</a:t>
             </a:fld>
             <a:endParaRPr lang="en-GB"/>
           </a:p>
@@ -1182,7 +1185,7 @@
           <a:p>
             <a:fld id="{BFEF692B-FC3E-4552-B87F-4B5A00EB12B2}" type="datetimeFigureOut">
               <a:rPr lang="en-GB" smtClean="0"/>
-              <a:t>26/11/2018</a:t>
+              <a:t>29/11/2018</a:t>
             </a:fld>
             <a:endParaRPr lang="en-GB"/>
           </a:p>
@@ -1450,7 +1453,7 @@
           <a:p>
             <a:fld id="{BFEF692B-FC3E-4552-B87F-4B5A00EB12B2}" type="datetimeFigureOut">
               <a:rPr lang="en-GB" smtClean="0"/>
-              <a:t>26/11/2018</a:t>
+              <a:t>29/11/2018</a:t>
             </a:fld>
             <a:endParaRPr lang="en-GB"/>
           </a:p>
@@ -1865,7 +1868,7 @@
           <a:p>
             <a:fld id="{BFEF692B-FC3E-4552-B87F-4B5A00EB12B2}" type="datetimeFigureOut">
               <a:rPr lang="en-GB" smtClean="0"/>
-              <a:t>26/11/2018</a:t>
+              <a:t>29/11/2018</a:t>
             </a:fld>
             <a:endParaRPr lang="en-GB"/>
           </a:p>
@@ -2007,7 +2010,7 @@
           <a:p>
             <a:fld id="{BFEF692B-FC3E-4552-B87F-4B5A00EB12B2}" type="datetimeFigureOut">
               <a:rPr lang="en-GB" smtClean="0"/>
-              <a:t>26/11/2018</a:t>
+              <a:t>29/11/2018</a:t>
             </a:fld>
             <a:endParaRPr lang="en-GB"/>
           </a:p>
@@ -2120,7 +2123,7 @@
           <a:p>
             <a:fld id="{BFEF692B-FC3E-4552-B87F-4B5A00EB12B2}" type="datetimeFigureOut">
               <a:rPr lang="en-GB" smtClean="0"/>
-              <a:t>26/11/2018</a:t>
+              <a:t>29/11/2018</a:t>
             </a:fld>
             <a:endParaRPr lang="en-GB"/>
           </a:p>
@@ -2433,7 +2436,7 @@
           <a:p>
             <a:fld id="{BFEF692B-FC3E-4552-B87F-4B5A00EB12B2}" type="datetimeFigureOut">
               <a:rPr lang="en-GB" smtClean="0"/>
-              <a:t>26/11/2018</a:t>
+              <a:t>29/11/2018</a:t>
             </a:fld>
             <a:endParaRPr lang="en-GB"/>
           </a:p>
@@ -2722,7 +2725,7 @@
           <a:p>
             <a:fld id="{BFEF692B-FC3E-4552-B87F-4B5A00EB12B2}" type="datetimeFigureOut">
               <a:rPr lang="en-GB" smtClean="0"/>
-              <a:t>26/11/2018</a:t>
+              <a:t>29/11/2018</a:t>
             </a:fld>
             <a:endParaRPr lang="en-GB"/>
           </a:p>
@@ -2965,7 +2968,7 @@
           <a:p>
             <a:fld id="{BFEF692B-FC3E-4552-B87F-4B5A00EB12B2}" type="datetimeFigureOut">
               <a:rPr lang="en-GB" smtClean="0"/>
-              <a:t>26/11/2018</a:t>
+              <a:t>29/11/2018</a:t>
             </a:fld>
             <a:endParaRPr lang="en-GB"/>
           </a:p>
@@ -4871,6 +4874,71 @@
       </p:grpSpPr>
       <p:sp>
         <p:nvSpPr>
+          <p:cNvPr id="2" name="Title 1">
+            <a:extLst>
+              <a:ext uri="{FF2B5EF4-FFF2-40B4-BE49-F238E27FC236}">
+                <a16:creationId xmlns:a16="http://schemas.microsoft.com/office/drawing/2014/main" id="{267862F2-D4D4-4F5B-B69F-65226C837768}"/>
+              </a:ext>
+            </a:extLst>
+          </p:cNvPr>
+          <p:cNvSpPr>
+            <a:spLocks noGrp="1"/>
+          </p:cNvSpPr>
+          <p:nvPr>
+            <p:ph type="ctrTitle"/>
+          </p:nvPr>
+        </p:nvSpPr>
+        <p:spPr>
+          <a:xfrm>
+            <a:off x="1524000" y="1122363"/>
+            <a:ext cx="9144000" cy="1991898"/>
+          </a:xfrm>
+        </p:spPr>
+        <p:txBody>
+          <a:bodyPr>
+            <a:normAutofit/>
+          </a:bodyPr>
+          <a:lstStyle/>
+          <a:p>
+            <a:r>
+              <a:rPr lang="en-GB" dirty="0"/>
+              <a:t>How does multithreading fit into this?</a:t>
+            </a:r>
+          </a:p>
+        </p:txBody>
+      </p:sp>
+    </p:spTree>
+    <p:extLst>
+      <p:ext uri="{BB962C8B-B14F-4D97-AF65-F5344CB8AC3E}">
+        <p14:creationId xmlns:p14="http://schemas.microsoft.com/office/powerpoint/2010/main" val="3211782034"/>
+      </p:ext>
+    </p:extLst>
+  </p:cSld>
+  <p:clrMapOvr>
+    <a:masterClrMapping/>
+  </p:clrMapOvr>
+</p:sld>
+</file>
+
+<file path=ppt/slides/slide19.xml><?xml version="1.0" encoding="utf-8"?>
+<p:sld xmlns:a="http://schemas.openxmlformats.org/drawingml/2006/main" xmlns:r="http://schemas.openxmlformats.org/officeDocument/2006/relationships" xmlns:p="http://schemas.openxmlformats.org/presentationml/2006/main">
+  <p:cSld>
+    <p:spTree>
+      <p:nvGrpSpPr>
+        <p:cNvPr id="1" name=""/>
+        <p:cNvGrpSpPr/>
+        <p:nvPr/>
+      </p:nvGrpSpPr>
+      <p:grpSpPr>
+        <a:xfrm>
+          <a:off x="0" y="0"/>
+          <a:ext cx="0" cy="0"/>
+          <a:chOff x="0" y="0"/>
+          <a:chExt cx="0" cy="0"/>
+        </a:xfrm>
+      </p:grpSpPr>
+      <p:sp>
+        <p:nvSpPr>
           <p:cNvPr id="4" name="TextBox 3">
             <a:extLst>
               <a:ext uri="{FF2B5EF4-FFF2-40B4-BE49-F238E27FC236}">
@@ -6646,102 +6714,6 @@
 </p:sld>
 </file>
 
-<file path=ppt/slides/slide19.xml><?xml version="1.0" encoding="utf-8"?>
-<p:sld xmlns:a="http://schemas.openxmlformats.org/drawingml/2006/main" xmlns:r="http://schemas.openxmlformats.org/officeDocument/2006/relationships" xmlns:p="http://schemas.openxmlformats.org/presentationml/2006/main">
-  <p:cSld>
-    <p:spTree>
-      <p:nvGrpSpPr>
-        <p:cNvPr id="1" name=""/>
-        <p:cNvGrpSpPr/>
-        <p:nvPr/>
-      </p:nvGrpSpPr>
-      <p:grpSpPr>
-        <a:xfrm>
-          <a:off x="0" y="0"/>
-          <a:ext cx="0" cy="0"/>
-          <a:chOff x="0" y="0"/>
-          <a:chExt cx="0" cy="0"/>
-        </a:xfrm>
-      </p:grpSpPr>
-      <p:sp>
-        <p:nvSpPr>
-          <p:cNvPr id="4" name="TextBox 3">
-            <a:extLst>
-              <a:ext uri="{FF2B5EF4-FFF2-40B4-BE49-F238E27FC236}">
-                <a16:creationId xmlns:a16="http://schemas.microsoft.com/office/drawing/2014/main" id="{18767206-9205-42D0-A2AE-5A1017D4CB08}"/>
-              </a:ext>
-            </a:extLst>
-          </p:cNvPr>
-          <p:cNvSpPr txBox="1"/>
-          <p:nvPr/>
-        </p:nvSpPr>
-        <p:spPr>
-          <a:xfrm>
-            <a:off x="92766" y="0"/>
-            <a:ext cx="11781182" cy="461665"/>
-          </a:xfrm>
-          <a:prstGeom prst="rect">
-            <a:avLst/>
-          </a:prstGeom>
-          <a:noFill/>
-        </p:spPr>
-        <p:txBody>
-          <a:bodyPr wrap="square" rtlCol="0">
-            <a:spAutoFit/>
-          </a:bodyPr>
-          <a:lstStyle/>
-          <a:p>
-            <a:r>
-              <a:rPr lang="en-GB" sz="2400" b="1" dirty="0"/>
-              <a:t>C# code</a:t>
-            </a:r>
-            <a:endParaRPr lang="en-GB" sz="2400" dirty="0"/>
-          </a:p>
-        </p:txBody>
-      </p:sp>
-      <p:pic>
-        <p:nvPicPr>
-          <p:cNvPr id="2" name="Picture 1">
-            <a:extLst>
-              <a:ext uri="{FF2B5EF4-FFF2-40B4-BE49-F238E27FC236}">
-                <a16:creationId xmlns:a16="http://schemas.microsoft.com/office/drawing/2014/main" id="{471C1663-CEED-4B2D-BE1A-673138594107}"/>
-              </a:ext>
-            </a:extLst>
-          </p:cNvPr>
-          <p:cNvPicPr>
-            <a:picLocks noChangeAspect="1"/>
-          </p:cNvPicPr>
-          <p:nvPr/>
-        </p:nvPicPr>
-        <p:blipFill>
-          <a:blip r:embed="rId2"/>
-          <a:stretch>
-            <a:fillRect/>
-          </a:stretch>
-        </p:blipFill>
-        <p:spPr>
-          <a:xfrm>
-            <a:off x="-1" y="561678"/>
-            <a:ext cx="12176261" cy="4696121"/>
-          </a:xfrm>
-          <a:prstGeom prst="rect">
-            <a:avLst/>
-          </a:prstGeom>
-        </p:spPr>
-      </p:pic>
-    </p:spTree>
-    <p:extLst>
-      <p:ext uri="{BB962C8B-B14F-4D97-AF65-F5344CB8AC3E}">
-        <p14:creationId xmlns:p14="http://schemas.microsoft.com/office/powerpoint/2010/main" val="1810673536"/>
-      </p:ext>
-    </p:extLst>
-  </p:cSld>
-  <p:clrMapOvr>
-    <a:masterClrMapping/>
-  </p:clrMapOvr>
-</p:sld>
-</file>
-
 <file path=ppt/slides/slide2.xml><?xml version="1.0" encoding="utf-8"?>
 <p:sld xmlns:a="http://schemas.openxmlformats.org/drawingml/2006/main" xmlns:r="http://schemas.openxmlformats.org/officeDocument/2006/relationships" xmlns:p="http://schemas.openxmlformats.org/presentationml/2006/main">
   <p:cSld>
@@ -6855,6 +6827,102 @@
           <a:p>
             <a:r>
               <a:rPr lang="en-GB" sz="2400" b="1" dirty="0"/>
+              <a:t>C# code</a:t>
+            </a:r>
+            <a:endParaRPr lang="en-GB" sz="2400" dirty="0"/>
+          </a:p>
+        </p:txBody>
+      </p:sp>
+      <p:pic>
+        <p:nvPicPr>
+          <p:cNvPr id="2" name="Picture 1">
+            <a:extLst>
+              <a:ext uri="{FF2B5EF4-FFF2-40B4-BE49-F238E27FC236}">
+                <a16:creationId xmlns:a16="http://schemas.microsoft.com/office/drawing/2014/main" id="{471C1663-CEED-4B2D-BE1A-673138594107}"/>
+              </a:ext>
+            </a:extLst>
+          </p:cNvPr>
+          <p:cNvPicPr>
+            <a:picLocks noChangeAspect="1"/>
+          </p:cNvPicPr>
+          <p:nvPr/>
+        </p:nvPicPr>
+        <p:blipFill>
+          <a:blip r:embed="rId2"/>
+          <a:stretch>
+            <a:fillRect/>
+          </a:stretch>
+        </p:blipFill>
+        <p:spPr>
+          <a:xfrm>
+            <a:off x="-1" y="561678"/>
+            <a:ext cx="12176261" cy="4696121"/>
+          </a:xfrm>
+          <a:prstGeom prst="rect">
+            <a:avLst/>
+          </a:prstGeom>
+        </p:spPr>
+      </p:pic>
+    </p:spTree>
+    <p:extLst>
+      <p:ext uri="{BB962C8B-B14F-4D97-AF65-F5344CB8AC3E}">
+        <p14:creationId xmlns:p14="http://schemas.microsoft.com/office/powerpoint/2010/main" val="1810673536"/>
+      </p:ext>
+    </p:extLst>
+  </p:cSld>
+  <p:clrMapOvr>
+    <a:masterClrMapping/>
+  </p:clrMapOvr>
+</p:sld>
+</file>
+
+<file path=ppt/slides/slide21.xml><?xml version="1.0" encoding="utf-8"?>
+<p:sld xmlns:a="http://schemas.openxmlformats.org/drawingml/2006/main" xmlns:r="http://schemas.openxmlformats.org/officeDocument/2006/relationships" xmlns:p="http://schemas.openxmlformats.org/presentationml/2006/main">
+  <p:cSld>
+    <p:spTree>
+      <p:nvGrpSpPr>
+        <p:cNvPr id="1" name=""/>
+        <p:cNvGrpSpPr/>
+        <p:nvPr/>
+      </p:nvGrpSpPr>
+      <p:grpSpPr>
+        <a:xfrm>
+          <a:off x="0" y="0"/>
+          <a:ext cx="0" cy="0"/>
+          <a:chOff x="0" y="0"/>
+          <a:chExt cx="0" cy="0"/>
+        </a:xfrm>
+      </p:grpSpPr>
+      <p:sp>
+        <p:nvSpPr>
+          <p:cNvPr id="4" name="TextBox 3">
+            <a:extLst>
+              <a:ext uri="{FF2B5EF4-FFF2-40B4-BE49-F238E27FC236}">
+                <a16:creationId xmlns:a16="http://schemas.microsoft.com/office/drawing/2014/main" id="{18767206-9205-42D0-A2AE-5A1017D4CB08}"/>
+              </a:ext>
+            </a:extLst>
+          </p:cNvPr>
+          <p:cNvSpPr txBox="1"/>
+          <p:nvPr/>
+        </p:nvSpPr>
+        <p:spPr>
+          <a:xfrm>
+            <a:off x="92766" y="0"/>
+            <a:ext cx="11781182" cy="461665"/>
+          </a:xfrm>
+          <a:prstGeom prst="rect">
+            <a:avLst/>
+          </a:prstGeom>
+          <a:noFill/>
+        </p:spPr>
+        <p:txBody>
+          <a:bodyPr wrap="square" rtlCol="0">
+            <a:spAutoFit/>
+          </a:bodyPr>
+          <a:lstStyle/>
+          <a:p>
+            <a:r>
+              <a:rPr lang="en-GB" sz="2400" b="1" dirty="0"/>
               <a:t>Console output</a:t>
             </a:r>
             <a:endParaRPr lang="en-GB" sz="2400" dirty="0"/>
@@ -6904,7 +6972,7 @@
 </p:sld>
 </file>
 
-<file path=ppt/slides/slide21.xml><?xml version="1.0" encoding="utf-8"?>
+<file path=ppt/slides/slide22.xml><?xml version="1.0" encoding="utf-8"?>
 <p:sld xmlns:a="http://schemas.openxmlformats.org/drawingml/2006/main" xmlns:r="http://schemas.openxmlformats.org/officeDocument/2006/relationships" xmlns:p="http://schemas.openxmlformats.org/presentationml/2006/main">
   <p:cSld>
     <p:spTree>
@@ -8266,7 +8334,7 @@
 </p:sld>
 </file>
 
-<file path=ppt/slides/slide22.xml><?xml version="1.0" encoding="utf-8"?>
+<file path=ppt/slides/slide23.xml><?xml version="1.0" encoding="utf-8"?>
 <p:sld xmlns:a="http://schemas.openxmlformats.org/drawingml/2006/main" xmlns:r="http://schemas.openxmlformats.org/officeDocument/2006/relationships" xmlns:p="http://schemas.openxmlformats.org/presentationml/2006/main">
   <p:cSld>
     <p:spTree>
@@ -8362,7 +8430,7 @@
 </p:sld>
 </file>
 
-<file path=ppt/slides/slide23.xml><?xml version="1.0" encoding="utf-8"?>
+<file path=ppt/slides/slide24.xml><?xml version="1.0" encoding="utf-8"?>
 <p:sld xmlns:a="http://schemas.openxmlformats.org/drawingml/2006/main" xmlns:r="http://schemas.openxmlformats.org/officeDocument/2006/relationships" xmlns:p="http://schemas.openxmlformats.org/presentationml/2006/main">
   <p:cSld>
     <p:spTree>
@@ -8458,7 +8526,7 @@
 </p:sld>
 </file>
 
-<file path=ppt/slides/slide24.xml><?xml version="1.0" encoding="utf-8"?>
+<file path=ppt/slides/slide25.xml><?xml version="1.0" encoding="utf-8"?>
 <p:sld xmlns:a="http://schemas.openxmlformats.org/drawingml/2006/main" xmlns:r="http://schemas.openxmlformats.org/officeDocument/2006/relationships" xmlns:p="http://schemas.openxmlformats.org/presentationml/2006/main">
   <p:cSld>
     <p:spTree>
@@ -8622,7 +8690,7 @@
 </p:sld>
 </file>
 
-<file path=ppt/slides/slide25.xml><?xml version="1.0" encoding="utf-8"?>
+<file path=ppt/slides/slide26.xml><?xml version="1.0" encoding="utf-8"?>
 <p:sld xmlns:a="http://schemas.openxmlformats.org/drawingml/2006/main" xmlns:r="http://schemas.openxmlformats.org/officeDocument/2006/relationships" xmlns:p="http://schemas.openxmlformats.org/presentationml/2006/main">
   <p:cSld>
     <p:spTree>
@@ -8794,7 +8862,7 @@
 </p:sld>
 </file>
 
-<file path=ppt/slides/slide26.xml><?xml version="1.0" encoding="utf-8"?>
+<file path=ppt/slides/slide27.xml><?xml version="1.0" encoding="utf-8"?>
 <p:sld xmlns:a="http://schemas.openxmlformats.org/drawingml/2006/main" xmlns:r="http://schemas.openxmlformats.org/officeDocument/2006/relationships" xmlns:p="http://schemas.openxmlformats.org/presentationml/2006/main">
   <p:cSld>
     <p:spTree>
@@ -9006,7 +9074,7 @@
 </p:sld>
 </file>
 
-<file path=ppt/slides/slide27.xml><?xml version="1.0" encoding="utf-8"?>
+<file path=ppt/slides/slide28.xml><?xml version="1.0" encoding="utf-8"?>
 <p:sld xmlns:a="http://schemas.openxmlformats.org/drawingml/2006/main" xmlns:r="http://schemas.openxmlformats.org/officeDocument/2006/relationships" xmlns:p="http://schemas.openxmlformats.org/presentationml/2006/main">
   <p:cSld>
     <p:spTree>
@@ -9974,7 +10042,18 @@
                   </a:schemeClr>
                 </a:solidFill>
               </a:rPr>
-              <a:t>excellent performance</a:t>
+              <a:t>performance</a:t>
+            </a:r>
+            <a:r>
+              <a:rPr lang="en-GB" dirty="0">
+                <a:solidFill>
+                  <a:schemeClr val="tx1">
+                    <a:lumMod val="95000"/>
+                    <a:lumOff val="5000"/>
+                  </a:schemeClr>
+                </a:solidFill>
+              </a:rPr>
+              <a:t> benefits</a:t>
             </a:r>
             <a:r>
               <a:rPr lang="en-GB" dirty="0"/>
@@ -10061,28 +10140,25 @@
                   <a:srgbClr val="FF0000"/>
                 </a:solidFill>
               </a:rPr>
-              <a:t>You should avoid anything synchronous whenever possible</a:t>
-            </a:r>
-            <a:r>
-              <a:rPr lang="en-GB" dirty="0"/>
-              <a:t>. </a:t>
-            </a:r>
+              <a:t>You should avoid synchronous scheduling when possible as it blocks threads.</a:t>
+            </a:r>
+            <a:br>
+              <a:rPr lang="en-GB" b="1" dirty="0">
+                <a:solidFill>
+                  <a:srgbClr val="FF0000"/>
+                </a:solidFill>
+              </a:rPr>
+            </a:br>
+            <a:endParaRPr lang="en-GB" dirty="0"/>
           </a:p>
           <a:p>
             <a:pPr marL="285750" indent="-285750">
               <a:buFont typeface="Arial" panose="020B0604020202020204" pitchFamily="34" charset="0"/>
               <a:buChar char="•"/>
             </a:pPr>
-            <a:endParaRPr lang="en-GB" dirty="0"/>
-          </a:p>
-          <a:p>
-            <a:pPr marL="285750" indent="-285750">
-              <a:buFont typeface="Arial" panose="020B0604020202020204" pitchFamily="34" charset="0"/>
-              <a:buChar char="•"/>
-            </a:pPr>
             <a:r>
               <a:rPr lang="en-GB" dirty="0"/>
-              <a:t>If you are forced to use synchronous scheduling, it’s best to use multiple threads but only if you have the resources available (i.e. it’s something like a native application and not a web application). </a:t>
+              <a:t>If you are forced to use synchronous scheduling, it’s best to use multiple threads but only if you have the resources available on the platform you’re running the application on. </a:t>
             </a:r>
           </a:p>
           <a:p>
@@ -10107,7 +10183,7 @@
 </p:sld>
 </file>
 
-<file path=ppt/slides/slide28.xml><?xml version="1.0" encoding="utf-8"?>
+<file path=ppt/slides/slide29.xml><?xml version="1.0" encoding="utf-8"?>
 <p:sld xmlns:a="http://schemas.openxmlformats.org/drawingml/2006/main" xmlns:r="http://schemas.openxmlformats.org/officeDocument/2006/relationships" xmlns:p="http://schemas.openxmlformats.org/presentationml/2006/main">
   <p:cSld>
     <p:spTree>
@@ -10161,35 +10237,31 @@
             <a:endParaRPr lang="en-GB" sz="2200" b="1" dirty="0"/>
           </a:p>
           <a:p>
-            <a:pPr marL="342900" indent="-342900">
-              <a:buFont typeface="Arial" panose="020B0604020202020204" pitchFamily="34" charset="0"/>
-              <a:buChar char="•"/>
-            </a:pPr>
-            <a:r>
-              <a:rPr lang="en-GB" sz="2200" b="1" dirty="0"/>
+            <a:r>
+              <a:rPr lang="en-GB" sz="2200" dirty="0"/>
               <a:t>Use </a:t>
             </a:r>
             <a:r>
-              <a:rPr lang="en-GB" sz="2200" b="1" dirty="0" err="1"/>
+              <a:rPr lang="en-GB" sz="2200" dirty="0" err="1"/>
               <a:t>Task.Run</a:t>
             </a:r>
             <a:r>
-              <a:rPr lang="en-GB" sz="2200" b="1" dirty="0"/>
+              <a:rPr lang="en-GB" sz="2200" dirty="0"/>
               <a:t>(</a:t>
             </a:r>
             <a:r>
-              <a:rPr lang="en-GB" sz="2200" b="1" dirty="0" err="1"/>
+              <a:rPr lang="en-GB" sz="2200" dirty="0" err="1"/>
               <a:t>someAction</a:t>
             </a:r>
             <a:r>
-              <a:rPr lang="en-GB" sz="2200" b="1" dirty="0"/>
-              <a:t>) to start a new thread, instead of </a:t>
-            </a:r>
-            <a:r>
-              <a:rPr lang="en-GB" sz="2200" b="1" dirty="0" err="1"/>
+              <a:rPr lang="en-GB" sz="2200" dirty="0"/>
+              <a:t>) to queue a task to run on a new thread, instead of </a:t>
+            </a:r>
+            <a:r>
+              <a:rPr lang="en-GB" sz="2200" dirty="0" err="1"/>
               <a:t>Task.Factory.StartNew</a:t>
             </a:r>
-            <a:endParaRPr lang="en-GB" sz="2200" b="1" dirty="0"/>
+            <a:endParaRPr lang="en-GB" sz="2200" dirty="0"/>
           </a:p>
           <a:p>
             <a:endParaRPr lang="en-GB" sz="2200" b="1" dirty="0"/>
@@ -10251,7 +10323,7 @@
         </p:blipFill>
         <p:spPr>
           <a:xfrm>
-            <a:off x="278297" y="3362938"/>
+            <a:off x="278297" y="2835435"/>
             <a:ext cx="11781182" cy="1088479"/>
           </a:xfrm>
           <a:prstGeom prst="rect">
@@ -10261,10 +10333,10 @@
       </p:pic>
       <p:sp>
         <p:nvSpPr>
-          <p:cNvPr id="7" name="TextBox 6">
+          <p:cNvPr id="5" name="TextBox 4">
             <a:extLst>
               <a:ext uri="{FF2B5EF4-FFF2-40B4-BE49-F238E27FC236}">
-                <a16:creationId xmlns:a16="http://schemas.microsoft.com/office/drawing/2014/main" id="{9CDC222A-52D0-42C6-B6D7-03797FBE8AA1}"/>
+                <a16:creationId xmlns:a16="http://schemas.microsoft.com/office/drawing/2014/main" id="{C79DC702-E82F-4CAC-8C0A-7048DFCCE463}"/>
               </a:ext>
             </a:extLst>
           </p:cNvPr>
@@ -10273,8 +10345,8 @@
         </p:nvSpPr>
         <p:spPr>
           <a:xfrm>
-            <a:off x="278297" y="4797287"/>
-            <a:ext cx="11569146" cy="2123658"/>
+            <a:off x="307596" y="5114321"/>
+            <a:ext cx="11576807" cy="430887"/>
           </a:xfrm>
           <a:prstGeom prst="rect">
             <a:avLst/>
@@ -10287,33 +10359,10 @@
           </a:bodyPr>
           <a:lstStyle/>
           <a:p>
-            <a:pPr marL="342900" indent="-342900">
-              <a:buFont typeface="Arial" panose="020B0604020202020204" pitchFamily="34" charset="0"/>
-              <a:buChar char="•"/>
-            </a:pPr>
-            <a:r>
-              <a:rPr lang="en-GB" sz="2200" b="1" dirty="0"/>
-              <a:t>You can do this in a web application, but you really shouldn’t</a:t>
-            </a:r>
-          </a:p>
-          <a:p>
+            <a:pPr algn="ctr"/>
             <a:r>
               <a:rPr lang="en-GB" sz="2200" dirty="0"/>
-              <a:t>If you absolutely must use multiple threads then you can, but you will starve your </a:t>
-            </a:r>
-            <a:r>
-              <a:rPr lang="en-GB" sz="2200" dirty="0" err="1"/>
-              <a:t>ThreadPool</a:t>
-            </a:r>
-            <a:r>
-              <a:rPr lang="en-GB" sz="2200" dirty="0"/>
-              <a:t> and reduce the number of requests you can receive. “fire and forget” methods are also dangerous as you have no guarantee your thread will survive after the HTTP request thread has finished. </a:t>
-            </a:r>
-          </a:p>
-          <a:p>
-            <a:r>
-              <a:rPr lang="en-GB" sz="2200" b="1" dirty="0"/>
-              <a:t> Best practice is to use one of various other techniques which allow you to schedule reliable background tasks in ASP.NET</a:t>
+              <a:t>Queueing a task to run on a new thread is easy…but should you really be doing it? </a:t>
             </a:r>
           </a:p>
         </p:txBody>
@@ -10322,177 +10371,6 @@
     <p:extLst>
       <p:ext uri="{BB962C8B-B14F-4D97-AF65-F5344CB8AC3E}">
         <p14:creationId xmlns:p14="http://schemas.microsoft.com/office/powerpoint/2010/main" val="274551446"/>
-      </p:ext>
-    </p:extLst>
-  </p:cSld>
-  <p:clrMapOvr>
-    <a:masterClrMapping/>
-  </p:clrMapOvr>
-</p:sld>
-</file>
-
-<file path=ppt/slides/slide29.xml><?xml version="1.0" encoding="utf-8"?>
-<p:sld xmlns:a="http://schemas.openxmlformats.org/drawingml/2006/main" xmlns:r="http://schemas.openxmlformats.org/officeDocument/2006/relationships" xmlns:p="http://schemas.openxmlformats.org/presentationml/2006/main">
-  <p:cSld>
-    <p:spTree>
-      <p:nvGrpSpPr>
-        <p:cNvPr id="1" name=""/>
-        <p:cNvGrpSpPr/>
-        <p:nvPr/>
-      </p:nvGrpSpPr>
-      <p:grpSpPr>
-        <a:xfrm>
-          <a:off x="0" y="0"/>
-          <a:ext cx="0" cy="0"/>
-          <a:chOff x="0" y="0"/>
-          <a:chExt cx="0" cy="0"/>
-        </a:xfrm>
-      </p:grpSpPr>
-      <p:sp>
-        <p:nvSpPr>
-          <p:cNvPr id="4" name="TextBox 3">
-            <a:extLst>
-              <a:ext uri="{FF2B5EF4-FFF2-40B4-BE49-F238E27FC236}">
-                <a16:creationId xmlns:a16="http://schemas.microsoft.com/office/drawing/2014/main" id="{18767206-9205-42D0-A2AE-5A1017D4CB08}"/>
-              </a:ext>
-            </a:extLst>
-          </p:cNvPr>
-          <p:cNvSpPr txBox="1"/>
-          <p:nvPr/>
-        </p:nvSpPr>
-        <p:spPr>
-          <a:xfrm>
-            <a:off x="278297" y="212034"/>
-            <a:ext cx="11781182" cy="6524863"/>
-          </a:xfrm>
-          <a:prstGeom prst="rect">
-            <a:avLst/>
-          </a:prstGeom>
-          <a:noFill/>
-        </p:spPr>
-        <p:txBody>
-          <a:bodyPr wrap="square" rtlCol="0">
-            <a:spAutoFit/>
-          </a:bodyPr>
-          <a:lstStyle/>
-          <a:p>
-            <a:r>
-              <a:rPr lang="en-GB" sz="2200" b="1" dirty="0"/>
-              <a:t>Multithreading is not for everyone</a:t>
-            </a:r>
-          </a:p>
-          <a:p>
-            <a:endParaRPr lang="en-GB" sz="2200" b="1" dirty="0"/>
-          </a:p>
-          <a:p>
-            <a:r>
-              <a:rPr lang="en-GB" sz="2200" b="1" dirty="0"/>
-              <a:t>Native applications love multithreading</a:t>
-            </a:r>
-          </a:p>
-          <a:p>
-            <a:pPr marL="342900" indent="-342900">
-              <a:buFont typeface="Arial" panose="020B0604020202020204" pitchFamily="34" charset="0"/>
-              <a:buChar char="•"/>
-            </a:pPr>
-            <a:r>
-              <a:rPr lang="en-GB" sz="2200" dirty="0"/>
-              <a:t>Native applications (i.e. desktop and mobile applications) only have one user at a time. As a result, you can essentially throw threads at a problem in order to provide the best performance. This particular user having the best performance won’t affect other users. </a:t>
-            </a:r>
-          </a:p>
-          <a:p>
-            <a:pPr marL="342900" indent="-342900">
-              <a:buFont typeface="Arial" panose="020B0604020202020204" pitchFamily="34" charset="0"/>
-              <a:buChar char="•"/>
-            </a:pPr>
-            <a:r>
-              <a:rPr lang="en-GB" sz="2200" dirty="0"/>
-              <a:t>Horizontal scaling (running the application across multiple devices) is not a concept which applies here. </a:t>
-            </a:r>
-          </a:p>
-          <a:p>
-            <a:pPr marL="342900" indent="-342900">
-              <a:buFont typeface="Arial" panose="020B0604020202020204" pitchFamily="34" charset="0"/>
-              <a:buChar char="•"/>
-            </a:pPr>
-            <a:r>
-              <a:rPr lang="en-GB" sz="2200" dirty="0"/>
-              <a:t>Vertical scaling (providing greater performance when given a more powerful device) applies but isn’t going to happen unless the user themselves physically switches to a better machine. It isn’t an area to focus on.</a:t>
-            </a:r>
-          </a:p>
-          <a:p>
-            <a:pPr marL="342900" indent="-342900">
-              <a:buFont typeface="Arial" panose="020B0604020202020204" pitchFamily="34" charset="0"/>
-              <a:buChar char="•"/>
-            </a:pPr>
-            <a:endParaRPr lang="en-GB" sz="2200" dirty="0"/>
-          </a:p>
-          <a:p>
-            <a:r>
-              <a:rPr lang="en-GB" sz="2200" b="1" dirty="0"/>
-              <a:t>Multithreading will kill your web application </a:t>
-            </a:r>
-          </a:p>
-          <a:p>
-            <a:pPr marL="342900" indent="-342900">
-              <a:buFont typeface="Arial" panose="020B0604020202020204" pitchFamily="34" charset="0"/>
-              <a:buChar char="•"/>
-            </a:pPr>
-            <a:r>
-              <a:rPr lang="en-GB" sz="2200" dirty="0"/>
-              <a:t>Web applications (e.g. ASP.NET MVC / </a:t>
-            </a:r>
-            <a:r>
-              <a:rPr lang="en-GB" sz="2200" dirty="0" err="1"/>
-              <a:t>WebAPI</a:t>
-            </a:r>
-            <a:r>
-              <a:rPr lang="en-GB" sz="2200" dirty="0"/>
-              <a:t> project) need to respond to HTTP requests. </a:t>
-            </a:r>
-            <a:r>
-              <a:rPr lang="en-GB" sz="2200" b="1" dirty="0"/>
-              <a:t>Each HTTP request requires its own thread</a:t>
-            </a:r>
-            <a:r>
-              <a:rPr lang="en-GB" sz="2200" dirty="0"/>
-              <a:t>. As a result, </a:t>
-            </a:r>
-            <a:r>
-              <a:rPr lang="en-GB" sz="2200" b="1" dirty="0"/>
-              <a:t>you must only use them for handling requests</a:t>
-            </a:r>
-            <a:r>
-              <a:rPr lang="en-GB" sz="2200" dirty="0"/>
-              <a:t>.</a:t>
-            </a:r>
-          </a:p>
-          <a:p>
-            <a:pPr marL="342900" indent="-342900">
-              <a:buFont typeface="Arial" panose="020B0604020202020204" pitchFamily="34" charset="0"/>
-              <a:buChar char="•"/>
-            </a:pPr>
-            <a:r>
-              <a:rPr lang="en-GB" sz="2200" dirty="0"/>
-              <a:t>Horizontal scaling is critical to web applications. Each node in your cluster must be able to respond to as many requests as possible.</a:t>
-            </a:r>
-          </a:p>
-          <a:p>
-            <a:pPr marL="342900" indent="-342900">
-              <a:buFont typeface="Arial" panose="020B0604020202020204" pitchFamily="34" charset="0"/>
-              <a:buChar char="•"/>
-            </a:pPr>
-            <a:r>
-              <a:rPr lang="en-GB" sz="2200" dirty="0"/>
-              <a:t>Vertical scaling is expensive so you must make sure you serve the most requests possible out of your new expensive servers. </a:t>
-            </a:r>
-          </a:p>
-        </p:txBody>
-      </p:sp>
-    </p:spTree>
-    <p:extLst>
-      <p:ext uri="{BB962C8B-B14F-4D97-AF65-F5344CB8AC3E}">
-        <p14:creationId xmlns:p14="http://schemas.microsoft.com/office/powerpoint/2010/main" val="1919573543"/>
       </p:ext>
     </p:extLst>
   </p:cSld>
@@ -10646,6 +10524,279 @@
         <p:spPr>
           <a:xfrm>
             <a:off x="278297" y="212034"/>
+            <a:ext cx="11781182" cy="4493538"/>
+          </a:xfrm>
+          <a:prstGeom prst="rect">
+            <a:avLst/>
+          </a:prstGeom>
+          <a:noFill/>
+        </p:spPr>
+        <p:txBody>
+          <a:bodyPr wrap="square" rtlCol="0">
+            <a:spAutoFit/>
+          </a:bodyPr>
+          <a:lstStyle/>
+          <a:p>
+            <a:r>
+              <a:rPr lang="en-GB" sz="2200" b="1" dirty="0"/>
+              <a:t>Desktop and mobile applications love multithreading</a:t>
+            </a:r>
+          </a:p>
+          <a:p>
+            <a:endParaRPr lang="en-GB" sz="2200" b="1" dirty="0"/>
+          </a:p>
+          <a:p>
+            <a:pPr marL="342900" indent="-342900">
+              <a:buFont typeface="Arial" panose="020B0604020202020204" pitchFamily="34" charset="0"/>
+              <a:buChar char="•"/>
+            </a:pPr>
+            <a:r>
+              <a:rPr lang="en-GB" sz="2200" dirty="0"/>
+              <a:t>Applications like this only have one user at a time. As a result, you can essentially throw threads at a problem in order to provide the best performance. This particular user having the best performance won’t affect other users. </a:t>
+            </a:r>
+          </a:p>
+          <a:p>
+            <a:endParaRPr lang="en-GB" sz="2200" dirty="0"/>
+          </a:p>
+          <a:p>
+            <a:pPr marL="342900" indent="-342900">
+              <a:buFont typeface="Arial" panose="020B0604020202020204" pitchFamily="34" charset="0"/>
+              <a:buChar char="•"/>
+            </a:pPr>
+            <a:r>
+              <a:rPr lang="en-GB" sz="2200" dirty="0"/>
+              <a:t>Horizontal scaling (running the application across multiple devices) is not a concept which applies here. The user is only using a single device (i.e. their mobile phone). </a:t>
+            </a:r>
+          </a:p>
+          <a:p>
+            <a:endParaRPr lang="en-GB" sz="2200" dirty="0"/>
+          </a:p>
+          <a:p>
+            <a:pPr marL="342900" indent="-342900">
+              <a:buFont typeface="Arial" panose="020B0604020202020204" pitchFamily="34" charset="0"/>
+              <a:buChar char="•"/>
+            </a:pPr>
+            <a:r>
+              <a:rPr lang="en-GB" sz="2200" dirty="0"/>
+              <a:t>Vertical scaling (providing greater performance when given a more powerful device) applies but isn’t going to happen unless the user themselves physically switches to a better machine. It isn’t an area to focus on. Writing your code so you use threads efficiently is advised but not critical.</a:t>
+            </a:r>
+          </a:p>
+          <a:p>
+            <a:endParaRPr lang="en-GB" sz="2200" dirty="0"/>
+          </a:p>
+        </p:txBody>
+      </p:sp>
+    </p:spTree>
+    <p:extLst>
+      <p:ext uri="{BB962C8B-B14F-4D97-AF65-F5344CB8AC3E}">
+        <p14:creationId xmlns:p14="http://schemas.microsoft.com/office/powerpoint/2010/main" val="1813038530"/>
+      </p:ext>
+    </p:extLst>
+  </p:cSld>
+  <p:clrMapOvr>
+    <a:masterClrMapping/>
+  </p:clrMapOvr>
+</p:sld>
+</file>
+
+<file path=ppt/slides/slide31.xml><?xml version="1.0" encoding="utf-8"?>
+<p:sld xmlns:a="http://schemas.openxmlformats.org/drawingml/2006/main" xmlns:r="http://schemas.openxmlformats.org/officeDocument/2006/relationships" xmlns:p="http://schemas.openxmlformats.org/presentationml/2006/main">
+  <p:cSld>
+    <p:spTree>
+      <p:nvGrpSpPr>
+        <p:cNvPr id="1" name=""/>
+        <p:cNvGrpSpPr/>
+        <p:nvPr/>
+      </p:nvGrpSpPr>
+      <p:grpSpPr>
+        <a:xfrm>
+          <a:off x="0" y="0"/>
+          <a:ext cx="0" cy="0"/>
+          <a:chOff x="0" y="0"/>
+          <a:chExt cx="0" cy="0"/>
+        </a:xfrm>
+      </p:grpSpPr>
+      <p:sp>
+        <p:nvSpPr>
+          <p:cNvPr id="4" name="TextBox 3">
+            <a:extLst>
+              <a:ext uri="{FF2B5EF4-FFF2-40B4-BE49-F238E27FC236}">
+                <a16:creationId xmlns:a16="http://schemas.microsoft.com/office/drawing/2014/main" id="{18767206-9205-42D0-A2AE-5A1017D4CB08}"/>
+              </a:ext>
+            </a:extLst>
+          </p:cNvPr>
+          <p:cNvSpPr txBox="1"/>
+          <p:nvPr/>
+        </p:nvSpPr>
+        <p:spPr>
+          <a:xfrm>
+            <a:off x="278297" y="212034"/>
+            <a:ext cx="11781182" cy="4493538"/>
+          </a:xfrm>
+          <a:prstGeom prst="rect">
+            <a:avLst/>
+          </a:prstGeom>
+          <a:noFill/>
+        </p:spPr>
+        <p:txBody>
+          <a:bodyPr wrap="square" rtlCol="0">
+            <a:spAutoFit/>
+          </a:bodyPr>
+          <a:lstStyle/>
+          <a:p>
+            <a:r>
+              <a:rPr lang="en-GB" sz="2200" b="1" dirty="0"/>
+              <a:t>Multithreading can kill your web application </a:t>
+            </a:r>
+          </a:p>
+          <a:p>
+            <a:endParaRPr lang="en-GB" sz="2200" b="1" dirty="0"/>
+          </a:p>
+          <a:p>
+            <a:pPr marL="342900" indent="-342900">
+              <a:buFont typeface="Arial" panose="020B0604020202020204" pitchFamily="34" charset="0"/>
+              <a:buChar char="•"/>
+            </a:pPr>
+            <a:r>
+              <a:rPr lang="en-GB" sz="2200" dirty="0"/>
+              <a:t>Web applications (e.g. ASP.NET MVC / </a:t>
+            </a:r>
+            <a:r>
+              <a:rPr lang="en-GB" sz="2200" dirty="0" err="1"/>
+              <a:t>WebAPI</a:t>
+            </a:r>
+            <a:r>
+              <a:rPr lang="en-GB" sz="2200" dirty="0"/>
+              <a:t> project) need to respond to HTTP requests. </a:t>
+            </a:r>
+            <a:r>
+              <a:rPr lang="en-GB" sz="2200" b="1" dirty="0"/>
+              <a:t>Each HTTP request requires its own thread from the thread pool</a:t>
+            </a:r>
+            <a:r>
+              <a:rPr lang="en-GB" sz="2200" dirty="0"/>
+              <a:t>. As a result, </a:t>
+            </a:r>
+            <a:r>
+              <a:rPr lang="en-GB" sz="2200" b="1" dirty="0"/>
+              <a:t>you should preserve your thread pool threads for handling requests</a:t>
+            </a:r>
+            <a:r>
+              <a:rPr lang="en-GB" sz="2200" dirty="0"/>
+              <a:t>. Using too many threads for improving performance for a single user would mean less users can be served on the same instance of your application.</a:t>
+            </a:r>
+          </a:p>
+          <a:p>
+            <a:endParaRPr lang="en-GB" sz="2200" dirty="0"/>
+          </a:p>
+          <a:p>
+            <a:pPr marL="342900" indent="-342900">
+              <a:buFont typeface="Arial" panose="020B0604020202020204" pitchFamily="34" charset="0"/>
+              <a:buChar char="•"/>
+            </a:pPr>
+            <a:r>
+              <a:rPr lang="en-GB" sz="2200" dirty="0"/>
+              <a:t>Horizontal scaling is critical to web applications. Each node in your cluster must be able to respond to as many requests as possible. Efficient use of threads will mean more users can use the application deployed on each node. </a:t>
+            </a:r>
+            <a:br>
+              <a:rPr lang="en-GB" sz="2200" dirty="0"/>
+            </a:br>
+            <a:endParaRPr lang="en-GB" sz="2200" dirty="0"/>
+          </a:p>
+          <a:p>
+            <a:pPr marL="342900" indent="-342900">
+              <a:buFont typeface="Arial" panose="020B0604020202020204" pitchFamily="34" charset="0"/>
+              <a:buChar char="•"/>
+            </a:pPr>
+            <a:r>
+              <a:rPr lang="en-GB" sz="2200" dirty="0"/>
+              <a:t>Vertical scaling is expensive so you must make sure you serve the most requests possible out of your new and more expensive hardware. </a:t>
+            </a:r>
+          </a:p>
+        </p:txBody>
+      </p:sp>
+      <p:sp>
+        <p:nvSpPr>
+          <p:cNvPr id="5" name="TextBox 4">
+            <a:extLst>
+              <a:ext uri="{FF2B5EF4-FFF2-40B4-BE49-F238E27FC236}">
+                <a16:creationId xmlns:a16="http://schemas.microsoft.com/office/drawing/2014/main" id="{CCCF3874-E9C8-4F70-8886-328893DB9238}"/>
+              </a:ext>
+            </a:extLst>
+          </p:cNvPr>
+          <p:cNvSpPr txBox="1"/>
+          <p:nvPr/>
+        </p:nvSpPr>
+        <p:spPr>
+          <a:xfrm>
+            <a:off x="205409" y="5391321"/>
+            <a:ext cx="11781182" cy="430887"/>
+          </a:xfrm>
+          <a:prstGeom prst="rect">
+            <a:avLst/>
+          </a:prstGeom>
+          <a:noFill/>
+        </p:spPr>
+        <p:txBody>
+          <a:bodyPr wrap="square" rtlCol="0">
+            <a:spAutoFit/>
+          </a:bodyPr>
+          <a:lstStyle/>
+          <a:p>
+            <a:pPr algn="ctr"/>
+            <a:r>
+              <a:rPr lang="en-GB" sz="2200" b="1" dirty="0"/>
+              <a:t>But what if you want to execute an asynchronous task without waiting for? </a:t>
+            </a:r>
+            <a:endParaRPr lang="en-GB" sz="2200" dirty="0"/>
+          </a:p>
+        </p:txBody>
+      </p:sp>
+    </p:spTree>
+    <p:extLst>
+      <p:ext uri="{BB962C8B-B14F-4D97-AF65-F5344CB8AC3E}">
+        <p14:creationId xmlns:p14="http://schemas.microsoft.com/office/powerpoint/2010/main" val="1919573543"/>
+      </p:ext>
+    </p:extLst>
+  </p:cSld>
+  <p:clrMapOvr>
+    <a:masterClrMapping/>
+  </p:clrMapOvr>
+</p:sld>
+</file>
+
+<file path=ppt/slides/slide32.xml><?xml version="1.0" encoding="utf-8"?>
+<p:sld xmlns:a="http://schemas.openxmlformats.org/drawingml/2006/main" xmlns:r="http://schemas.openxmlformats.org/officeDocument/2006/relationships" xmlns:p="http://schemas.openxmlformats.org/presentationml/2006/main">
+  <p:cSld>
+    <p:spTree>
+      <p:nvGrpSpPr>
+        <p:cNvPr id="1" name=""/>
+        <p:cNvGrpSpPr/>
+        <p:nvPr/>
+      </p:nvGrpSpPr>
+      <p:grpSpPr>
+        <a:xfrm>
+          <a:off x="0" y="0"/>
+          <a:ext cx="0" cy="0"/>
+          <a:chOff x="0" y="0"/>
+          <a:chExt cx="0" cy="0"/>
+        </a:xfrm>
+      </p:grpSpPr>
+      <p:sp>
+        <p:nvSpPr>
+          <p:cNvPr id="4" name="TextBox 3">
+            <a:extLst>
+              <a:ext uri="{FF2B5EF4-FFF2-40B4-BE49-F238E27FC236}">
+                <a16:creationId xmlns:a16="http://schemas.microsoft.com/office/drawing/2014/main" id="{18767206-9205-42D0-A2AE-5A1017D4CB08}"/>
+              </a:ext>
+            </a:extLst>
+          </p:cNvPr>
+          <p:cNvSpPr txBox="1"/>
+          <p:nvPr/>
+        </p:nvSpPr>
+        <p:spPr>
+          <a:xfrm>
+            <a:off x="278297" y="212034"/>
             <a:ext cx="11781182" cy="6186309"/>
           </a:xfrm>
           <a:prstGeom prst="rect">
@@ -10661,7 +10812,7 @@
           <a:p>
             <a:r>
               <a:rPr lang="en-GB" sz="2200" b="1" dirty="0"/>
-              <a:t>The problem with background tasks in ASP.NET / ASP.NET Core</a:t>
+              <a:t>The problem with background (“fire and forget”) tasks in ASP.NET / ASP.NET Core</a:t>
             </a:r>
           </a:p>
           <a:p>
@@ -10778,7 +10929,7 @@
             </a:r>
             <a:r>
               <a:rPr lang="en-GB" sz="2200" b="1" dirty="0"/>
-              <a:t>will not be registered with the server</a:t>
+              <a:t>will not be registered with the runtime</a:t>
             </a:r>
             <a:r>
               <a:rPr lang="en-GB" sz="2200" dirty="0"/>
@@ -10800,7 +10951,7 @@
 </p:sld>
 </file>
 
-<file path=ppt/slides/slide31.xml><?xml version="1.0" encoding="utf-8"?>
+<file path=ppt/slides/slide33.xml><?xml version="1.0" encoding="utf-8"?>
 <p:sld xmlns:a="http://schemas.openxmlformats.org/drawingml/2006/main" xmlns:r="http://schemas.openxmlformats.org/officeDocument/2006/relationships" xmlns:p="http://schemas.openxmlformats.org/presentationml/2006/main">
   <p:cSld>
     <p:spTree>
@@ -11012,7 +11163,7 @@
 </p:sld>
 </file>
 
-<file path=ppt/slides/slide32.xml><?xml version="1.0" encoding="utf-8"?>
+<file path=ppt/slides/slide34.xml><?xml version="1.0" encoding="utf-8"?>
 <p:sld xmlns:a="http://schemas.openxmlformats.org/drawingml/2006/main" xmlns:r="http://schemas.openxmlformats.org/officeDocument/2006/relationships" xmlns:p="http://schemas.openxmlformats.org/presentationml/2006/main">
   <p:cSld>
     <p:spTree>
@@ -11076,7 +11227,7 @@
             </a:r>
             <a:r>
               <a:rPr lang="en-GB" sz="2200" dirty="0"/>
-              <a:t> interface. It has support for: </a:t>
+              <a:t> interface. You can host things such as: </a:t>
             </a:r>
           </a:p>
           <a:p>
@@ -11165,6 +11316,714 @@
     <p:extLst>
       <p:ext uri="{BB962C8B-B14F-4D97-AF65-F5344CB8AC3E}">
         <p14:creationId xmlns:p14="http://schemas.microsoft.com/office/powerpoint/2010/main" val="2054950243"/>
+      </p:ext>
+    </p:extLst>
+  </p:cSld>
+  <p:clrMapOvr>
+    <a:masterClrMapping/>
+  </p:clrMapOvr>
+</p:sld>
+</file>
+
+<file path=ppt/slides/slide35.xml><?xml version="1.0" encoding="utf-8"?>
+<p:sld xmlns:a="http://schemas.openxmlformats.org/drawingml/2006/main" xmlns:r="http://schemas.openxmlformats.org/officeDocument/2006/relationships" xmlns:p="http://schemas.openxmlformats.org/presentationml/2006/main">
+  <p:cSld>
+    <p:spTree>
+      <p:nvGrpSpPr>
+        <p:cNvPr id="1" name=""/>
+        <p:cNvGrpSpPr/>
+        <p:nvPr/>
+      </p:nvGrpSpPr>
+      <p:grpSpPr>
+        <a:xfrm>
+          <a:off x="0" y="0"/>
+          <a:ext cx="0" cy="0"/>
+          <a:chOff x="0" y="0"/>
+          <a:chExt cx="0" cy="0"/>
+        </a:xfrm>
+      </p:grpSpPr>
+      <p:sp>
+        <p:nvSpPr>
+          <p:cNvPr id="4" name="TextBox 3">
+            <a:extLst>
+              <a:ext uri="{FF2B5EF4-FFF2-40B4-BE49-F238E27FC236}">
+                <a16:creationId xmlns:a16="http://schemas.microsoft.com/office/drawing/2014/main" id="{18767206-9205-42D0-A2AE-5A1017D4CB08}"/>
+              </a:ext>
+            </a:extLst>
+          </p:cNvPr>
+          <p:cNvSpPr txBox="1"/>
+          <p:nvPr/>
+        </p:nvSpPr>
+        <p:spPr>
+          <a:xfrm>
+            <a:off x="278297" y="212034"/>
+            <a:ext cx="11781182" cy="4832092"/>
+          </a:xfrm>
+          <a:prstGeom prst="rect">
+            <a:avLst/>
+          </a:prstGeom>
+          <a:noFill/>
+        </p:spPr>
+        <p:txBody>
+          <a:bodyPr wrap="square" rtlCol="0">
+            <a:spAutoFit/>
+          </a:bodyPr>
+          <a:lstStyle/>
+          <a:p>
+            <a:r>
+              <a:rPr lang="en-GB" sz="2200" b="1" dirty="0"/>
+              <a:t>The solution</a:t>
+            </a:r>
+          </a:p>
+          <a:p>
+            <a:endParaRPr lang="en-GB" sz="2200" b="1" dirty="0"/>
+          </a:p>
+          <a:p>
+            <a:r>
+              <a:rPr lang="en-GB" sz="2200" dirty="0"/>
+              <a:t>Other solutions include:</a:t>
+            </a:r>
+          </a:p>
+          <a:p>
+            <a:endParaRPr lang="en-GB" sz="2200" dirty="0"/>
+          </a:p>
+          <a:p>
+            <a:pPr marL="342900" indent="-342900">
+              <a:buFont typeface="Arial" panose="020B0604020202020204" pitchFamily="34" charset="0"/>
+              <a:buChar char="•"/>
+            </a:pPr>
+            <a:r>
+              <a:rPr lang="en-GB" sz="2200" dirty="0"/>
+              <a:t>Using a library like </a:t>
+            </a:r>
+            <a:r>
+              <a:rPr lang="en-GB" sz="2200" dirty="0" err="1"/>
+              <a:t>Hangfire</a:t>
+            </a:r>
+            <a:r>
+              <a:rPr lang="en-GB" sz="2200" dirty="0"/>
+              <a:t> which has a persistence layer for storing your tasks to be executed reliably. </a:t>
+            </a:r>
+          </a:p>
+          <a:p>
+            <a:pPr marL="342900" indent="-342900">
+              <a:buFont typeface="Arial" panose="020B0604020202020204" pitchFamily="34" charset="0"/>
+              <a:buChar char="•"/>
+            </a:pPr>
+            <a:endParaRPr lang="en-GB" sz="2200" dirty="0"/>
+          </a:p>
+          <a:p>
+            <a:pPr marL="342900" indent="-342900">
+              <a:buFont typeface="Arial" panose="020B0604020202020204" pitchFamily="34" charset="0"/>
+              <a:buChar char="•"/>
+            </a:pPr>
+            <a:r>
+              <a:rPr lang="en-GB" sz="2200" dirty="0"/>
+              <a:t>Using Azure Service Fabric actors to do this work instead. </a:t>
+            </a:r>
+          </a:p>
+          <a:p>
+            <a:pPr marL="342900" indent="-342900">
+              <a:buFont typeface="Arial" panose="020B0604020202020204" pitchFamily="34" charset="0"/>
+              <a:buChar char="•"/>
+            </a:pPr>
+            <a:endParaRPr lang="en-GB" sz="2200" dirty="0"/>
+          </a:p>
+          <a:p>
+            <a:pPr marL="342900" indent="-342900">
+              <a:buFont typeface="Arial" panose="020B0604020202020204" pitchFamily="34" charset="0"/>
+              <a:buChar char="•"/>
+            </a:pPr>
+            <a:r>
+              <a:rPr lang="en-GB" sz="2200" dirty="0"/>
+              <a:t>Using some other way of persisting the tasks in some way to a queue and processing them with a different system. </a:t>
+            </a:r>
+            <a:br>
+              <a:rPr lang="en-GB" sz="2200" dirty="0"/>
+            </a:br>
+            <a:r>
+              <a:rPr lang="en-GB" sz="2200" dirty="0"/>
+              <a:t>E.g.  using an Azure Storage Queue to store messages temporarily, then using an Azure Function to process messages in order from the queue. </a:t>
+            </a:r>
+          </a:p>
+          <a:p>
+            <a:endParaRPr lang="en-GB" sz="2200" b="1" dirty="0"/>
+          </a:p>
+        </p:txBody>
+      </p:sp>
+    </p:spTree>
+    <p:extLst>
+      <p:ext uri="{BB962C8B-B14F-4D97-AF65-F5344CB8AC3E}">
+        <p14:creationId xmlns:p14="http://schemas.microsoft.com/office/powerpoint/2010/main" val="2683058289"/>
+      </p:ext>
+    </p:extLst>
+  </p:cSld>
+  <p:clrMapOvr>
+    <a:masterClrMapping/>
+  </p:clrMapOvr>
+</p:sld>
+</file>
+
+<file path=ppt/slides/slide36.xml><?xml version="1.0" encoding="utf-8"?>
+<p:sld xmlns:a="http://schemas.openxmlformats.org/drawingml/2006/main" xmlns:r="http://schemas.openxmlformats.org/officeDocument/2006/relationships" xmlns:p="http://schemas.openxmlformats.org/presentationml/2006/main">
+  <p:cSld>
+    <p:spTree>
+      <p:nvGrpSpPr>
+        <p:cNvPr id="1" name=""/>
+        <p:cNvGrpSpPr/>
+        <p:nvPr/>
+      </p:nvGrpSpPr>
+      <p:grpSpPr>
+        <a:xfrm>
+          <a:off x="0" y="0"/>
+          <a:ext cx="0" cy="0"/>
+          <a:chOff x="0" y="0"/>
+          <a:chExt cx="0" cy="0"/>
+        </a:xfrm>
+      </p:grpSpPr>
+      <p:sp>
+        <p:nvSpPr>
+          <p:cNvPr id="4" name="TextBox 3">
+            <a:extLst>
+              <a:ext uri="{FF2B5EF4-FFF2-40B4-BE49-F238E27FC236}">
+                <a16:creationId xmlns:a16="http://schemas.microsoft.com/office/drawing/2014/main" id="{18767206-9205-42D0-A2AE-5A1017D4CB08}"/>
+              </a:ext>
+            </a:extLst>
+          </p:cNvPr>
+          <p:cNvSpPr txBox="1"/>
+          <p:nvPr/>
+        </p:nvSpPr>
+        <p:spPr>
+          <a:xfrm>
+            <a:off x="278297" y="212034"/>
+            <a:ext cx="11781182" cy="6063198"/>
+          </a:xfrm>
+          <a:prstGeom prst="rect">
+            <a:avLst/>
+          </a:prstGeom>
+          <a:noFill/>
+        </p:spPr>
+        <p:txBody>
+          <a:bodyPr wrap="square" rtlCol="0">
+            <a:spAutoFit/>
+          </a:bodyPr>
+          <a:lstStyle/>
+          <a:p>
+            <a:r>
+              <a:rPr lang="en-GB" sz="2200" b="1" dirty="0"/>
+              <a:t>Multithreading can kill your Azure Service Fabric actors</a:t>
+            </a:r>
+          </a:p>
+          <a:p>
+            <a:endParaRPr lang="en-GB" sz="2200" b="1" dirty="0"/>
+          </a:p>
+          <a:p>
+            <a:r>
+              <a:rPr lang="en-GB" sz="2200" dirty="0"/>
+              <a:t>From the </a:t>
+            </a:r>
+            <a:r>
+              <a:rPr lang="en-GB" sz="2200" dirty="0" err="1"/>
+              <a:t>the</a:t>
+            </a:r>
+            <a:r>
+              <a:rPr lang="en-GB" sz="2200" dirty="0"/>
+              <a:t> MSDN page for Service Fabric Reliable Actors:</a:t>
+            </a:r>
+          </a:p>
+          <a:p>
+            <a:endParaRPr lang="en-GB" sz="2200" dirty="0"/>
+          </a:p>
+          <a:p>
+            <a:r>
+              <a:rPr lang="en-GB" sz="2200" dirty="0"/>
+              <a:t>“</a:t>
+            </a:r>
+            <a:r>
+              <a:rPr lang="en-GB" dirty="0"/>
+              <a:t>The Reliable Actors API provides a single-threaded programming model built on the scalability and reliability guarantees provided by Service Fabric.”</a:t>
+            </a:r>
+            <a:endParaRPr lang="en-GB" sz="2200" dirty="0"/>
+          </a:p>
+          <a:p>
+            <a:endParaRPr lang="en-GB" sz="2200" dirty="0"/>
+          </a:p>
+          <a:p>
+            <a:r>
+              <a:rPr lang="en-GB" dirty="0"/>
+              <a:t>“An actor is an isolated, independent unit of compute and state with </a:t>
+            </a:r>
+            <a:r>
+              <a:rPr lang="en-GB" b="1" dirty="0"/>
+              <a:t>single-threaded execution</a:t>
+            </a:r>
+            <a:r>
+              <a:rPr lang="en-GB" dirty="0"/>
+              <a:t>.”</a:t>
+            </a:r>
+            <a:endParaRPr lang="en-GB" sz="2200" dirty="0"/>
+          </a:p>
+          <a:p>
+            <a:endParaRPr lang="en-GB" sz="2200" dirty="0"/>
+          </a:p>
+          <a:p>
+            <a:pPr marL="342900" indent="-342900">
+              <a:buFont typeface="Arial" panose="020B0604020202020204" pitchFamily="34" charset="0"/>
+              <a:buChar char="•"/>
+            </a:pPr>
+            <a:r>
+              <a:rPr lang="en-GB" sz="2200" dirty="0"/>
+              <a:t>Actors are activated on a thread when a request is made to them. </a:t>
+            </a:r>
+          </a:p>
+          <a:p>
+            <a:endParaRPr lang="en-GB" sz="2200" dirty="0"/>
+          </a:p>
+          <a:p>
+            <a:pPr marL="342900" indent="-342900">
+              <a:buFont typeface="Arial" panose="020B0604020202020204" pitchFamily="34" charset="0"/>
+              <a:buChar char="•"/>
+            </a:pPr>
+            <a:r>
+              <a:rPr lang="en-GB" sz="2200" dirty="0"/>
+              <a:t>An actor is deactivated and garbage collected when it hasn’t been used in some time. “Using” an actor involves either making a request or a reminder has been triggered. </a:t>
+            </a:r>
+          </a:p>
+          <a:p>
+            <a:pPr marL="342900" indent="-342900">
+              <a:buFont typeface="Arial" panose="020B0604020202020204" pitchFamily="34" charset="0"/>
+              <a:buChar char="•"/>
+            </a:pPr>
+            <a:endParaRPr lang="en-GB" sz="2200" dirty="0"/>
+          </a:p>
+          <a:p>
+            <a:pPr marL="342900" indent="-342900">
+              <a:buFont typeface="Arial" panose="020B0604020202020204" pitchFamily="34" charset="0"/>
+              <a:buChar char="•"/>
+            </a:pPr>
+            <a:r>
+              <a:rPr lang="en-GB" sz="2200" dirty="0"/>
+              <a:t>Creating another thread within the then means there is one less thread available to activate another actor. The actor runtime also has no knowledge of this thread. Not waiting for it to finish (fire and forget) is dangerous as the actor can be deactivated and even moved to another node, so your other thread can be killed without warning. </a:t>
+            </a:r>
+          </a:p>
+        </p:txBody>
+      </p:sp>
+    </p:spTree>
+    <p:extLst>
+      <p:ext uri="{BB962C8B-B14F-4D97-AF65-F5344CB8AC3E}">
+        <p14:creationId xmlns:p14="http://schemas.microsoft.com/office/powerpoint/2010/main" val="4147862038"/>
+      </p:ext>
+    </p:extLst>
+  </p:cSld>
+  <p:clrMapOvr>
+    <a:masterClrMapping/>
+  </p:clrMapOvr>
+</p:sld>
+</file>
+
+<file path=ppt/slides/slide37.xml><?xml version="1.0" encoding="utf-8"?>
+<p:sld xmlns:a="http://schemas.openxmlformats.org/drawingml/2006/main" xmlns:r="http://schemas.openxmlformats.org/officeDocument/2006/relationships" xmlns:p="http://schemas.openxmlformats.org/presentationml/2006/main">
+  <p:cSld>
+    <p:spTree>
+      <p:nvGrpSpPr>
+        <p:cNvPr id="1" name=""/>
+        <p:cNvGrpSpPr/>
+        <p:nvPr/>
+      </p:nvGrpSpPr>
+      <p:grpSpPr>
+        <a:xfrm>
+          <a:off x="0" y="0"/>
+          <a:ext cx="0" cy="0"/>
+          <a:chOff x="0" y="0"/>
+          <a:chExt cx="0" cy="0"/>
+        </a:xfrm>
+      </p:grpSpPr>
+      <p:sp>
+        <p:nvSpPr>
+          <p:cNvPr id="4" name="TextBox 3">
+            <a:extLst>
+              <a:ext uri="{FF2B5EF4-FFF2-40B4-BE49-F238E27FC236}">
+                <a16:creationId xmlns:a16="http://schemas.microsoft.com/office/drawing/2014/main" id="{18767206-9205-42D0-A2AE-5A1017D4CB08}"/>
+              </a:ext>
+            </a:extLst>
+          </p:cNvPr>
+          <p:cNvSpPr txBox="1"/>
+          <p:nvPr/>
+        </p:nvSpPr>
+        <p:spPr>
+          <a:xfrm>
+            <a:off x="278297" y="212034"/>
+            <a:ext cx="11781182" cy="4493538"/>
+          </a:xfrm>
+          <a:prstGeom prst="rect">
+            <a:avLst/>
+          </a:prstGeom>
+          <a:noFill/>
+        </p:spPr>
+        <p:txBody>
+          <a:bodyPr wrap="square" rtlCol="0">
+            <a:spAutoFit/>
+          </a:bodyPr>
+          <a:lstStyle/>
+          <a:p>
+            <a:r>
+              <a:rPr lang="en-GB" sz="2200" b="1" dirty="0"/>
+              <a:t>The solution</a:t>
+            </a:r>
+          </a:p>
+          <a:p>
+            <a:endParaRPr lang="en-GB" sz="2200" b="1" dirty="0"/>
+          </a:p>
+          <a:p>
+            <a:r>
+              <a:rPr lang="en-GB" sz="2200" dirty="0"/>
+              <a:t>Here are some alternatives to using multiple threads in your actors:</a:t>
+            </a:r>
+          </a:p>
+          <a:p>
+            <a:endParaRPr lang="en-GB" sz="2200" dirty="0"/>
+          </a:p>
+          <a:p>
+            <a:pPr marL="342900" indent="-342900">
+              <a:buFont typeface="Arial" panose="020B0604020202020204" pitchFamily="34" charset="0"/>
+              <a:buChar char="•"/>
+            </a:pPr>
+            <a:r>
+              <a:rPr lang="en-GB" sz="2200" dirty="0"/>
+              <a:t>Split the work amongst multiple actors. It’s worth remembering as well that an actor can create and communicate with other actors.</a:t>
+            </a:r>
+          </a:p>
+          <a:p>
+            <a:pPr marL="342900" indent="-342900">
+              <a:buFont typeface="Arial" panose="020B0604020202020204" pitchFamily="34" charset="0"/>
+              <a:buChar char="•"/>
+            </a:pPr>
+            <a:endParaRPr lang="en-GB" sz="2200" dirty="0"/>
+          </a:p>
+          <a:p>
+            <a:pPr marL="342900" indent="-342900">
+              <a:buFont typeface="Arial" panose="020B0604020202020204" pitchFamily="34" charset="0"/>
+              <a:buChar char="•"/>
+            </a:pPr>
+            <a:r>
+              <a:rPr lang="en-GB" sz="2200" dirty="0"/>
+              <a:t>Add a message to a queue to be processed by some other service. </a:t>
+            </a:r>
+          </a:p>
+          <a:p>
+            <a:pPr marL="342900" indent="-342900">
+              <a:buFont typeface="Arial" panose="020B0604020202020204" pitchFamily="34" charset="0"/>
+              <a:buChar char="•"/>
+            </a:pPr>
+            <a:endParaRPr lang="en-GB" sz="2200" dirty="0"/>
+          </a:p>
+          <a:p>
+            <a:pPr marL="342900" indent="-342900">
+              <a:buFont typeface="Arial" panose="020B0604020202020204" pitchFamily="34" charset="0"/>
+              <a:buChar char="•"/>
+            </a:pPr>
+            <a:r>
+              <a:rPr lang="en-GB" sz="2200" b="1" dirty="0"/>
+              <a:t>Why not just get the actor to do all the long-running work anyway?</a:t>
+            </a:r>
+            <a:br>
+              <a:rPr lang="en-GB" sz="2200" b="1" dirty="0"/>
+            </a:br>
+            <a:r>
+              <a:rPr lang="en-GB" sz="2200" dirty="0"/>
+              <a:t>If it’s a fire-and-forget task where performance isn’t a factor, you might as well just run it for as long as it needs to run. If performance is an issue, then consider another option.</a:t>
+            </a:r>
+            <a:br>
+              <a:rPr lang="en-GB" sz="2200" b="1" dirty="0"/>
+            </a:br>
+            <a:endParaRPr lang="en-GB" sz="2200" b="1" dirty="0"/>
+          </a:p>
+        </p:txBody>
+      </p:sp>
+    </p:spTree>
+    <p:extLst>
+      <p:ext uri="{BB962C8B-B14F-4D97-AF65-F5344CB8AC3E}">
+        <p14:creationId xmlns:p14="http://schemas.microsoft.com/office/powerpoint/2010/main" val="3980841386"/>
+      </p:ext>
+    </p:extLst>
+  </p:cSld>
+  <p:clrMapOvr>
+    <a:masterClrMapping/>
+  </p:clrMapOvr>
+</p:sld>
+</file>
+
+<file path=ppt/slides/slide38.xml><?xml version="1.0" encoding="utf-8"?>
+<p:sld xmlns:a="http://schemas.openxmlformats.org/drawingml/2006/main" xmlns:r="http://schemas.openxmlformats.org/officeDocument/2006/relationships" xmlns:p="http://schemas.openxmlformats.org/presentationml/2006/main">
+  <p:cSld>
+    <p:spTree>
+      <p:nvGrpSpPr>
+        <p:cNvPr id="1" name=""/>
+        <p:cNvGrpSpPr/>
+        <p:nvPr/>
+      </p:nvGrpSpPr>
+      <p:grpSpPr>
+        <a:xfrm>
+          <a:off x="0" y="0"/>
+          <a:ext cx="0" cy="0"/>
+          <a:chOff x="0" y="0"/>
+          <a:chExt cx="0" cy="0"/>
+        </a:xfrm>
+      </p:grpSpPr>
+      <p:sp>
+        <p:nvSpPr>
+          <p:cNvPr id="2" name="Title 1">
+            <a:extLst>
+              <a:ext uri="{FF2B5EF4-FFF2-40B4-BE49-F238E27FC236}">
+                <a16:creationId xmlns:a16="http://schemas.microsoft.com/office/drawing/2014/main" id="{267862F2-D4D4-4F5B-B69F-65226C837768}"/>
+              </a:ext>
+            </a:extLst>
+          </p:cNvPr>
+          <p:cNvSpPr>
+            <a:spLocks noGrp="1"/>
+          </p:cNvSpPr>
+          <p:nvPr>
+            <p:ph type="ctrTitle"/>
+          </p:nvPr>
+        </p:nvSpPr>
+        <p:spPr>
+          <a:xfrm>
+            <a:off x="1524000" y="1122363"/>
+            <a:ext cx="9144000" cy="1991898"/>
+          </a:xfrm>
+        </p:spPr>
+        <p:txBody>
+          <a:bodyPr>
+            <a:normAutofit/>
+          </a:bodyPr>
+          <a:lstStyle/>
+          <a:p>
+            <a:r>
+              <a:rPr lang="en-GB" dirty="0"/>
+              <a:t>What happens when something goes wrong?</a:t>
+            </a:r>
+          </a:p>
+        </p:txBody>
+      </p:sp>
+    </p:spTree>
+    <p:extLst>
+      <p:ext uri="{BB962C8B-B14F-4D97-AF65-F5344CB8AC3E}">
+        <p14:creationId xmlns:p14="http://schemas.microsoft.com/office/powerpoint/2010/main" val="3154203515"/>
+      </p:ext>
+    </p:extLst>
+  </p:cSld>
+  <p:clrMapOvr>
+    <a:masterClrMapping/>
+  </p:clrMapOvr>
+</p:sld>
+</file>
+
+<file path=ppt/slides/slide39.xml><?xml version="1.0" encoding="utf-8"?>
+<p:sld xmlns:a="http://schemas.openxmlformats.org/drawingml/2006/main" xmlns:r="http://schemas.openxmlformats.org/officeDocument/2006/relationships" xmlns:p="http://schemas.openxmlformats.org/presentationml/2006/main">
+  <p:cSld>
+    <p:spTree>
+      <p:nvGrpSpPr>
+        <p:cNvPr id="1" name=""/>
+        <p:cNvGrpSpPr/>
+        <p:nvPr/>
+      </p:nvGrpSpPr>
+      <p:grpSpPr>
+        <a:xfrm>
+          <a:off x="0" y="0"/>
+          <a:ext cx="0" cy="0"/>
+          <a:chOff x="0" y="0"/>
+          <a:chExt cx="0" cy="0"/>
+        </a:xfrm>
+      </p:grpSpPr>
+      <p:sp>
+        <p:nvSpPr>
+          <p:cNvPr id="4" name="TextBox 3">
+            <a:extLst>
+              <a:ext uri="{FF2B5EF4-FFF2-40B4-BE49-F238E27FC236}">
+                <a16:creationId xmlns:a16="http://schemas.microsoft.com/office/drawing/2014/main" id="{18767206-9205-42D0-A2AE-5A1017D4CB08}"/>
+              </a:ext>
+            </a:extLst>
+          </p:cNvPr>
+          <p:cNvSpPr txBox="1"/>
+          <p:nvPr/>
+        </p:nvSpPr>
+        <p:spPr>
+          <a:xfrm>
+            <a:off x="278297" y="212034"/>
+            <a:ext cx="11781182" cy="6186309"/>
+          </a:xfrm>
+          <a:prstGeom prst="rect">
+            <a:avLst/>
+          </a:prstGeom>
+          <a:noFill/>
+        </p:spPr>
+        <p:txBody>
+          <a:bodyPr wrap="square" rtlCol="0">
+            <a:spAutoFit/>
+          </a:bodyPr>
+          <a:lstStyle/>
+          <a:p>
+            <a:r>
+              <a:rPr lang="en-GB" sz="2200" b="1" dirty="0"/>
+              <a:t>Dealing with exceptions</a:t>
+            </a:r>
+          </a:p>
+          <a:p>
+            <a:endParaRPr lang="en-GB" sz="2200" b="1" dirty="0"/>
+          </a:p>
+          <a:p>
+            <a:pPr marL="342900" indent="-342900">
+              <a:buFont typeface="Arial" panose="020B0604020202020204" pitchFamily="34" charset="0"/>
+              <a:buChar char="•"/>
+            </a:pPr>
+            <a:r>
+              <a:rPr lang="en-GB" sz="2200" dirty="0"/>
+              <a:t>If a task is the parent of attached child tasks, or if you are waiting on multiple tasks, multiple exceptions could be thrown. </a:t>
+            </a:r>
+          </a:p>
+          <a:p>
+            <a:endParaRPr lang="en-GB" sz="2200" b="1" dirty="0"/>
+          </a:p>
+          <a:p>
+            <a:pPr marL="342900" indent="-342900">
+              <a:buFont typeface="Arial" panose="020B0604020202020204" pitchFamily="34" charset="0"/>
+              <a:buChar char="•"/>
+            </a:pPr>
+            <a:r>
+              <a:rPr lang="en-GB" sz="2200" dirty="0"/>
+              <a:t>Exceptions thrown within a task are always accessible from the Task’s </a:t>
+            </a:r>
+            <a:r>
+              <a:rPr lang="en-GB" sz="2200" b="1" dirty="0"/>
+              <a:t>Exception property</a:t>
+            </a:r>
+            <a:r>
+              <a:rPr lang="en-GB" sz="2200" dirty="0"/>
+              <a:t>. This is of type </a:t>
+            </a:r>
+            <a:r>
+              <a:rPr lang="en-GB" sz="2200" b="1" dirty="0" err="1"/>
+              <a:t>AggregateException</a:t>
+            </a:r>
+            <a:r>
+              <a:rPr lang="en-GB" sz="2200" dirty="0"/>
+              <a:t>. This is so multiple exceptions can be aggregated and propagated. </a:t>
+            </a:r>
+          </a:p>
+          <a:p>
+            <a:endParaRPr lang="en-GB" sz="2200" dirty="0"/>
+          </a:p>
+          <a:p>
+            <a:pPr marL="342900" indent="-342900">
+              <a:buFont typeface="Arial" panose="020B0604020202020204" pitchFamily="34" charset="0"/>
+              <a:buChar char="•"/>
+            </a:pPr>
+            <a:r>
+              <a:rPr lang="en-GB" sz="2200" dirty="0"/>
+              <a:t>Observing the completion of a task by using </a:t>
+            </a:r>
+            <a:r>
+              <a:rPr lang="en-GB" sz="2200" b="1" dirty="0"/>
+              <a:t>Wait()</a:t>
+            </a:r>
+            <a:r>
+              <a:rPr lang="en-GB" sz="2200" dirty="0"/>
+              <a:t>,</a:t>
+            </a:r>
+            <a:r>
+              <a:rPr lang="en-GB" sz="2200" b="1" dirty="0"/>
+              <a:t> Result</a:t>
+            </a:r>
+            <a:r>
+              <a:rPr lang="en-GB" sz="2200" dirty="0"/>
+              <a:t> or </a:t>
+            </a:r>
+            <a:r>
+              <a:rPr lang="en-GB" sz="2200" b="1" dirty="0"/>
+              <a:t>await</a:t>
+            </a:r>
+            <a:r>
+              <a:rPr lang="en-GB" sz="2200" dirty="0"/>
+              <a:t> will propagate the exception. At this point, you need to handle it with a try/catch block. </a:t>
+            </a:r>
+          </a:p>
+          <a:p>
+            <a:endParaRPr lang="en-GB" sz="2200" b="1" dirty="0"/>
+          </a:p>
+          <a:p>
+            <a:pPr marL="342900" indent="-342900">
+              <a:buFont typeface="Arial" panose="020B0604020202020204" pitchFamily="34" charset="0"/>
+              <a:buChar char="•"/>
+            </a:pPr>
+            <a:r>
+              <a:rPr lang="en-GB" sz="2200" b="1" dirty="0"/>
+              <a:t>Using await will not throw an </a:t>
+            </a:r>
+            <a:r>
+              <a:rPr lang="en-GB" sz="2200" b="1" dirty="0" err="1"/>
+              <a:t>AggregateException</a:t>
+            </a:r>
+            <a:r>
+              <a:rPr lang="en-GB" sz="2200" dirty="0"/>
+              <a:t>. It will instead propagate the first exception which was thrown, just like when writing synchronous code. This is another key benefit to using async/await. You don’t have to worry about </a:t>
+            </a:r>
+            <a:r>
+              <a:rPr lang="en-GB" sz="2200" dirty="0" err="1"/>
+              <a:t>AggregateExceptions</a:t>
+            </a:r>
+            <a:r>
+              <a:rPr lang="en-GB" sz="2200" dirty="0"/>
+              <a:t>!</a:t>
+            </a:r>
+          </a:p>
+          <a:p>
+            <a:pPr marL="342900" indent="-342900">
+              <a:buFont typeface="Arial" panose="020B0604020202020204" pitchFamily="34" charset="0"/>
+              <a:buChar char="•"/>
+            </a:pPr>
+            <a:endParaRPr lang="en-GB" sz="2200" dirty="0"/>
+          </a:p>
+          <a:p>
+            <a:pPr marL="342900" indent="-342900">
+              <a:buFont typeface="Arial" panose="020B0604020202020204" pitchFamily="34" charset="0"/>
+              <a:buChar char="•"/>
+            </a:pPr>
+            <a:r>
+              <a:rPr lang="en-GB" sz="2200" dirty="0"/>
+              <a:t>If you don’t observe the completion of a task which has thrown an exception, the garbage collector will trigger the </a:t>
+            </a:r>
+            <a:r>
+              <a:rPr lang="en-GB" sz="2200" b="1" dirty="0" err="1"/>
+              <a:t>UnobservedTaskException</a:t>
+            </a:r>
+            <a:r>
+              <a:rPr lang="en-GB" sz="2200" dirty="0"/>
+              <a:t> event on the </a:t>
+            </a:r>
+            <a:r>
+              <a:rPr lang="en-GB" sz="2200" b="1" dirty="0" err="1"/>
+              <a:t>TaskScheduler</a:t>
+            </a:r>
+            <a:r>
+              <a:rPr lang="en-GB" sz="2200" dirty="0"/>
+              <a:t>, which by default will </a:t>
+            </a:r>
+            <a:r>
+              <a:rPr lang="en-GB" sz="2200" b="1" dirty="0"/>
+              <a:t>completely terminate your process</a:t>
+            </a:r>
+            <a:r>
+              <a:rPr lang="en-GB" sz="2200" dirty="0"/>
+              <a:t>. This default behaviour can be overridden however. </a:t>
+            </a:r>
+            <a:endParaRPr lang="en-GB" sz="2200" b="1" dirty="0"/>
+          </a:p>
+        </p:txBody>
+      </p:sp>
+    </p:spTree>
+    <p:extLst>
+      <p:ext uri="{BB962C8B-B14F-4D97-AF65-F5344CB8AC3E}">
+        <p14:creationId xmlns:p14="http://schemas.microsoft.com/office/powerpoint/2010/main" val="25185311"/>
       </p:ext>
     </p:extLst>
   </p:cSld>

</xml_diff>

<commit_message>
Updated slides and example code
</commit_message>
<xml_diff>
--- a/Async and await presentation.pptx
+++ b/Async and await presentation.pptx
@@ -320,7 +320,7 @@
           <a:p>
             <a:fld id="{BFEF692B-FC3E-4552-B87F-4B5A00EB12B2}" type="datetimeFigureOut">
               <a:rPr lang="en-GB" smtClean="0"/>
-              <a:t>02/03/2020</a:t>
+              <a:t>03/03/2020</a:t>
             </a:fld>
             <a:endParaRPr lang="en-GB"/>
           </a:p>
@@ -520,7 +520,7 @@
           <a:p>
             <a:fld id="{BFEF692B-FC3E-4552-B87F-4B5A00EB12B2}" type="datetimeFigureOut">
               <a:rPr lang="en-GB" smtClean="0"/>
-              <a:t>02/03/2020</a:t>
+              <a:t>03/03/2020</a:t>
             </a:fld>
             <a:endParaRPr lang="en-GB"/>
           </a:p>
@@ -730,7 +730,7 @@
           <a:p>
             <a:fld id="{BFEF692B-FC3E-4552-B87F-4B5A00EB12B2}" type="datetimeFigureOut">
               <a:rPr lang="en-GB" smtClean="0"/>
-              <a:t>02/03/2020</a:t>
+              <a:t>03/03/2020</a:t>
             </a:fld>
             <a:endParaRPr lang="en-GB"/>
           </a:p>
@@ -930,7 +930,7 @@
           <a:p>
             <a:fld id="{BFEF692B-FC3E-4552-B87F-4B5A00EB12B2}" type="datetimeFigureOut">
               <a:rPr lang="en-GB" smtClean="0"/>
-              <a:t>02/03/2020</a:t>
+              <a:t>03/03/2020</a:t>
             </a:fld>
             <a:endParaRPr lang="en-GB"/>
           </a:p>
@@ -1206,7 +1206,7 @@
           <a:p>
             <a:fld id="{BFEF692B-FC3E-4552-B87F-4B5A00EB12B2}" type="datetimeFigureOut">
               <a:rPr lang="en-GB" smtClean="0"/>
-              <a:t>02/03/2020</a:t>
+              <a:t>03/03/2020</a:t>
             </a:fld>
             <a:endParaRPr lang="en-GB"/>
           </a:p>
@@ -1474,7 +1474,7 @@
           <a:p>
             <a:fld id="{BFEF692B-FC3E-4552-B87F-4B5A00EB12B2}" type="datetimeFigureOut">
               <a:rPr lang="en-GB" smtClean="0"/>
-              <a:t>02/03/2020</a:t>
+              <a:t>03/03/2020</a:t>
             </a:fld>
             <a:endParaRPr lang="en-GB"/>
           </a:p>
@@ -1889,7 +1889,7 @@
           <a:p>
             <a:fld id="{BFEF692B-FC3E-4552-B87F-4B5A00EB12B2}" type="datetimeFigureOut">
               <a:rPr lang="en-GB" smtClean="0"/>
-              <a:t>02/03/2020</a:t>
+              <a:t>03/03/2020</a:t>
             </a:fld>
             <a:endParaRPr lang="en-GB"/>
           </a:p>
@@ -2031,7 +2031,7 @@
           <a:p>
             <a:fld id="{BFEF692B-FC3E-4552-B87F-4B5A00EB12B2}" type="datetimeFigureOut">
               <a:rPr lang="en-GB" smtClean="0"/>
-              <a:t>02/03/2020</a:t>
+              <a:t>03/03/2020</a:t>
             </a:fld>
             <a:endParaRPr lang="en-GB"/>
           </a:p>
@@ -2144,7 +2144,7 @@
           <a:p>
             <a:fld id="{BFEF692B-FC3E-4552-B87F-4B5A00EB12B2}" type="datetimeFigureOut">
               <a:rPr lang="en-GB" smtClean="0"/>
-              <a:t>02/03/2020</a:t>
+              <a:t>03/03/2020</a:t>
             </a:fld>
             <a:endParaRPr lang="en-GB"/>
           </a:p>
@@ -2457,7 +2457,7 @@
           <a:p>
             <a:fld id="{BFEF692B-FC3E-4552-B87F-4B5A00EB12B2}" type="datetimeFigureOut">
               <a:rPr lang="en-GB" smtClean="0"/>
-              <a:t>02/03/2020</a:t>
+              <a:t>03/03/2020</a:t>
             </a:fld>
             <a:endParaRPr lang="en-GB"/>
           </a:p>
@@ -2746,7 +2746,7 @@
           <a:p>
             <a:fld id="{BFEF692B-FC3E-4552-B87F-4B5A00EB12B2}" type="datetimeFigureOut">
               <a:rPr lang="en-GB" smtClean="0"/>
-              <a:t>02/03/2020</a:t>
+              <a:t>03/03/2020</a:t>
             </a:fld>
             <a:endParaRPr lang="en-GB"/>
           </a:p>
@@ -2989,7 +2989,7 @@
           <a:p>
             <a:fld id="{BFEF692B-FC3E-4552-B87F-4B5A00EB12B2}" type="datetimeFigureOut">
               <a:rPr lang="en-GB" smtClean="0"/>
-              <a:t>02/03/2020</a:t>
+              <a:t>03/03/2020</a:t>
             </a:fld>
             <a:endParaRPr lang="en-GB"/>
           </a:p>
@@ -3515,7 +3515,7 @@
         <p:spPr>
           <a:xfrm>
             <a:off x="145775" y="132522"/>
-            <a:ext cx="11781182" cy="6001643"/>
+            <a:ext cx="11781182" cy="5755422"/>
           </a:xfrm>
           <a:prstGeom prst="rect">
             <a:avLst/>
@@ -3530,7 +3530,15 @@
           <a:p>
             <a:r>
               <a:rPr lang="en-GB" sz="3200" b="1" dirty="0"/>
-              <a:t>Task</a:t>
+              <a:t>Task and Task&lt;</a:t>
+            </a:r>
+            <a:r>
+              <a:rPr lang="en-GB" sz="3200" b="1" dirty="0" err="1"/>
+              <a:t>TResult</a:t>
+            </a:r>
+            <a:r>
+              <a:rPr lang="en-GB" sz="3200" b="1" dirty="0"/>
+              <a:t>&gt;</a:t>
             </a:r>
           </a:p>
           <a:p>
@@ -3539,7 +3547,7 @@
               <a:buChar char="•"/>
             </a:pPr>
             <a:r>
-              <a:rPr lang="en-GB" sz="3200" dirty="0"/>
+              <a:rPr lang="en-GB" sz="2800" dirty="0"/>
               <a:t>Represents a piece of work to be completed, possibly with a result.</a:t>
             </a:r>
           </a:p>
@@ -3549,15 +3557,15 @@
               <a:buChar char="•"/>
             </a:pPr>
             <a:r>
-              <a:rPr lang="en-GB" sz="3200" dirty="0"/>
+              <a:rPr lang="en-GB" sz="2800" dirty="0"/>
               <a:t>Like the </a:t>
             </a:r>
             <a:r>
-              <a:rPr lang="en-GB" sz="3200" dirty="0" err="1"/>
+              <a:rPr lang="en-GB" sz="2800" dirty="0" err="1"/>
               <a:t>ThreadPool</a:t>
             </a:r>
             <a:r>
-              <a:rPr lang="en-GB" sz="3200" dirty="0"/>
+              <a:rPr lang="en-GB" sz="2800" dirty="0"/>
               <a:t>, a task does not create its own OS thread.</a:t>
             </a:r>
           </a:p>
@@ -3567,23 +3575,23 @@
               <a:buChar char="•"/>
             </a:pPr>
             <a:r>
-              <a:rPr lang="en-GB" sz="3200" dirty="0"/>
+              <a:rPr lang="en-GB" sz="2800" dirty="0"/>
               <a:t>Tasks are executed by a </a:t>
             </a:r>
             <a:r>
-              <a:rPr lang="en-GB" sz="3200" dirty="0" err="1"/>
+              <a:rPr lang="en-GB" sz="2800" dirty="0" err="1"/>
               <a:t>TaskScheduler</a:t>
             </a:r>
             <a:r>
-              <a:rPr lang="en-GB" sz="3200" dirty="0"/>
+              <a:rPr lang="en-GB" sz="2800" dirty="0"/>
               <a:t>. The default scheduler runs on the </a:t>
             </a:r>
             <a:r>
-              <a:rPr lang="en-GB" sz="3200" dirty="0" err="1"/>
+              <a:rPr lang="en-GB" sz="2800" dirty="0" err="1"/>
               <a:t>ThreadPool</a:t>
             </a:r>
             <a:r>
-              <a:rPr lang="en-GB" sz="3200" dirty="0"/>
+              <a:rPr lang="en-GB" sz="2800" dirty="0"/>
               <a:t>.</a:t>
             </a:r>
           </a:p>
@@ -3593,15 +3601,15 @@
               <a:buChar char="•"/>
             </a:pPr>
             <a:r>
-              <a:rPr lang="en-GB" sz="3200" dirty="0"/>
+              <a:rPr lang="en-GB" sz="2800" dirty="0"/>
               <a:t>Unlike </a:t>
             </a:r>
             <a:r>
-              <a:rPr lang="en-GB" sz="3200" dirty="0" err="1"/>
+              <a:rPr lang="en-GB" sz="2800" dirty="0" err="1"/>
               <a:t>ThreadPool</a:t>
             </a:r>
             <a:r>
-              <a:rPr lang="en-GB" sz="3200" dirty="0"/>
+              <a:rPr lang="en-GB" sz="2800" dirty="0"/>
               <a:t>, Task allows you to find out when it finishes and to return a result., either synchronously or asynchronously.</a:t>
             </a:r>
           </a:p>
@@ -3611,50 +3619,50 @@
               <a:buChar char="•"/>
             </a:pPr>
             <a:r>
-              <a:rPr lang="en-GB" sz="3200" dirty="0"/>
+              <a:rPr lang="en-GB" sz="2800" dirty="0"/>
               <a:t>Since tasks still run on the </a:t>
             </a:r>
             <a:r>
-              <a:rPr lang="en-GB" sz="3200" dirty="0" err="1"/>
+              <a:rPr lang="en-GB" sz="2800" dirty="0" err="1"/>
               <a:t>ThreadPool</a:t>
             </a:r>
             <a:r>
-              <a:rPr lang="en-GB" sz="3200" dirty="0"/>
+              <a:rPr lang="en-GB" sz="2800" dirty="0"/>
               <a:t>, they should not be used for long-running operations. Task does provide however a </a:t>
             </a:r>
             <a:r>
-              <a:rPr lang="en-GB" sz="3200" dirty="0" err="1"/>
+              <a:rPr lang="en-GB" sz="2800" dirty="0" err="1"/>
               <a:t>LongRunning</a:t>
             </a:r>
             <a:r>
-              <a:rPr lang="en-GB" sz="3200" dirty="0"/>
+              <a:rPr lang="en-GB" sz="2800" dirty="0"/>
               <a:t> option, which tells the </a:t>
             </a:r>
             <a:r>
-              <a:rPr lang="en-GB" sz="3200" dirty="0" err="1"/>
+              <a:rPr lang="en-GB" sz="2800" dirty="0" err="1"/>
               <a:t>TaskScheduler</a:t>
             </a:r>
             <a:r>
-              <a:rPr lang="en-GB" sz="3200" dirty="0"/>
+              <a:rPr lang="en-GB" sz="2800" dirty="0"/>
               <a:t> to create a new thread rather than running on the </a:t>
             </a:r>
             <a:r>
-              <a:rPr lang="en-GB" sz="3200" dirty="0" err="1"/>
+              <a:rPr lang="en-GB" sz="2800" dirty="0" err="1"/>
               <a:t>ThreadPool</a:t>
             </a:r>
             <a:r>
-              <a:rPr lang="en-GB" sz="3200" dirty="0"/>
+              <a:rPr lang="en-GB" sz="2800" dirty="0"/>
               <a:t>. </a:t>
             </a:r>
           </a:p>
           <a:p>
-            <a:pPr marL="457200" indent="-457200">
-              <a:buFont typeface="Arial" panose="020B0604020202020204" pitchFamily="34" charset="0"/>
-              <a:buChar char="•"/>
-            </a:pPr>
-            <a:r>
-              <a:rPr lang="en-GB" sz="3200" dirty="0"/>
-              <a:t>All newer high-level concurrency APIs are built on Task. </a:t>
+            <a:pPr algn="ctr"/>
+            <a:br>
+              <a:rPr lang="en-GB" sz="2800" dirty="0"/>
+            </a:br>
+            <a:r>
+              <a:rPr lang="en-GB" sz="2800" b="1" dirty="0"/>
+              <a:t>A Task represents a single operation which is usually run asynchronously</a:t>
             </a:r>
           </a:p>
         </p:txBody>
@@ -3704,7 +3712,7 @@
         <p:spPr>
           <a:xfrm>
             <a:off x="145775" y="132522"/>
-            <a:ext cx="11781182" cy="6001643"/>
+            <a:ext cx="11781182" cy="6494085"/>
           </a:xfrm>
           <a:prstGeom prst="rect">
             <a:avLst/>
@@ -3732,24 +3740,24 @@
             </a:pPr>
             <a:r>
               <a:rPr lang="en-GB" sz="3200" dirty="0"/>
-              <a:t>Task is almost always the best option.</a:t>
-            </a:r>
+              <a:t>Tasks are an easy way of writing methods which can be </a:t>
+            </a:r>
+            <a:r>
+              <a:rPr lang="en-GB" sz="3200"/>
+              <a:t>run asynchronously.</a:t>
+            </a:r>
+          </a:p>
+          <a:p>
+            <a:endParaRPr lang="en-GB" sz="3200" dirty="0"/>
           </a:p>
           <a:p>
             <a:pPr marL="457200" indent="-457200">
               <a:buFont typeface="Arial" panose="020B0604020202020204" pitchFamily="34" charset="0"/>
               <a:buChar char="•"/>
             </a:pPr>
-            <a:endParaRPr lang="en-GB" sz="3200" dirty="0"/>
-          </a:p>
-          <a:p>
-            <a:pPr marL="457200" indent="-457200">
-              <a:buFont typeface="Arial" panose="020B0604020202020204" pitchFamily="34" charset="0"/>
-              <a:buChar char="•"/>
-            </a:pPr>
             <a:r>
               <a:rPr lang="en-GB" sz="3200" dirty="0"/>
-              <a:t>It provides a more powerful API and avoids wasting OS threads.</a:t>
+              <a:t>Task provides a more powerful API and avoids wasting OS threads.</a:t>
             </a:r>
           </a:p>
           <a:p>
@@ -12172,11 +12180,109 @@
           <a:p>
             <a:r>
               <a:rPr lang="en-GB" sz="3200" b="1" dirty="0"/>
-              <a:t>In C#, synchronous operations look like this:</a:t>
+              <a:t>In C#, </a:t>
+            </a:r>
+            <a:r>
+              <a:rPr lang="en-GB" sz="3200" b="1"/>
+              <a:t>synchronous methods </a:t>
+            </a:r>
+            <a:r>
+              <a:rPr lang="en-GB" sz="3200" b="1" dirty="0"/>
+              <a:t>look like this:</a:t>
             </a:r>
           </a:p>
         </p:txBody>
       </p:sp>
+      <p:pic>
+        <p:nvPicPr>
+          <p:cNvPr id="2" name="Picture 1">
+            <a:extLst>
+              <a:ext uri="{FF2B5EF4-FFF2-40B4-BE49-F238E27FC236}">
+                <a16:creationId xmlns:a16="http://schemas.microsoft.com/office/drawing/2014/main" id="{136A1FC5-97AC-4D35-A13E-09392AB806BF}"/>
+              </a:ext>
+            </a:extLst>
+          </p:cNvPr>
+          <p:cNvPicPr>
+            <a:picLocks noChangeAspect="1"/>
+          </p:cNvPicPr>
+          <p:nvPr/>
+        </p:nvPicPr>
+        <p:blipFill>
+          <a:blip r:embed="rId2"/>
+          <a:stretch>
+            <a:fillRect/>
+          </a:stretch>
+        </p:blipFill>
+        <p:spPr>
+          <a:xfrm>
+            <a:off x="5650335" y="1211488"/>
+            <a:ext cx="6175022" cy="2325282"/>
+          </a:xfrm>
+          <a:prstGeom prst="rect">
+            <a:avLst/>
+          </a:prstGeom>
+        </p:spPr>
+      </p:pic>
+      <p:pic>
+        <p:nvPicPr>
+          <p:cNvPr id="3" name="Picture 2">
+            <a:extLst>
+              <a:ext uri="{FF2B5EF4-FFF2-40B4-BE49-F238E27FC236}">
+                <a16:creationId xmlns:a16="http://schemas.microsoft.com/office/drawing/2014/main" id="{A5715088-701E-4AE3-B68C-8DF783327A99}"/>
+              </a:ext>
+            </a:extLst>
+          </p:cNvPr>
+          <p:cNvPicPr>
+            <a:picLocks noChangeAspect="1"/>
+          </p:cNvPicPr>
+          <p:nvPr/>
+        </p:nvPicPr>
+        <p:blipFill>
+          <a:blip r:embed="rId3"/>
+          <a:stretch>
+            <a:fillRect/>
+          </a:stretch>
+        </p:blipFill>
+        <p:spPr>
+          <a:xfrm>
+            <a:off x="526207" y="1211488"/>
+            <a:ext cx="4591050" cy="2105025"/>
+          </a:xfrm>
+          <a:prstGeom prst="rect">
+            <a:avLst/>
+          </a:prstGeom>
+        </p:spPr>
+      </p:pic>
+      <p:pic>
+        <p:nvPicPr>
+          <p:cNvPr id="5" name="Picture 4">
+            <a:extLst>
+              <a:ext uri="{FF2B5EF4-FFF2-40B4-BE49-F238E27FC236}">
+                <a16:creationId xmlns:a16="http://schemas.microsoft.com/office/drawing/2014/main" id="{4F9BE8B1-40C1-42F0-A075-B369F7D0DE93}"/>
+              </a:ext>
+            </a:extLst>
+          </p:cNvPr>
+          <p:cNvPicPr>
+            <a:picLocks noChangeAspect="1"/>
+          </p:cNvPicPr>
+          <p:nvPr/>
+        </p:nvPicPr>
+        <p:blipFill>
+          <a:blip r:embed="rId4"/>
+          <a:stretch>
+            <a:fillRect/>
+          </a:stretch>
+        </p:blipFill>
+        <p:spPr>
+          <a:xfrm>
+            <a:off x="2057400" y="4183239"/>
+            <a:ext cx="8077200" cy="1562100"/>
+          </a:xfrm>
+          <a:prstGeom prst="rect">
+            <a:avLst/>
+          </a:prstGeom>
+        </p:spPr>
+      </p:pic>
     </p:spTree>
     <p:extLst>
       <p:ext uri="{BB962C8B-B14F-4D97-AF65-F5344CB8AC3E}">

</xml_diff>

<commit_message>
Improved slides and added some asynchronous operation examples
</commit_message>
<xml_diff>
--- a/Async and await presentation.pptx
+++ b/Async and await presentation.pptx
@@ -7,20 +7,20 @@
   <p:sldIdLst>
     <p:sldId id="256" r:id="rId2"/>
     <p:sldId id="320" r:id="rId3"/>
-    <p:sldId id="262" r:id="rId4"/>
-    <p:sldId id="264" r:id="rId5"/>
-    <p:sldId id="321" r:id="rId6"/>
-    <p:sldId id="322" r:id="rId7"/>
+    <p:sldId id="321" r:id="rId4"/>
+    <p:sldId id="322" r:id="rId5"/>
+    <p:sldId id="262" r:id="rId6"/>
+    <p:sldId id="264" r:id="rId7"/>
     <p:sldId id="323" r:id="rId8"/>
     <p:sldId id="257" r:id="rId9"/>
     <p:sldId id="258" r:id="rId10"/>
     <p:sldId id="259" r:id="rId11"/>
     <p:sldId id="260" r:id="rId12"/>
-    <p:sldId id="317" r:id="rId13"/>
-    <p:sldId id="266" r:id="rId14"/>
-    <p:sldId id="319" r:id="rId15"/>
-    <p:sldId id="318" r:id="rId16"/>
-    <p:sldId id="261" r:id="rId17"/>
+    <p:sldId id="261" r:id="rId13"/>
+    <p:sldId id="317" r:id="rId14"/>
+    <p:sldId id="266" r:id="rId15"/>
+    <p:sldId id="319" r:id="rId16"/>
+    <p:sldId id="318" r:id="rId17"/>
     <p:sldId id="265" r:id="rId18"/>
     <p:sldId id="267" r:id="rId19"/>
     <p:sldId id="268" r:id="rId20"/>
@@ -325,7 +325,7 @@
           <a:p>
             <a:fld id="{BFEF692B-FC3E-4552-B87F-4B5A00EB12B2}" type="datetimeFigureOut">
               <a:rPr lang="en-GB" smtClean="0"/>
-              <a:t>03/03/2020</a:t>
+              <a:t>04/03/2020</a:t>
             </a:fld>
             <a:endParaRPr lang="en-GB"/>
           </a:p>
@@ -525,7 +525,7 @@
           <a:p>
             <a:fld id="{BFEF692B-FC3E-4552-B87F-4B5A00EB12B2}" type="datetimeFigureOut">
               <a:rPr lang="en-GB" smtClean="0"/>
-              <a:t>03/03/2020</a:t>
+              <a:t>04/03/2020</a:t>
             </a:fld>
             <a:endParaRPr lang="en-GB"/>
           </a:p>
@@ -735,7 +735,7 @@
           <a:p>
             <a:fld id="{BFEF692B-FC3E-4552-B87F-4B5A00EB12B2}" type="datetimeFigureOut">
               <a:rPr lang="en-GB" smtClean="0"/>
-              <a:t>03/03/2020</a:t>
+              <a:t>04/03/2020</a:t>
             </a:fld>
             <a:endParaRPr lang="en-GB"/>
           </a:p>
@@ -935,7 +935,7 @@
           <a:p>
             <a:fld id="{BFEF692B-FC3E-4552-B87F-4B5A00EB12B2}" type="datetimeFigureOut">
               <a:rPr lang="en-GB" smtClean="0"/>
-              <a:t>03/03/2020</a:t>
+              <a:t>04/03/2020</a:t>
             </a:fld>
             <a:endParaRPr lang="en-GB"/>
           </a:p>
@@ -1211,7 +1211,7 @@
           <a:p>
             <a:fld id="{BFEF692B-FC3E-4552-B87F-4B5A00EB12B2}" type="datetimeFigureOut">
               <a:rPr lang="en-GB" smtClean="0"/>
-              <a:t>03/03/2020</a:t>
+              <a:t>04/03/2020</a:t>
             </a:fld>
             <a:endParaRPr lang="en-GB"/>
           </a:p>
@@ -1479,7 +1479,7 @@
           <a:p>
             <a:fld id="{BFEF692B-FC3E-4552-B87F-4B5A00EB12B2}" type="datetimeFigureOut">
               <a:rPr lang="en-GB" smtClean="0"/>
-              <a:t>03/03/2020</a:t>
+              <a:t>04/03/2020</a:t>
             </a:fld>
             <a:endParaRPr lang="en-GB"/>
           </a:p>
@@ -1894,7 +1894,7 @@
           <a:p>
             <a:fld id="{BFEF692B-FC3E-4552-B87F-4B5A00EB12B2}" type="datetimeFigureOut">
               <a:rPr lang="en-GB" smtClean="0"/>
-              <a:t>03/03/2020</a:t>
+              <a:t>04/03/2020</a:t>
             </a:fld>
             <a:endParaRPr lang="en-GB"/>
           </a:p>
@@ -2036,7 +2036,7 @@
           <a:p>
             <a:fld id="{BFEF692B-FC3E-4552-B87F-4B5A00EB12B2}" type="datetimeFigureOut">
               <a:rPr lang="en-GB" smtClean="0"/>
-              <a:t>03/03/2020</a:t>
+              <a:t>04/03/2020</a:t>
             </a:fld>
             <a:endParaRPr lang="en-GB"/>
           </a:p>
@@ -2149,7 +2149,7 @@
           <a:p>
             <a:fld id="{BFEF692B-FC3E-4552-B87F-4B5A00EB12B2}" type="datetimeFigureOut">
               <a:rPr lang="en-GB" smtClean="0"/>
-              <a:t>03/03/2020</a:t>
+              <a:t>04/03/2020</a:t>
             </a:fld>
             <a:endParaRPr lang="en-GB"/>
           </a:p>
@@ -2462,7 +2462,7 @@
           <a:p>
             <a:fld id="{BFEF692B-FC3E-4552-B87F-4B5A00EB12B2}" type="datetimeFigureOut">
               <a:rPr lang="en-GB" smtClean="0"/>
-              <a:t>03/03/2020</a:t>
+              <a:t>04/03/2020</a:t>
             </a:fld>
             <a:endParaRPr lang="en-GB"/>
           </a:p>
@@ -2751,7 +2751,7 @@
           <a:p>
             <a:fld id="{BFEF692B-FC3E-4552-B87F-4B5A00EB12B2}" type="datetimeFigureOut">
               <a:rPr lang="en-GB" smtClean="0"/>
-              <a:t>03/03/2020</a:t>
+              <a:t>04/03/2020</a:t>
             </a:fld>
             <a:endParaRPr lang="en-GB"/>
           </a:p>
@@ -2994,7 +2994,7 @@
           <a:p>
             <a:fld id="{BFEF692B-FC3E-4552-B87F-4B5A00EB12B2}" type="datetimeFigureOut">
               <a:rPr lang="en-GB" smtClean="0"/>
-              <a:t>03/03/2020</a:t>
+              <a:t>04/03/2020</a:t>
             </a:fld>
             <a:endParaRPr lang="en-GB"/>
           </a:p>
@@ -3841,7 +3841,7 @@
         <p:spPr>
           <a:xfrm>
             <a:off x="145775" y="132522"/>
-            <a:ext cx="11781182" cy="584775"/>
+            <a:ext cx="11781182" cy="6001643"/>
           </a:xfrm>
           <a:prstGeom prst="rect">
             <a:avLst/>
@@ -3856,132 +3856,87 @@
           <a:p>
             <a:r>
               <a:rPr lang="en-GB" sz="3200" b="1" dirty="0"/>
-              <a:t>Here are some example of synchronous methods in C#:</a:t>
-            </a:r>
-          </a:p>
-        </p:txBody>
-      </p:sp>
-      <p:pic>
-        <p:nvPicPr>
-          <p:cNvPr id="2" name="Picture 1">
-            <a:extLst>
-              <a:ext uri="{FF2B5EF4-FFF2-40B4-BE49-F238E27FC236}">
-                <a16:creationId xmlns:a16="http://schemas.microsoft.com/office/drawing/2014/main" id="{136A1FC5-97AC-4D35-A13E-09392AB806BF}"/>
-              </a:ext>
-            </a:extLst>
-          </p:cNvPr>
-          <p:cNvPicPr>
-            <a:picLocks noChangeAspect="1"/>
-          </p:cNvPicPr>
-          <p:nvPr/>
-        </p:nvPicPr>
-        <p:blipFill>
-          <a:blip r:embed="rId2"/>
-          <a:stretch>
-            <a:fillRect/>
-          </a:stretch>
-        </p:blipFill>
-        <p:spPr>
-          <a:xfrm>
-            <a:off x="5650335" y="1211488"/>
-            <a:ext cx="6175022" cy="2325282"/>
-          </a:xfrm>
-          <a:prstGeom prst="rect">
-            <a:avLst/>
-          </a:prstGeom>
-        </p:spPr>
-      </p:pic>
-      <p:pic>
-        <p:nvPicPr>
-          <p:cNvPr id="3" name="Picture 2">
-            <a:extLst>
-              <a:ext uri="{FF2B5EF4-FFF2-40B4-BE49-F238E27FC236}">
-                <a16:creationId xmlns:a16="http://schemas.microsoft.com/office/drawing/2014/main" id="{A5715088-701E-4AE3-B68C-8DF783327A99}"/>
-              </a:ext>
-            </a:extLst>
-          </p:cNvPr>
-          <p:cNvPicPr>
-            <a:picLocks noChangeAspect="1"/>
-          </p:cNvPicPr>
-          <p:nvPr/>
-        </p:nvPicPr>
-        <p:blipFill>
-          <a:blip r:embed="rId3"/>
-          <a:stretch>
-            <a:fillRect/>
-          </a:stretch>
-        </p:blipFill>
-        <p:spPr>
-          <a:xfrm>
-            <a:off x="526207" y="1211488"/>
-            <a:ext cx="4591050" cy="2105025"/>
-          </a:xfrm>
-          <a:prstGeom prst="rect">
-            <a:avLst/>
-          </a:prstGeom>
-        </p:spPr>
-      </p:pic>
-      <p:pic>
-        <p:nvPicPr>
-          <p:cNvPr id="5" name="Picture 4">
-            <a:extLst>
-              <a:ext uri="{FF2B5EF4-FFF2-40B4-BE49-F238E27FC236}">
-                <a16:creationId xmlns:a16="http://schemas.microsoft.com/office/drawing/2014/main" id="{4F9BE8B1-40C1-42F0-A075-B369F7D0DE93}"/>
-              </a:ext>
-            </a:extLst>
-          </p:cNvPr>
-          <p:cNvPicPr>
-            <a:picLocks noChangeAspect="1"/>
-          </p:cNvPicPr>
-          <p:nvPr/>
-        </p:nvPicPr>
-        <p:blipFill>
-          <a:blip r:embed="rId4"/>
-          <a:stretch>
-            <a:fillRect/>
-          </a:stretch>
-        </p:blipFill>
-        <p:spPr>
-          <a:xfrm>
-            <a:off x="1870788" y="3698047"/>
-            <a:ext cx="8077200" cy="1562100"/>
-          </a:xfrm>
-          <a:prstGeom prst="rect">
-            <a:avLst/>
-          </a:prstGeom>
-        </p:spPr>
-      </p:pic>
-      <p:sp>
-        <p:nvSpPr>
-          <p:cNvPr id="7" name="Rectangle 6">
-            <a:extLst>
-              <a:ext uri="{FF2B5EF4-FFF2-40B4-BE49-F238E27FC236}">
-                <a16:creationId xmlns:a16="http://schemas.microsoft.com/office/drawing/2014/main" id="{F360AEFE-75F4-45D0-9D24-4D6C2B4E87B2}"/>
-              </a:ext>
-            </a:extLst>
-          </p:cNvPr>
-          <p:cNvSpPr/>
-          <p:nvPr/>
-        </p:nvSpPr>
-        <p:spPr>
-          <a:xfrm>
-            <a:off x="145775" y="5718406"/>
-            <a:ext cx="11679581" cy="584775"/>
-          </a:xfrm>
-          <a:prstGeom prst="rect">
-            <a:avLst/>
-          </a:prstGeom>
-        </p:spPr>
-        <p:txBody>
-          <a:bodyPr wrap="square">
-            <a:spAutoFit/>
-          </a:bodyPr>
-          <a:lstStyle/>
-          <a:p>
-            <a:pPr algn="ctr"/>
-            <a:r>
-              <a:rPr lang="en-GB" sz="3200" b="1" dirty="0"/>
-              <a:t>Notice that all of these methods are CPU-bound</a:t>
+              <a:t>Summary</a:t>
+            </a:r>
+          </a:p>
+          <a:p>
+            <a:endParaRPr lang="en-GB" sz="3200" b="1" dirty="0"/>
+          </a:p>
+          <a:p>
+            <a:pPr marL="457200" indent="-457200">
+              <a:buFont typeface="Arial" panose="020B0604020202020204" pitchFamily="34" charset="0"/>
+              <a:buChar char="•"/>
+            </a:pPr>
+            <a:r>
+              <a:rPr lang="en-GB" sz="3200" dirty="0"/>
+              <a:t>Tasks are an easy way of writing methods which can be run asynchronously.</a:t>
+            </a:r>
+          </a:p>
+          <a:p>
+            <a:endParaRPr lang="en-GB" sz="3200" dirty="0"/>
+          </a:p>
+          <a:p>
+            <a:pPr marL="457200" indent="-457200">
+              <a:buFont typeface="Arial" panose="020B0604020202020204" pitchFamily="34" charset="0"/>
+              <a:buChar char="•"/>
+            </a:pPr>
+            <a:r>
+              <a:rPr lang="en-GB" sz="3200" dirty="0"/>
+              <a:t>Task provides a powerful API and avoids wasting OS threads.</a:t>
+            </a:r>
+          </a:p>
+          <a:p>
+            <a:pPr marL="457200" indent="-457200">
+              <a:buFont typeface="Arial" panose="020B0604020202020204" pitchFamily="34" charset="0"/>
+              <a:buChar char="•"/>
+            </a:pPr>
+            <a:endParaRPr lang="en-GB" sz="3200" dirty="0"/>
+          </a:p>
+          <a:p>
+            <a:pPr marL="457200" indent="-457200">
+              <a:buFont typeface="Arial" panose="020B0604020202020204" pitchFamily="34" charset="0"/>
+              <a:buChar char="•"/>
+            </a:pPr>
+            <a:r>
+              <a:rPr lang="en-GB" sz="3200" dirty="0"/>
+              <a:t>It is extremely unlikely that you will ever need to use the Thread or </a:t>
+            </a:r>
+            <a:r>
+              <a:rPr lang="en-GB" sz="3200" dirty="0" err="1"/>
+              <a:t>ThreadPool</a:t>
+            </a:r>
+            <a:r>
+              <a:rPr lang="en-GB" sz="3200" dirty="0"/>
+              <a:t> classes. </a:t>
+            </a:r>
+          </a:p>
+          <a:p>
+            <a:pPr marL="457200" indent="-457200">
+              <a:buFont typeface="Arial" panose="020B0604020202020204" pitchFamily="34" charset="0"/>
+              <a:buChar char="•"/>
+            </a:pPr>
+            <a:endParaRPr lang="en-GB" sz="3200" dirty="0"/>
+          </a:p>
+          <a:p>
+            <a:pPr marL="457200" indent="-457200">
+              <a:buFont typeface="Arial" panose="020B0604020202020204" pitchFamily="34" charset="0"/>
+              <a:buChar char="•"/>
+            </a:pPr>
+            <a:r>
+              <a:rPr lang="en-GB" sz="3200" dirty="0"/>
+              <a:t>Unless you have a good reason, </a:t>
+            </a:r>
+            <a:r>
+              <a:rPr lang="en-GB" sz="3200" b="1" u="sng" dirty="0"/>
+              <a:t>completely ignore Thread and </a:t>
+            </a:r>
+            <a:r>
+              <a:rPr lang="en-GB" sz="3200" b="1" u="sng" dirty="0" err="1"/>
+              <a:t>ThreadPool</a:t>
+            </a:r>
+            <a:r>
+              <a:rPr lang="en-GB" sz="3200" b="1" u="sng" dirty="0"/>
+              <a:t>. Only think about Task!</a:t>
             </a:r>
           </a:p>
         </p:txBody>
@@ -3989,7 +3944,7 @@
     </p:spTree>
     <p:extLst>
       <p:ext uri="{BB962C8B-B14F-4D97-AF65-F5344CB8AC3E}">
-        <p14:creationId xmlns:p14="http://schemas.microsoft.com/office/powerpoint/2010/main" val="220451678"/>
+        <p14:creationId xmlns:p14="http://schemas.microsoft.com/office/powerpoint/2010/main" val="1198929045"/>
       </p:ext>
     </p:extLst>
   </p:cSld>
@@ -4031,7 +3986,7 @@
         <p:spPr>
           <a:xfrm>
             <a:off x="145775" y="132522"/>
-            <a:ext cx="11781182" cy="6555641"/>
+            <a:ext cx="11781182" cy="584775"/>
           </a:xfrm>
           <a:prstGeom prst="rect">
             <a:avLst/>
@@ -4045,87 +4000,133 @@
           <a:lstStyle/>
           <a:p>
             <a:r>
-              <a:rPr lang="en-GB" sz="2800" b="1" dirty="0"/>
-              <a:t>Some (possibly confusing) facts about synchronous and asynchronous code</a:t>
-            </a:r>
-          </a:p>
-          <a:p>
-            <a:endParaRPr lang="en-GB" sz="2800" dirty="0"/>
-          </a:p>
-          <a:p>
-            <a:pPr marL="457200" indent="-457200">
-              <a:buFont typeface="Arial" panose="020B0604020202020204" pitchFamily="34" charset="0"/>
-              <a:buChar char="•"/>
-            </a:pPr>
-            <a:r>
-              <a:rPr lang="en-GB" sz="2800" dirty="0"/>
-              <a:t>Synchronous code may or may not run in the same thread.</a:t>
-            </a:r>
-          </a:p>
-          <a:p>
-            <a:pPr marL="457200" indent="-457200">
-              <a:buFont typeface="Arial" panose="020B0604020202020204" pitchFamily="34" charset="0"/>
-              <a:buChar char="•"/>
-            </a:pPr>
-            <a:endParaRPr lang="en-GB" sz="2800" dirty="0"/>
-          </a:p>
-          <a:p>
-            <a:pPr marL="457200" indent="-457200">
-              <a:buFont typeface="Arial" panose="020B0604020202020204" pitchFamily="34" charset="0"/>
-              <a:buChar char="•"/>
-            </a:pPr>
-            <a:r>
-              <a:rPr lang="en-GB" sz="2800" dirty="0"/>
-              <a:t>Synchronous operations can be performed sequentially, or simultaneously. </a:t>
-            </a:r>
-          </a:p>
-          <a:p>
-            <a:pPr marL="457200" indent="-457200">
-              <a:buFont typeface="Arial" panose="020B0604020202020204" pitchFamily="34" charset="0"/>
-              <a:buChar char="•"/>
-            </a:pPr>
-            <a:endParaRPr lang="en-GB" sz="2800" dirty="0"/>
-          </a:p>
-          <a:p>
-            <a:pPr marL="457200" indent="-457200">
-              <a:buFont typeface="Arial" panose="020B0604020202020204" pitchFamily="34" charset="0"/>
-              <a:buChar char="•"/>
-            </a:pPr>
-            <a:r>
-              <a:rPr lang="en-GB" sz="2800" dirty="0"/>
-              <a:t>Asynchronous operations may or may not run in multiple threads. </a:t>
-            </a:r>
-          </a:p>
-          <a:p>
-            <a:pPr marL="457200" indent="-457200">
-              <a:buFont typeface="Arial" panose="020B0604020202020204" pitchFamily="34" charset="0"/>
-              <a:buChar char="•"/>
-            </a:pPr>
-            <a:endParaRPr lang="en-GB" sz="2800" dirty="0"/>
-          </a:p>
-          <a:p>
-            <a:pPr marL="457200" indent="-457200">
-              <a:buFont typeface="Arial" panose="020B0604020202020204" pitchFamily="34" charset="0"/>
-              <a:buChar char="•"/>
-            </a:pPr>
-            <a:r>
-              <a:rPr lang="en-GB" sz="2800" dirty="0"/>
-              <a:t>Asynchronous operations can be just scheduled but never guaranteed to run at a certain time. </a:t>
-            </a:r>
-          </a:p>
-          <a:p>
-            <a:endParaRPr lang="en-GB" sz="2800" dirty="0"/>
-          </a:p>
-          <a:p>
-            <a:r>
-              <a:rPr lang="en-GB" sz="2800" dirty="0"/>
-              <a:t>Asynchrony has nothing to do with “other threads”, “background”, “simultaneous”, or “concurrent”. All of those things are irrelevant. </a:t>
-            </a:r>
-          </a:p>
-          <a:p>
-            <a:r>
-              <a:rPr lang="en-GB" sz="2800" dirty="0"/>
-              <a:t>It’s just a way to design code where you can avoid both resource contention and thread blocking. </a:t>
+              <a:rPr lang="en-GB" sz="3200" b="1" dirty="0"/>
+              <a:t>Here are some example of synchronous methods in C#:</a:t>
+            </a:r>
+          </a:p>
+        </p:txBody>
+      </p:sp>
+      <p:pic>
+        <p:nvPicPr>
+          <p:cNvPr id="2" name="Picture 1">
+            <a:extLst>
+              <a:ext uri="{FF2B5EF4-FFF2-40B4-BE49-F238E27FC236}">
+                <a16:creationId xmlns:a16="http://schemas.microsoft.com/office/drawing/2014/main" id="{136A1FC5-97AC-4D35-A13E-09392AB806BF}"/>
+              </a:ext>
+            </a:extLst>
+          </p:cNvPr>
+          <p:cNvPicPr>
+            <a:picLocks noChangeAspect="1"/>
+          </p:cNvPicPr>
+          <p:nvPr/>
+        </p:nvPicPr>
+        <p:blipFill>
+          <a:blip r:embed="rId2"/>
+          <a:stretch>
+            <a:fillRect/>
+          </a:stretch>
+        </p:blipFill>
+        <p:spPr>
+          <a:xfrm>
+            <a:off x="5650335" y="1211488"/>
+            <a:ext cx="6175022" cy="2325282"/>
+          </a:xfrm>
+          <a:prstGeom prst="rect">
+            <a:avLst/>
+          </a:prstGeom>
+        </p:spPr>
+      </p:pic>
+      <p:pic>
+        <p:nvPicPr>
+          <p:cNvPr id="3" name="Picture 2">
+            <a:extLst>
+              <a:ext uri="{FF2B5EF4-FFF2-40B4-BE49-F238E27FC236}">
+                <a16:creationId xmlns:a16="http://schemas.microsoft.com/office/drawing/2014/main" id="{A5715088-701E-4AE3-B68C-8DF783327A99}"/>
+              </a:ext>
+            </a:extLst>
+          </p:cNvPr>
+          <p:cNvPicPr>
+            <a:picLocks noChangeAspect="1"/>
+          </p:cNvPicPr>
+          <p:nvPr/>
+        </p:nvPicPr>
+        <p:blipFill>
+          <a:blip r:embed="rId3"/>
+          <a:stretch>
+            <a:fillRect/>
+          </a:stretch>
+        </p:blipFill>
+        <p:spPr>
+          <a:xfrm>
+            <a:off x="526207" y="1211488"/>
+            <a:ext cx="4591050" cy="2105025"/>
+          </a:xfrm>
+          <a:prstGeom prst="rect">
+            <a:avLst/>
+          </a:prstGeom>
+        </p:spPr>
+      </p:pic>
+      <p:pic>
+        <p:nvPicPr>
+          <p:cNvPr id="5" name="Picture 4">
+            <a:extLst>
+              <a:ext uri="{FF2B5EF4-FFF2-40B4-BE49-F238E27FC236}">
+                <a16:creationId xmlns:a16="http://schemas.microsoft.com/office/drawing/2014/main" id="{4F9BE8B1-40C1-42F0-A075-B369F7D0DE93}"/>
+              </a:ext>
+            </a:extLst>
+          </p:cNvPr>
+          <p:cNvPicPr>
+            <a:picLocks noChangeAspect="1"/>
+          </p:cNvPicPr>
+          <p:nvPr/>
+        </p:nvPicPr>
+        <p:blipFill>
+          <a:blip r:embed="rId4"/>
+          <a:stretch>
+            <a:fillRect/>
+          </a:stretch>
+        </p:blipFill>
+        <p:spPr>
+          <a:xfrm>
+            <a:off x="1870788" y="3698047"/>
+            <a:ext cx="8077200" cy="1562100"/>
+          </a:xfrm>
+          <a:prstGeom prst="rect">
+            <a:avLst/>
+          </a:prstGeom>
+        </p:spPr>
+      </p:pic>
+      <p:sp>
+        <p:nvSpPr>
+          <p:cNvPr id="7" name="Rectangle 6">
+            <a:extLst>
+              <a:ext uri="{FF2B5EF4-FFF2-40B4-BE49-F238E27FC236}">
+                <a16:creationId xmlns:a16="http://schemas.microsoft.com/office/drawing/2014/main" id="{F360AEFE-75F4-45D0-9D24-4D6C2B4E87B2}"/>
+              </a:ext>
+            </a:extLst>
+          </p:cNvPr>
+          <p:cNvSpPr/>
+          <p:nvPr/>
+        </p:nvSpPr>
+        <p:spPr>
+          <a:xfrm>
+            <a:off x="145775" y="5718406"/>
+            <a:ext cx="11679581" cy="584775"/>
+          </a:xfrm>
+          <a:prstGeom prst="rect">
+            <a:avLst/>
+          </a:prstGeom>
+        </p:spPr>
+        <p:txBody>
+          <a:bodyPr wrap="square">
+            <a:spAutoFit/>
+          </a:bodyPr>
+          <a:lstStyle/>
+          <a:p>
+            <a:pPr algn="ctr"/>
+            <a:r>
+              <a:rPr lang="en-GB" sz="3200" b="1" dirty="0"/>
+              <a:t>Notice that all of these methods are CPU-bound</a:t>
             </a:r>
           </a:p>
         </p:txBody>
@@ -4133,7 +4134,7 @@
     </p:spTree>
     <p:extLst>
       <p:ext uri="{BB962C8B-B14F-4D97-AF65-F5344CB8AC3E}">
-        <p14:creationId xmlns:p14="http://schemas.microsoft.com/office/powerpoint/2010/main" val="777985352"/>
+        <p14:creationId xmlns:p14="http://schemas.microsoft.com/office/powerpoint/2010/main" val="220451678"/>
       </p:ext>
     </p:extLst>
   </p:cSld>
@@ -4175,7 +4176,7 @@
         <p:spPr>
           <a:xfrm>
             <a:off x="145775" y="132522"/>
-            <a:ext cx="11781182" cy="584775"/>
+            <a:ext cx="11781182" cy="6555641"/>
           </a:xfrm>
           <a:prstGeom prst="rect">
             <a:avLst/>
@@ -4189,8 +4190,87 @@
           <a:lstStyle/>
           <a:p>
             <a:r>
-              <a:rPr lang="en-GB" sz="3200" b="1" dirty="0"/>
-              <a:t>Here are some example of asynchronous methods in C#:</a:t>
+              <a:rPr lang="en-GB" sz="2800" b="1" dirty="0"/>
+              <a:t>Some (possibly confusing) facts about synchronous and asynchronous code</a:t>
+            </a:r>
+          </a:p>
+          <a:p>
+            <a:endParaRPr lang="en-GB" sz="2800" dirty="0"/>
+          </a:p>
+          <a:p>
+            <a:pPr marL="457200" indent="-457200">
+              <a:buFont typeface="Arial" panose="020B0604020202020204" pitchFamily="34" charset="0"/>
+              <a:buChar char="•"/>
+            </a:pPr>
+            <a:r>
+              <a:rPr lang="en-GB" sz="2800" dirty="0"/>
+              <a:t>Synchronous code may or may not run in the same thread.</a:t>
+            </a:r>
+          </a:p>
+          <a:p>
+            <a:pPr marL="457200" indent="-457200">
+              <a:buFont typeface="Arial" panose="020B0604020202020204" pitchFamily="34" charset="0"/>
+              <a:buChar char="•"/>
+            </a:pPr>
+            <a:endParaRPr lang="en-GB" sz="2800" dirty="0"/>
+          </a:p>
+          <a:p>
+            <a:pPr marL="457200" indent="-457200">
+              <a:buFont typeface="Arial" panose="020B0604020202020204" pitchFamily="34" charset="0"/>
+              <a:buChar char="•"/>
+            </a:pPr>
+            <a:r>
+              <a:rPr lang="en-GB" sz="2800" dirty="0"/>
+              <a:t>Synchronous operations can be performed sequentially, or simultaneously. </a:t>
+            </a:r>
+          </a:p>
+          <a:p>
+            <a:pPr marL="457200" indent="-457200">
+              <a:buFont typeface="Arial" panose="020B0604020202020204" pitchFamily="34" charset="0"/>
+              <a:buChar char="•"/>
+            </a:pPr>
+            <a:endParaRPr lang="en-GB" sz="2800" dirty="0"/>
+          </a:p>
+          <a:p>
+            <a:pPr marL="457200" indent="-457200">
+              <a:buFont typeface="Arial" panose="020B0604020202020204" pitchFamily="34" charset="0"/>
+              <a:buChar char="•"/>
+            </a:pPr>
+            <a:r>
+              <a:rPr lang="en-GB" sz="2800" dirty="0"/>
+              <a:t>Asynchronous operations may or may not run in multiple threads. </a:t>
+            </a:r>
+          </a:p>
+          <a:p>
+            <a:pPr marL="457200" indent="-457200">
+              <a:buFont typeface="Arial" panose="020B0604020202020204" pitchFamily="34" charset="0"/>
+              <a:buChar char="•"/>
+            </a:pPr>
+            <a:endParaRPr lang="en-GB" sz="2800" dirty="0"/>
+          </a:p>
+          <a:p>
+            <a:pPr marL="457200" indent="-457200">
+              <a:buFont typeface="Arial" panose="020B0604020202020204" pitchFamily="34" charset="0"/>
+              <a:buChar char="•"/>
+            </a:pPr>
+            <a:r>
+              <a:rPr lang="en-GB" sz="2800" dirty="0"/>
+              <a:t>Asynchronous operations can be just scheduled but never guaranteed to run at a certain time. </a:t>
+            </a:r>
+          </a:p>
+          <a:p>
+            <a:endParaRPr lang="en-GB" sz="2800" dirty="0"/>
+          </a:p>
+          <a:p>
+            <a:r>
+              <a:rPr lang="en-GB" sz="2800" dirty="0"/>
+              <a:t>Asynchrony has nothing to do with “other threads”, “background”, “simultaneous”, or “concurrent”. All of those things are irrelevant. </a:t>
+            </a:r>
+          </a:p>
+          <a:p>
+            <a:r>
+              <a:rPr lang="en-GB" sz="2800" dirty="0"/>
+              <a:t>It’s just a way to design code where you can avoid both resource contention and thread blocking. </a:t>
             </a:r>
           </a:p>
         </p:txBody>
@@ -4198,7 +4278,7 @@
     </p:spTree>
     <p:extLst>
       <p:ext uri="{BB962C8B-B14F-4D97-AF65-F5344CB8AC3E}">
-        <p14:creationId xmlns:p14="http://schemas.microsoft.com/office/powerpoint/2010/main" val="1723273691"/>
+        <p14:creationId xmlns:p14="http://schemas.microsoft.com/office/powerpoint/2010/main" val="777985352"/>
       </p:ext>
     </p:extLst>
   </p:cSld>
@@ -4240,7 +4320,7 @@
         <p:spPr>
           <a:xfrm>
             <a:off x="145775" y="132522"/>
-            <a:ext cx="11781182" cy="5016758"/>
+            <a:ext cx="11781182" cy="584775"/>
           </a:xfrm>
           <a:prstGeom prst="rect">
             <a:avLst/>
@@ -4254,67 +4334,8 @@
           <a:lstStyle/>
           <a:p>
             <a:r>
-              <a:rPr lang="en-GB" sz="3200" b="1" dirty="0" err="1"/>
-              <a:t>Task.Run</a:t>
-            </a:r>
-            <a:endParaRPr lang="en-GB" sz="3200" b="1" dirty="0"/>
-          </a:p>
-          <a:p>
-            <a:endParaRPr lang="en-GB" sz="3200" b="1" dirty="0"/>
-          </a:p>
-          <a:p>
-            <a:r>
-              <a:rPr lang="en-GB" sz="3200" b="1" dirty="0" err="1"/>
-              <a:t>Task.Start</a:t>
-            </a:r>
-            <a:endParaRPr lang="en-GB" sz="3200" b="1" dirty="0"/>
-          </a:p>
-          <a:p>
-            <a:endParaRPr lang="en-GB" sz="3200" b="1" dirty="0"/>
-          </a:p>
-          <a:p>
-            <a:r>
-              <a:rPr lang="en-GB" sz="3200" b="1" dirty="0" err="1"/>
-              <a:t>Task.Wait</a:t>
-            </a:r>
-            <a:endParaRPr lang="en-GB" sz="3200" b="1" dirty="0"/>
-          </a:p>
-          <a:p>
-            <a:endParaRPr lang="en-GB" sz="3200" b="1" dirty="0"/>
-          </a:p>
-          <a:p>
-            <a:r>
-              <a:rPr lang="en-GB" sz="3200" b="1" dirty="0" err="1"/>
-              <a:t>Task.RunSynchronously</a:t>
-            </a:r>
-            <a:endParaRPr lang="en-GB" sz="3200" b="1" dirty="0"/>
-          </a:p>
-          <a:p>
-            <a:endParaRPr lang="en-GB" sz="3200" b="1" dirty="0"/>
-          </a:p>
-          <a:p>
-            <a:endParaRPr lang="en-GB" sz="3200" b="1" dirty="0"/>
-          </a:p>
-          <a:p>
-            <a:r>
               <a:rPr lang="en-GB" sz="3200" b="1" dirty="0"/>
-              <a:t>Use </a:t>
-            </a:r>
-            <a:r>
-              <a:rPr lang="en-GB" sz="3200" b="1" dirty="0" err="1"/>
-              <a:t>Task.Delay</a:t>
-            </a:r>
-            <a:r>
-              <a:rPr lang="en-GB" sz="3200" b="1" dirty="0"/>
-              <a:t> instead of </a:t>
-            </a:r>
-            <a:r>
-              <a:rPr lang="en-GB" sz="3200" b="1" dirty="0" err="1"/>
-              <a:t>Thread.Sleep</a:t>
-            </a:r>
-            <a:r>
-              <a:rPr lang="en-GB" sz="3200" b="1" dirty="0"/>
-              <a:t> as it’s asynchronous</a:t>
+              <a:t>Here are some example of asynchronous methods in C#:</a:t>
             </a:r>
           </a:p>
         </p:txBody>
@@ -4322,7 +4343,7 @@
     </p:spTree>
     <p:extLst>
       <p:ext uri="{BB962C8B-B14F-4D97-AF65-F5344CB8AC3E}">
-        <p14:creationId xmlns:p14="http://schemas.microsoft.com/office/powerpoint/2010/main" val="1477074202"/>
+        <p14:creationId xmlns:p14="http://schemas.microsoft.com/office/powerpoint/2010/main" val="1723273691"/>
       </p:ext>
     </p:extLst>
   </p:cSld>
@@ -4364,7 +4385,7 @@
         <p:spPr>
           <a:xfrm>
             <a:off x="145775" y="132522"/>
-            <a:ext cx="11781182" cy="6494085"/>
+            <a:ext cx="11781182" cy="5016758"/>
           </a:xfrm>
           <a:prstGeom prst="rect">
             <a:avLst/>
@@ -4378,80 +4399,67 @@
           <a:lstStyle/>
           <a:p>
             <a:r>
+              <a:rPr lang="en-GB" sz="3200" b="1" dirty="0" err="1"/>
+              <a:t>Task.Run</a:t>
+            </a:r>
+            <a:endParaRPr lang="en-GB" sz="3200" b="1" dirty="0"/>
+          </a:p>
+          <a:p>
+            <a:endParaRPr lang="en-GB" sz="3200" b="1" dirty="0"/>
+          </a:p>
+          <a:p>
+            <a:r>
+              <a:rPr lang="en-GB" sz="3200" b="1" dirty="0" err="1"/>
+              <a:t>Task.Start</a:t>
+            </a:r>
+            <a:endParaRPr lang="en-GB" sz="3200" b="1" dirty="0"/>
+          </a:p>
+          <a:p>
+            <a:endParaRPr lang="en-GB" sz="3200" b="1" dirty="0"/>
+          </a:p>
+          <a:p>
+            <a:r>
+              <a:rPr lang="en-GB" sz="3200" b="1" dirty="0" err="1"/>
+              <a:t>Task.Wait</a:t>
+            </a:r>
+            <a:endParaRPr lang="en-GB" sz="3200" b="1" dirty="0"/>
+          </a:p>
+          <a:p>
+            <a:endParaRPr lang="en-GB" sz="3200" b="1" dirty="0"/>
+          </a:p>
+          <a:p>
+            <a:r>
+              <a:rPr lang="en-GB" sz="3200" b="1" dirty="0" err="1"/>
+              <a:t>Task.RunSynchronously</a:t>
+            </a:r>
+            <a:endParaRPr lang="en-GB" sz="3200" b="1" dirty="0"/>
+          </a:p>
+          <a:p>
+            <a:endParaRPr lang="en-GB" sz="3200" b="1" dirty="0"/>
+          </a:p>
+          <a:p>
+            <a:endParaRPr lang="en-GB" sz="3200" b="1" dirty="0"/>
+          </a:p>
+          <a:p>
+            <a:r>
               <a:rPr lang="en-GB" sz="3200" b="1" dirty="0"/>
-              <a:t>Summary</a:t>
-            </a:r>
-          </a:p>
-          <a:p>
-            <a:endParaRPr lang="en-GB" sz="3200" b="1" dirty="0"/>
-          </a:p>
-          <a:p>
-            <a:pPr marL="457200" indent="-457200">
-              <a:buFont typeface="Arial" panose="020B0604020202020204" pitchFamily="34" charset="0"/>
-              <a:buChar char="•"/>
-            </a:pPr>
-            <a:r>
-              <a:rPr lang="en-GB" sz="3200" dirty="0"/>
-              <a:t>Tasks are an easy way of writing methods which can be run asynchronously.</a:t>
-            </a:r>
-          </a:p>
-          <a:p>
-            <a:endParaRPr lang="en-GB" sz="3200" dirty="0"/>
-          </a:p>
-          <a:p>
-            <a:pPr marL="457200" indent="-457200">
-              <a:buFont typeface="Arial" panose="020B0604020202020204" pitchFamily="34" charset="0"/>
-              <a:buChar char="•"/>
-            </a:pPr>
-            <a:r>
-              <a:rPr lang="en-GB" sz="3200" dirty="0"/>
-              <a:t>Task provides a powerful API and avoids wasting OS threads.</a:t>
-            </a:r>
-          </a:p>
-          <a:p>
-            <a:pPr marL="457200" indent="-457200">
-              <a:buFont typeface="Arial" panose="020B0604020202020204" pitchFamily="34" charset="0"/>
-              <a:buChar char="•"/>
-            </a:pPr>
-            <a:endParaRPr lang="en-GB" sz="3200" dirty="0"/>
-          </a:p>
-          <a:p>
-            <a:pPr marL="457200" indent="-457200">
-              <a:buFont typeface="Arial" panose="020B0604020202020204" pitchFamily="34" charset="0"/>
-              <a:buChar char="•"/>
-            </a:pPr>
-            <a:r>
-              <a:rPr lang="en-GB" sz="3200" dirty="0"/>
-              <a:t>The only reason to explicitly create your own threads in modern code are for setting per-thread options, or maintaining a persistent thread that needs to maintain its own identity. </a:t>
-            </a:r>
-          </a:p>
-          <a:p>
-            <a:pPr marL="457200" indent="-457200">
-              <a:buFont typeface="Arial" panose="020B0604020202020204" pitchFamily="34" charset="0"/>
-              <a:buChar char="•"/>
-            </a:pPr>
-            <a:endParaRPr lang="en-GB" sz="3200" dirty="0"/>
-          </a:p>
-          <a:p>
-            <a:pPr marL="457200" indent="-457200">
-              <a:buFont typeface="Arial" panose="020B0604020202020204" pitchFamily="34" charset="0"/>
-              <a:buChar char="•"/>
-            </a:pPr>
-            <a:r>
-              <a:rPr lang="en-GB" sz="3200" dirty="0"/>
-              <a:t>Unless you have a good reason, </a:t>
-            </a:r>
-            <a:r>
-              <a:rPr lang="en-GB" sz="3200" b="1" u="sng" dirty="0"/>
-              <a:t>completely ignore Thread and </a:t>
-            </a:r>
-            <a:r>
-              <a:rPr lang="en-GB" sz="3200" b="1" u="sng" dirty="0" err="1"/>
-              <a:t>ThreadPool</a:t>
-            </a:r>
-            <a:r>
-              <a:rPr lang="en-GB" sz="3200" b="1" u="sng" dirty="0"/>
-              <a:t>. Only think about Task!</a:t>
+              <a:t>Use </a:t>
+            </a:r>
+            <a:r>
+              <a:rPr lang="en-GB" sz="3200" b="1" dirty="0" err="1"/>
+              <a:t>Task.Delay</a:t>
+            </a:r>
+            <a:r>
+              <a:rPr lang="en-GB" sz="3200" b="1" dirty="0"/>
+              <a:t> instead of </a:t>
+            </a:r>
+            <a:r>
+              <a:rPr lang="en-GB" sz="3200" b="1" dirty="0" err="1"/>
+              <a:t>Thread.Sleep</a:t>
+            </a:r>
+            <a:r>
+              <a:rPr lang="en-GB" sz="3200" b="1" dirty="0"/>
+              <a:t> as it’s asynchronous</a:t>
             </a:r>
           </a:p>
         </p:txBody>
@@ -4459,7 +4467,7 @@
     </p:spTree>
     <p:extLst>
       <p:ext uri="{BB962C8B-B14F-4D97-AF65-F5344CB8AC3E}">
-        <p14:creationId xmlns:p14="http://schemas.microsoft.com/office/powerpoint/2010/main" val="1198929045"/>
+        <p14:creationId xmlns:p14="http://schemas.microsoft.com/office/powerpoint/2010/main" val="1477074202"/>
       </p:ext>
     </p:extLst>
   </p:cSld>
@@ -5226,24 +5234,20 @@
             </a:pPr>
             <a:r>
               <a:rPr lang="en-GB" sz="2400" dirty="0"/>
-              <a:t>Synchronous vs asynchronous operations</a:t>
-            </a:r>
+              <a:t>CPU-bound vs I/O-bound operations</a:t>
+            </a:r>
+          </a:p>
+          <a:p>
+            <a:endParaRPr lang="en-GB" sz="2400" dirty="0"/>
           </a:p>
           <a:p>
             <a:pPr marL="457200" indent="-457200">
               <a:buFont typeface="Arial" panose="020B0604020202020204" pitchFamily="34" charset="0"/>
               <a:buChar char="•"/>
             </a:pPr>
-            <a:endParaRPr lang="en-GB" sz="2400" dirty="0"/>
-          </a:p>
-          <a:p>
-            <a:pPr marL="457200" indent="-457200">
-              <a:buFont typeface="Arial" panose="020B0604020202020204" pitchFamily="34" charset="0"/>
-              <a:buChar char="•"/>
-            </a:pPr>
             <a:r>
               <a:rPr lang="en-GB" sz="2400" dirty="0"/>
-              <a:t>CPU-bound vs I/O-bound operations</a:t>
+              <a:t>Synchronous vs asynchronous operations</a:t>
             </a:r>
           </a:p>
           <a:p>
@@ -9499,7 +9503,7 @@
           <a:p>
             <a:r>
               <a:rPr lang="en-GB" dirty="0"/>
-              <a:t>Synchronous vs asynchronous operations</a:t>
+              <a:t>CPU-bound vs I/O-bound operations</a:t>
             </a:r>
           </a:p>
         </p:txBody>
@@ -9507,7 +9511,7 @@
     </p:spTree>
     <p:extLst>
       <p:ext uri="{BB962C8B-B14F-4D97-AF65-F5344CB8AC3E}">
-        <p14:creationId xmlns:p14="http://schemas.microsoft.com/office/powerpoint/2010/main" val="1555093637"/>
+        <p14:creationId xmlns:p14="http://schemas.microsoft.com/office/powerpoint/2010/main" val="241573146"/>
       </p:ext>
     </p:extLst>
   </p:cSld>
@@ -12054,7 +12058,7 @@
         <p:spPr>
           <a:xfrm>
             <a:off x="145775" y="132522"/>
-            <a:ext cx="11781182" cy="6001643"/>
+            <a:ext cx="11781182" cy="7971413"/>
           </a:xfrm>
           <a:prstGeom prst="rect">
             <a:avLst/>
@@ -12076,52 +12080,79 @@
             <a:endParaRPr lang="en-GB" sz="3200" b="1" dirty="0"/>
           </a:p>
           <a:p>
+            <a:pPr marL="457200" indent="-457200">
+              <a:buFont typeface="Arial" panose="020B0604020202020204" pitchFamily="34" charset="0"/>
+              <a:buChar char="•"/>
+            </a:pPr>
             <a:r>
               <a:rPr lang="en-GB" sz="3200" dirty="0"/>
-              <a:t>When you execute something </a:t>
+              <a:t>Operations are </a:t>
             </a:r>
             <a:r>
               <a:rPr lang="en-GB" sz="3200" b="1" dirty="0"/>
-              <a:t>synchronously</a:t>
+              <a:t>CPU-bound</a:t>
             </a:r>
             <a:r>
               <a:rPr lang="en-GB" sz="3200" dirty="0"/>
-              <a:t>, you have to wait for it to finish before moving onto something else. During this time, you can’t do anything else. Your time waiting is essentially wasted. </a:t>
-            </a:r>
-          </a:p>
-          <a:p>
+              <a:t> when the speed of the operation is limited by the speed of the CPU. Speed can be increased by scaling up to a more powerful CPU, or somehow parallelising the operation using multiple threads. </a:t>
+            </a:r>
+          </a:p>
+          <a:p>
+            <a:pPr marL="457200" indent="-457200">
+              <a:buFont typeface="Arial" panose="020B0604020202020204" pitchFamily="34" charset="0"/>
+              <a:buChar char="•"/>
+            </a:pPr>
             <a:endParaRPr lang="en-GB" sz="3200" dirty="0"/>
           </a:p>
           <a:p>
+            <a:pPr marL="457200" indent="-457200">
+              <a:buFont typeface="Arial" panose="020B0604020202020204" pitchFamily="34" charset="0"/>
+              <a:buChar char="•"/>
+            </a:pPr>
             <a:r>
               <a:rPr lang="en-GB" sz="3200" dirty="0"/>
-              <a:t>When you execute something </a:t>
+              <a:t>Operations are </a:t>
             </a:r>
             <a:r>
               <a:rPr lang="en-GB" sz="3200" b="1" dirty="0"/>
-              <a:t>asynchronously</a:t>
+              <a:t>I/O-bound </a:t>
             </a:r>
             <a:r>
               <a:rPr lang="en-GB" sz="3200" dirty="0"/>
-              <a:t>, you can move onto another task before the first one finishes. You aren’t wasting any time just waiting around. You can get more work done during that time. </a:t>
-            </a:r>
-          </a:p>
-          <a:p>
-            <a:pPr algn="ctr"/>
+              <a:t>when the speed of the operation is limited by the speed of input/output operations being completed. i.e. anything not done by the CPU, e.g. disk reads/writes, network requests, etc. </a:t>
+            </a:r>
             <a:br>
               <a:rPr lang="en-GB" sz="3200" dirty="0"/>
             </a:br>
             <a:r>
-              <a:rPr lang="en-GB" sz="3200" b="1" dirty="0"/>
-              <a:t>Doing things asynchronously can improve performance, scalability, throughput and efficiency</a:t>
-            </a:r>
+              <a:rPr lang="en-GB" sz="3200" dirty="0"/>
+              <a:t>Using more threads or improving the CPU does not make these operations faster. </a:t>
+            </a:r>
+            <a:endParaRPr lang="en-GB" sz="3200" b="1" dirty="0"/>
+          </a:p>
+          <a:p>
+            <a:pPr marL="457200" indent="-457200">
+              <a:buFont typeface="Arial" panose="020B0604020202020204" pitchFamily="34" charset="0"/>
+              <a:buChar char="•"/>
+            </a:pPr>
+            <a:endParaRPr lang="en-GB" sz="3200" dirty="0"/>
+          </a:p>
+          <a:p>
+            <a:pPr marL="457200" indent="-457200">
+              <a:buFont typeface="Arial" panose="020B0604020202020204" pitchFamily="34" charset="0"/>
+              <a:buChar char="•"/>
+            </a:pPr>
+            <a:endParaRPr lang="en-GB" sz="3200" dirty="0"/>
+          </a:p>
+          <a:p>
+            <a:endParaRPr lang="en-GB" sz="3200" dirty="0"/>
           </a:p>
         </p:txBody>
       </p:sp>
     </p:spTree>
     <p:extLst>
       <p:ext uri="{BB962C8B-B14F-4D97-AF65-F5344CB8AC3E}">
-        <p14:creationId xmlns:p14="http://schemas.microsoft.com/office/powerpoint/2010/main" val="3821427679"/>
+        <p14:creationId xmlns:p14="http://schemas.microsoft.com/office/powerpoint/2010/main" val="2151217970"/>
       </p:ext>
     </p:extLst>
   </p:cSld>
@@ -13920,7 +13951,7 @@
           <a:p>
             <a:r>
               <a:rPr lang="en-GB" dirty="0"/>
-              <a:t>CPU-bound vs I/O-bound operations</a:t>
+              <a:t>Synchronous vs asynchronous operations</a:t>
             </a:r>
           </a:p>
         </p:txBody>
@@ -13928,7 +13959,7 @@
     </p:spTree>
     <p:extLst>
       <p:ext uri="{BB962C8B-B14F-4D97-AF65-F5344CB8AC3E}">
-        <p14:creationId xmlns:p14="http://schemas.microsoft.com/office/powerpoint/2010/main" val="241573146"/>
+        <p14:creationId xmlns:p14="http://schemas.microsoft.com/office/powerpoint/2010/main" val="1555093637"/>
       </p:ext>
     </p:extLst>
   </p:cSld>
@@ -16156,7 +16187,7 @@
         <p:spPr>
           <a:xfrm>
             <a:off x="145775" y="132522"/>
-            <a:ext cx="11781182" cy="7971413"/>
+            <a:ext cx="11781182" cy="6001643"/>
           </a:xfrm>
           <a:prstGeom prst="rect">
             <a:avLst/>
@@ -16178,79 +16209,52 @@
             <a:endParaRPr lang="en-GB" sz="3200" b="1" dirty="0"/>
           </a:p>
           <a:p>
-            <a:pPr marL="457200" indent="-457200">
-              <a:buFont typeface="Arial" panose="020B0604020202020204" pitchFamily="34" charset="0"/>
-              <a:buChar char="•"/>
-            </a:pPr>
             <a:r>
               <a:rPr lang="en-GB" sz="3200" dirty="0"/>
-              <a:t>Operations are </a:t>
+              <a:t>When you execute something </a:t>
             </a:r>
             <a:r>
               <a:rPr lang="en-GB" sz="3200" b="1" dirty="0"/>
-              <a:t>CPU-bound</a:t>
+              <a:t>synchronously</a:t>
             </a:r>
             <a:r>
               <a:rPr lang="en-GB" sz="3200" dirty="0"/>
-              <a:t> when the speed of the operation is limited by the speed of the CPU. Speed can be increased by scaling up to a more powerful CPU, or somehow parallelising the operation using multiple threads. </a:t>
-            </a:r>
-          </a:p>
-          <a:p>
-            <a:pPr marL="457200" indent="-457200">
-              <a:buFont typeface="Arial" panose="020B0604020202020204" pitchFamily="34" charset="0"/>
-              <a:buChar char="•"/>
-            </a:pPr>
+              <a:t>, you have to wait for it to finish before moving onto something else. During this time, you can’t do anything else. Your time waiting is essentially wasted. </a:t>
+            </a:r>
+          </a:p>
+          <a:p>
             <a:endParaRPr lang="en-GB" sz="3200" dirty="0"/>
           </a:p>
           <a:p>
-            <a:pPr marL="457200" indent="-457200">
-              <a:buFont typeface="Arial" panose="020B0604020202020204" pitchFamily="34" charset="0"/>
-              <a:buChar char="•"/>
-            </a:pPr>
             <a:r>
               <a:rPr lang="en-GB" sz="3200" dirty="0"/>
-              <a:t>Operations are </a:t>
+              <a:t>When you execute something </a:t>
             </a:r>
             <a:r>
               <a:rPr lang="en-GB" sz="3200" b="1" dirty="0"/>
-              <a:t>I/O-bound </a:t>
+              <a:t>asynchronously</a:t>
             </a:r>
             <a:r>
               <a:rPr lang="en-GB" sz="3200" dirty="0"/>
-              <a:t>when the speed of the operation is limited by the speed of input/output operations being completed. This is essentially anything which isn’t done by the CPU, i.e. waiting for disk reads/writes, network requests to be completed, etc. </a:t>
-            </a:r>
+              <a:t>, you can move onto another task before the first one finishes. You aren’t wasting any time just waiting around. You can get more work done during that time. </a:t>
+            </a:r>
+          </a:p>
+          <a:p>
+            <a:pPr algn="ctr"/>
             <a:br>
-              <a:rPr lang="en-GB" sz="3200" dirty="0"/>
+              <a:rPr lang="en-GB" sz="3200" b="1" dirty="0"/>
             </a:br>
             <a:r>
-              <a:rPr lang="en-GB" sz="3200" dirty="0"/>
-              <a:t>Adding more threads or improving the CPU does not make these operations faster. </a:t>
-            </a:r>
-            <a:endParaRPr lang="en-GB" sz="3200" b="1" dirty="0"/>
-          </a:p>
-          <a:p>
-            <a:pPr marL="457200" indent="-457200">
-              <a:buFont typeface="Arial" panose="020B0604020202020204" pitchFamily="34" charset="0"/>
-              <a:buChar char="•"/>
-            </a:pPr>
-            <a:endParaRPr lang="en-GB" sz="3200" dirty="0"/>
-          </a:p>
-          <a:p>
-            <a:pPr marL="457200" indent="-457200">
-              <a:buFont typeface="Arial" panose="020B0604020202020204" pitchFamily="34" charset="0"/>
-              <a:buChar char="•"/>
-            </a:pPr>
-            <a:endParaRPr lang="en-GB" sz="3200" dirty="0"/>
-          </a:p>
-          <a:p>
-            <a:endParaRPr lang="en-GB" sz="3200" dirty="0"/>
+              <a:rPr lang="en-GB" sz="3200" b="1" dirty="0"/>
+              <a:t>Doing things asynchronously can improve performance, scalability, throughput and efficiency</a:t>
+            </a:r>
           </a:p>
         </p:txBody>
       </p:sp>
     </p:spTree>
     <p:extLst>
       <p:ext uri="{BB962C8B-B14F-4D97-AF65-F5344CB8AC3E}">
-        <p14:creationId xmlns:p14="http://schemas.microsoft.com/office/powerpoint/2010/main" val="2151217970"/>
+        <p14:creationId xmlns:p14="http://schemas.microsoft.com/office/powerpoint/2010/main" val="3821427679"/>
       </p:ext>
     </p:extLst>
   </p:cSld>
@@ -17677,15 +17681,15 @@
             </a:r>
             <a:r>
               <a:rPr lang="en-GB" sz="3200" dirty="0"/>
-              <a:t> by doing things </a:t>
+              <a:t> by doing things asynchronously, you </a:t>
             </a:r>
             <a:r>
               <a:rPr lang="en-GB" sz="3200" b="1" dirty="0"/>
-              <a:t>asynchronously</a:t>
+              <a:t>need</a:t>
             </a:r>
             <a:r>
               <a:rPr lang="en-GB" sz="3200" dirty="0"/>
-              <a:t>, you need to use multiple threads. </a:t>
+              <a:t> to use multiple threads. </a:t>
             </a:r>
           </a:p>
           <a:p>
@@ -17710,29 +17714,38 @@
             </a:r>
             <a:r>
               <a:rPr lang="en-GB" sz="3200" dirty="0"/>
-              <a:t>by doing things </a:t>
+              <a:t>by doing things asynchronously</a:t>
             </a:r>
             <a:r>
               <a:rPr lang="en-GB" sz="3200" b="1" dirty="0"/>
-              <a:t>asynchronously</a:t>
-            </a:r>
-          </a:p>
-          <a:p>
-            <a:pPr marL="457200" indent="-457200">
-              <a:buFont typeface="Arial" panose="020B0604020202020204" pitchFamily="34" charset="0"/>
-              <a:buChar char="•"/>
-            </a:pPr>
-            <a:endParaRPr lang="en-GB" sz="3200" dirty="0"/>
-          </a:p>
-          <a:p>
-            <a:pPr marL="457200" indent="-457200">
-              <a:buFont typeface="Arial" panose="020B0604020202020204" pitchFamily="34" charset="0"/>
-              <a:buChar char="•"/>
-            </a:pPr>
-            <a:endParaRPr lang="en-GB" sz="3200" dirty="0"/>
-          </a:p>
-          <a:p>
-            <a:endParaRPr lang="en-GB" sz="3200" dirty="0"/>
+              <a:t>, </a:t>
+            </a:r>
+            <a:r>
+              <a:rPr lang="en-GB" sz="3200" dirty="0"/>
+              <a:t>you </a:t>
+            </a:r>
+            <a:r>
+              <a:rPr lang="en-GB" sz="3200" b="1" dirty="0"/>
+              <a:t>shouldn’t</a:t>
+            </a:r>
+            <a:r>
+              <a:rPr lang="en-GB" sz="3200" dirty="0"/>
+              <a:t> to use multiple threads. </a:t>
+            </a:r>
+            <a:endParaRPr lang="en-GB" sz="3200" b="1" dirty="0"/>
+          </a:p>
+          <a:p>
+            <a:endParaRPr lang="en-GB" sz="3200" b="1" dirty="0"/>
+          </a:p>
+          <a:p>
+            <a:endParaRPr lang="en-GB" sz="3200" b="1" dirty="0"/>
+          </a:p>
+          <a:p>
+            <a:pPr algn="ctr"/>
+            <a:r>
+              <a:rPr lang="en-GB" sz="3200" b="1" dirty="0"/>
+              <a:t>So how do we write asynchronous code in C#?</a:t>
+            </a:r>
           </a:p>
         </p:txBody>
       </p:sp>

</xml_diff>

<commit_message>
Updated slides with better information about catching exceptions
</commit_message>
<xml_diff>
--- a/Async and await presentation.pptx
+++ b/Async and await presentation.pptx
@@ -20,8 +20,8 @@
     <p:sldId id="261" r:id="rId14"/>
     <p:sldId id="325" r:id="rId15"/>
     <p:sldId id="317" r:id="rId16"/>
-    <p:sldId id="266" r:id="rId17"/>
-    <p:sldId id="297" r:id="rId18"/>
+    <p:sldId id="297" r:id="rId17"/>
+    <p:sldId id="326" r:id="rId18"/>
     <p:sldId id="318" r:id="rId19"/>
     <p:sldId id="265" r:id="rId20"/>
     <p:sldId id="267" r:id="rId21"/>
@@ -326,7 +326,7 @@
           <a:p>
             <a:fld id="{BFEF692B-FC3E-4552-B87F-4B5A00EB12B2}" type="datetimeFigureOut">
               <a:rPr lang="en-GB" smtClean="0"/>
-              <a:t>05/03/2020</a:t>
+              <a:t>06/03/2020</a:t>
             </a:fld>
             <a:endParaRPr lang="en-GB"/>
           </a:p>
@@ -526,7 +526,7 @@
           <a:p>
             <a:fld id="{BFEF692B-FC3E-4552-B87F-4B5A00EB12B2}" type="datetimeFigureOut">
               <a:rPr lang="en-GB" smtClean="0"/>
-              <a:t>05/03/2020</a:t>
+              <a:t>06/03/2020</a:t>
             </a:fld>
             <a:endParaRPr lang="en-GB"/>
           </a:p>
@@ -736,7 +736,7 @@
           <a:p>
             <a:fld id="{BFEF692B-FC3E-4552-B87F-4B5A00EB12B2}" type="datetimeFigureOut">
               <a:rPr lang="en-GB" smtClean="0"/>
-              <a:t>05/03/2020</a:t>
+              <a:t>06/03/2020</a:t>
             </a:fld>
             <a:endParaRPr lang="en-GB"/>
           </a:p>
@@ -936,7 +936,7 @@
           <a:p>
             <a:fld id="{BFEF692B-FC3E-4552-B87F-4B5A00EB12B2}" type="datetimeFigureOut">
               <a:rPr lang="en-GB" smtClean="0"/>
-              <a:t>05/03/2020</a:t>
+              <a:t>06/03/2020</a:t>
             </a:fld>
             <a:endParaRPr lang="en-GB"/>
           </a:p>
@@ -1212,7 +1212,7 @@
           <a:p>
             <a:fld id="{BFEF692B-FC3E-4552-B87F-4B5A00EB12B2}" type="datetimeFigureOut">
               <a:rPr lang="en-GB" smtClean="0"/>
-              <a:t>05/03/2020</a:t>
+              <a:t>06/03/2020</a:t>
             </a:fld>
             <a:endParaRPr lang="en-GB"/>
           </a:p>
@@ -1480,7 +1480,7 @@
           <a:p>
             <a:fld id="{BFEF692B-FC3E-4552-B87F-4B5A00EB12B2}" type="datetimeFigureOut">
               <a:rPr lang="en-GB" smtClean="0"/>
-              <a:t>05/03/2020</a:t>
+              <a:t>06/03/2020</a:t>
             </a:fld>
             <a:endParaRPr lang="en-GB"/>
           </a:p>
@@ -1895,7 +1895,7 @@
           <a:p>
             <a:fld id="{BFEF692B-FC3E-4552-B87F-4B5A00EB12B2}" type="datetimeFigureOut">
               <a:rPr lang="en-GB" smtClean="0"/>
-              <a:t>05/03/2020</a:t>
+              <a:t>06/03/2020</a:t>
             </a:fld>
             <a:endParaRPr lang="en-GB"/>
           </a:p>
@@ -2037,7 +2037,7 @@
           <a:p>
             <a:fld id="{BFEF692B-FC3E-4552-B87F-4B5A00EB12B2}" type="datetimeFigureOut">
               <a:rPr lang="en-GB" smtClean="0"/>
-              <a:t>05/03/2020</a:t>
+              <a:t>06/03/2020</a:t>
             </a:fld>
             <a:endParaRPr lang="en-GB"/>
           </a:p>
@@ -2150,7 +2150,7 @@
           <a:p>
             <a:fld id="{BFEF692B-FC3E-4552-B87F-4B5A00EB12B2}" type="datetimeFigureOut">
               <a:rPr lang="en-GB" smtClean="0"/>
-              <a:t>05/03/2020</a:t>
+              <a:t>06/03/2020</a:t>
             </a:fld>
             <a:endParaRPr lang="en-GB"/>
           </a:p>
@@ -2463,7 +2463,7 @@
           <a:p>
             <a:fld id="{BFEF692B-FC3E-4552-B87F-4B5A00EB12B2}" type="datetimeFigureOut">
               <a:rPr lang="en-GB" smtClean="0"/>
-              <a:t>05/03/2020</a:t>
+              <a:t>06/03/2020</a:t>
             </a:fld>
             <a:endParaRPr lang="en-GB"/>
           </a:p>
@@ -2752,7 +2752,7 @@
           <a:p>
             <a:fld id="{BFEF692B-FC3E-4552-B87F-4B5A00EB12B2}" type="datetimeFigureOut">
               <a:rPr lang="en-GB" smtClean="0"/>
-              <a:t>05/03/2020</a:t>
+              <a:t>06/03/2020</a:t>
             </a:fld>
             <a:endParaRPr lang="en-GB"/>
           </a:p>
@@ -2995,7 +2995,7 @@
           <a:p>
             <a:fld id="{BFEF692B-FC3E-4552-B87F-4B5A00EB12B2}" type="datetimeFigureOut">
               <a:rPr lang="en-GB" smtClean="0"/>
-              <a:t>05/03/2020</a:t>
+              <a:t>06/03/2020</a:t>
             </a:fld>
             <a:endParaRPr lang="en-GB"/>
           </a:p>
@@ -4368,8 +4368,8 @@
         </p:nvSpPr>
         <p:spPr>
           <a:xfrm>
-            <a:off x="145775" y="132522"/>
-            <a:ext cx="11781182" cy="6555641"/>
+            <a:off x="278297" y="212034"/>
+            <a:ext cx="11781182" cy="6186309"/>
           </a:xfrm>
           <a:prstGeom prst="rect">
             <a:avLst/>
@@ -4383,87 +4383,191 @@
           <a:lstStyle/>
           <a:p>
             <a:r>
-              <a:rPr lang="en-GB" sz="2800" b="1" dirty="0"/>
-              <a:t>Some (possibly confusing) facts about synchronous and asynchronous code</a:t>
-            </a:r>
-          </a:p>
-          <a:p>
-            <a:endParaRPr lang="en-GB" sz="2800" dirty="0"/>
-          </a:p>
-          <a:p>
-            <a:pPr marL="457200" indent="-457200">
+              <a:rPr lang="en-GB" sz="2200" b="1" dirty="0"/>
+              <a:t>Dealing with exceptions</a:t>
+            </a:r>
+          </a:p>
+          <a:p>
+            <a:endParaRPr lang="en-GB" sz="2200" b="1" dirty="0"/>
+          </a:p>
+          <a:p>
+            <a:pPr marL="342900" indent="-342900">
               <a:buFont typeface="Arial" panose="020B0604020202020204" pitchFamily="34" charset="0"/>
               <a:buChar char="•"/>
             </a:pPr>
             <a:r>
-              <a:rPr lang="en-GB" sz="2800" dirty="0"/>
-              <a:t>Synchronous code may or may not run in the same thread.</a:t>
-            </a:r>
-          </a:p>
-          <a:p>
-            <a:pPr marL="457200" indent="-457200">
+              <a:rPr lang="en-GB" sz="2200" dirty="0"/>
+              <a:t>Observing the completion of a failed task by using </a:t>
+            </a:r>
+            <a:r>
+              <a:rPr lang="en-GB" sz="2200" b="1" dirty="0"/>
+              <a:t>Wait()</a:t>
+            </a:r>
+            <a:r>
+              <a:rPr lang="en-GB" sz="2200" dirty="0"/>
+              <a:t>,</a:t>
+            </a:r>
+            <a:r>
+              <a:rPr lang="en-GB" sz="2200" b="1" dirty="0"/>
+              <a:t> Result, await </a:t>
+            </a:r>
+            <a:r>
+              <a:rPr lang="en-GB" sz="2200" dirty="0"/>
+              <a:t>or </a:t>
+            </a:r>
+            <a:r>
+              <a:rPr lang="en-GB" sz="2200" b="1" dirty="0" err="1"/>
+              <a:t>GetAwaiter</a:t>
+            </a:r>
+            <a:r>
+              <a:rPr lang="en-GB" sz="2200" b="1" dirty="0"/>
+              <a:t>().</a:t>
+            </a:r>
+            <a:r>
+              <a:rPr lang="en-GB" sz="2200" b="1" dirty="0" err="1"/>
+              <a:t>GetResult</a:t>
+            </a:r>
+            <a:r>
+              <a:rPr lang="en-GB" sz="2200" b="1" dirty="0"/>
+              <a:t>() </a:t>
+            </a:r>
+            <a:r>
+              <a:rPr lang="en-GB" sz="2200" dirty="0"/>
+              <a:t>will propagate its exception. At this point, you need to handle it with a try/catch block. </a:t>
+            </a:r>
+          </a:p>
+          <a:p>
+            <a:endParaRPr lang="en-GB" sz="2200" dirty="0"/>
+          </a:p>
+          <a:p>
+            <a:pPr marL="342900" indent="-342900">
               <a:buFont typeface="Arial" panose="020B0604020202020204" pitchFamily="34" charset="0"/>
               <a:buChar char="•"/>
             </a:pPr>
-            <a:endParaRPr lang="en-GB" sz="2800" dirty="0"/>
-          </a:p>
-          <a:p>
-            <a:pPr marL="457200" indent="-457200">
+            <a:r>
+              <a:rPr lang="en-GB" sz="2200" dirty="0"/>
+              <a:t>As a task needs to keep track of exceptions thrown in subtasks, any thrown exceptions are grouped as a single </a:t>
+            </a:r>
+            <a:r>
+              <a:rPr lang="en-GB" sz="2200" b="1" dirty="0" err="1"/>
+              <a:t>AggregateException</a:t>
+            </a:r>
+            <a:r>
+              <a:rPr lang="en-GB" sz="2200" dirty="0"/>
+              <a:t>. You need to then inspect the inner exceptions to determine the underlying cause of the issue. This can lead to ugly unwrapping logic when catching exceptions.</a:t>
+            </a:r>
+            <a:endParaRPr lang="en-GB" sz="2200" b="1" dirty="0"/>
+          </a:p>
+          <a:p>
+            <a:pPr marL="342900" indent="-342900">
               <a:buFont typeface="Arial" panose="020B0604020202020204" pitchFamily="34" charset="0"/>
               <a:buChar char="•"/>
             </a:pPr>
-            <a:r>
-              <a:rPr lang="en-GB" sz="2800" dirty="0"/>
-              <a:t>Synchronous operations can be performed sequentially, or simultaneously. </a:t>
-            </a:r>
-          </a:p>
-          <a:p>
-            <a:pPr marL="457200" indent="-457200">
+            <a:endParaRPr lang="en-GB" sz="2200" dirty="0"/>
+          </a:p>
+          <a:p>
+            <a:pPr marL="342900" indent="-342900">
               <a:buFont typeface="Arial" panose="020B0604020202020204" pitchFamily="34" charset="0"/>
               <a:buChar char="•"/>
             </a:pPr>
-            <a:endParaRPr lang="en-GB" sz="2800" dirty="0"/>
-          </a:p>
-          <a:p>
-            <a:pPr marL="457200" indent="-457200">
+            <a:r>
+              <a:rPr lang="en-GB" sz="2200" dirty="0"/>
+              <a:t>Exceptions thrown within a task are always accessible from the </a:t>
+            </a:r>
+            <a:r>
+              <a:rPr lang="en-GB" sz="2200" b="1" dirty="0"/>
+              <a:t>Exception property</a:t>
+            </a:r>
+            <a:r>
+              <a:rPr lang="en-GB" sz="2200" dirty="0"/>
+              <a:t>. This is of type </a:t>
+            </a:r>
+            <a:r>
+              <a:rPr lang="en-GB" sz="2200" b="1" dirty="0" err="1"/>
+              <a:t>AggregateException</a:t>
+            </a:r>
+            <a:r>
+              <a:rPr lang="en-GB" sz="2200" dirty="0"/>
+              <a:t>. </a:t>
+            </a:r>
+          </a:p>
+          <a:p>
+            <a:endParaRPr lang="en-GB" sz="2200" b="1" dirty="0"/>
+          </a:p>
+          <a:p>
+            <a:pPr marL="342900" indent="-342900">
               <a:buFont typeface="Arial" panose="020B0604020202020204" pitchFamily="34" charset="0"/>
               <a:buChar char="•"/>
             </a:pPr>
             <a:r>
-              <a:rPr lang="en-GB" sz="2800" dirty="0"/>
-              <a:t>Asynchronous operations may or may not run in multiple threads. </a:t>
-            </a:r>
-          </a:p>
-          <a:p>
-            <a:pPr marL="457200" indent="-457200">
-              <a:buFont typeface="Arial" panose="020B0604020202020204" pitchFamily="34" charset="0"/>
-              <a:buChar char="•"/>
-            </a:pPr>
-            <a:endParaRPr lang="en-GB" sz="2800" dirty="0"/>
-          </a:p>
-          <a:p>
-            <a:pPr marL="457200" indent="-457200">
-              <a:buFont typeface="Arial" panose="020B0604020202020204" pitchFamily="34" charset="0"/>
-              <a:buChar char="•"/>
-            </a:pPr>
-            <a:r>
-              <a:rPr lang="en-GB" sz="2800" dirty="0"/>
-              <a:t>Asynchronous operations can be just scheduled but never guaranteed to run at a certain time. </a:t>
-            </a:r>
-          </a:p>
-          <a:p>
-            <a:endParaRPr lang="en-GB" sz="2800" dirty="0"/>
-          </a:p>
-          <a:p>
-            <a:r>
-              <a:rPr lang="en-GB" sz="2800" dirty="0"/>
-              <a:t>Asynchrony has nothing to do with “other threads”, “background”, “simultaneous”, or “concurrent”. All of those things are irrelevant. </a:t>
-            </a:r>
-          </a:p>
-          <a:p>
-            <a:r>
-              <a:rPr lang="en-GB" sz="2800" dirty="0"/>
-              <a:t>It’s just a way to design code where you can avoid both resource contention and thread blocking. </a:t>
+              <a:rPr lang="en-GB" sz="2200" b="1" dirty="0"/>
+              <a:t>Using await or </a:t>
+            </a:r>
+            <a:r>
+              <a:rPr lang="en-GB" sz="2200" b="1" dirty="0" err="1"/>
+              <a:t>GetAwaiter</a:t>
+            </a:r>
+            <a:r>
+              <a:rPr lang="en-GB" sz="2200" b="1" dirty="0"/>
+              <a:t>().</a:t>
+            </a:r>
+            <a:r>
+              <a:rPr lang="en-GB" sz="2200" b="1" dirty="0" err="1"/>
+              <a:t>GetResult</a:t>
+            </a:r>
+            <a:r>
+              <a:rPr lang="en-GB" sz="2200" b="1" dirty="0"/>
+              <a:t>() will not throw an </a:t>
+            </a:r>
+            <a:r>
+              <a:rPr lang="en-GB" sz="2200" b="1" dirty="0" err="1"/>
+              <a:t>AggregateException</a:t>
+            </a:r>
+            <a:r>
+              <a:rPr lang="en-GB" sz="2200" dirty="0"/>
+              <a:t>. It will instead propagate the first exception which was thrown, just like when writing synchronous code. </a:t>
+            </a:r>
+            <a:br>
+              <a:rPr lang="en-GB" sz="2200" dirty="0"/>
+            </a:br>
+            <a:endParaRPr lang="en-GB" sz="2200" dirty="0"/>
+          </a:p>
+          <a:p>
+            <a:pPr algn="ctr"/>
+            <a:r>
+              <a:rPr lang="en-GB" sz="2200" b="1" dirty="0"/>
+              <a:t>If you absolutely must wait synchronously, use </a:t>
+            </a:r>
+            <a:r>
+              <a:rPr lang="en-GB" sz="2200" b="1" dirty="0" err="1"/>
+              <a:t>GetAwaiter</a:t>
+            </a:r>
+            <a:r>
+              <a:rPr lang="en-GB" sz="2200" b="1" dirty="0"/>
+              <a:t>().</a:t>
+            </a:r>
+            <a:r>
+              <a:rPr lang="en-GB" sz="2200" b="1" dirty="0" err="1"/>
+              <a:t>GetResult</a:t>
+            </a:r>
+            <a:r>
+              <a:rPr lang="en-GB" sz="2200" b="1" dirty="0"/>
+              <a:t>(). Otherwise, use await!</a:t>
+            </a:r>
+          </a:p>
+          <a:p>
+            <a:pPr algn="ctr"/>
+            <a:r>
+              <a:rPr lang="en-GB" sz="2200" b="1" dirty="0"/>
+              <a:t>Ideally, you should never have to worry about </a:t>
+            </a:r>
+            <a:r>
+              <a:rPr lang="en-GB" sz="2200" b="1" dirty="0" err="1"/>
+              <a:t>AggregateExceptions</a:t>
+            </a:r>
+            <a:r>
+              <a:rPr lang="en-GB" sz="2200" b="1" dirty="0"/>
+              <a:t>!</a:t>
             </a:r>
           </a:p>
         </p:txBody>
@@ -4471,7 +4575,7 @@
     </p:spTree>
     <p:extLst>
       <p:ext uri="{BB962C8B-B14F-4D97-AF65-F5344CB8AC3E}">
-        <p14:creationId xmlns:p14="http://schemas.microsoft.com/office/powerpoint/2010/main" val="777985352"/>
+        <p14:creationId xmlns:p14="http://schemas.microsoft.com/office/powerpoint/2010/main" val="25185311"/>
       </p:ext>
     </p:extLst>
   </p:cSld>
@@ -4513,7 +4617,7 @@
         <p:spPr>
           <a:xfrm>
             <a:off x="278297" y="212034"/>
-            <a:ext cx="11781182" cy="6524863"/>
+            <a:ext cx="11781182" cy="2123658"/>
           </a:xfrm>
           <a:prstGeom prst="rect">
             <a:avLst/>
@@ -4528,11 +4632,14 @@
           <a:p>
             <a:r>
               <a:rPr lang="en-GB" sz="2200" b="1" dirty="0"/>
-              <a:t>Dealing with exceptions</a:t>
+              <a:t>async void</a:t>
             </a:r>
           </a:p>
           <a:p>
             <a:endParaRPr lang="en-GB" sz="2200" b="1" dirty="0"/>
+          </a:p>
+          <a:p>
+            <a:endParaRPr lang="en-GB" sz="2200" dirty="0"/>
           </a:p>
           <a:p>
             <a:pPr marL="342900" indent="-342900">
@@ -4541,159 +4648,7 @@
             </a:pPr>
             <a:r>
               <a:rPr lang="en-GB" sz="2200" dirty="0"/>
-              <a:t>Observing the completion of a failed task by using </a:t>
-            </a:r>
-            <a:r>
-              <a:rPr lang="en-GB" sz="2200" b="1" dirty="0"/>
-              <a:t>Wait()</a:t>
-            </a:r>
-            <a:r>
-              <a:rPr lang="en-GB" sz="2200" dirty="0"/>
-              <a:t>,</a:t>
-            </a:r>
-            <a:r>
-              <a:rPr lang="en-GB" sz="2200" b="1" dirty="0"/>
-              <a:t> Result, await </a:t>
-            </a:r>
-            <a:r>
-              <a:rPr lang="en-GB" sz="2200" dirty="0"/>
-              <a:t>or </a:t>
-            </a:r>
-            <a:r>
-              <a:rPr lang="en-GB" sz="2200" b="1" dirty="0" err="1"/>
-              <a:t>GetAwaiter</a:t>
-            </a:r>
-            <a:r>
-              <a:rPr lang="en-GB" sz="2200" b="1" dirty="0"/>
-              <a:t>().</a:t>
-            </a:r>
-            <a:r>
-              <a:rPr lang="en-GB" sz="2200" b="1" dirty="0" err="1"/>
-              <a:t>GetResult</a:t>
-            </a:r>
-            <a:r>
-              <a:rPr lang="en-GB" sz="2200" b="1" dirty="0"/>
-              <a:t>() </a:t>
-            </a:r>
-            <a:r>
-              <a:rPr lang="en-GB" sz="2200" dirty="0"/>
-              <a:t>will propagate its exception. At this point, you need to handle it with a try/catch block. </a:t>
-            </a:r>
-          </a:p>
-          <a:p>
-            <a:pPr marL="342900" indent="-342900">
-              <a:buFont typeface="Arial" panose="020B0604020202020204" pitchFamily="34" charset="0"/>
-              <a:buChar char="•"/>
-            </a:pPr>
-            <a:endParaRPr lang="en-GB" sz="2200" dirty="0"/>
-          </a:p>
-          <a:p>
-            <a:pPr marL="342900" indent="-342900">
-              <a:buFont typeface="Arial" panose="020B0604020202020204" pitchFamily="34" charset="0"/>
-              <a:buChar char="•"/>
-            </a:pPr>
-            <a:r>
-              <a:rPr lang="en-GB" sz="2200" dirty="0"/>
-              <a:t>If a task is the parent of attached child tasks, or if you are waiting on multiple tasks, multiple exceptions could be thrown. These are grouped as a single </a:t>
-            </a:r>
-            <a:r>
-              <a:rPr lang="en-GB" sz="2200" b="1" dirty="0" err="1"/>
-              <a:t>AggregateException</a:t>
-            </a:r>
-            <a:r>
-              <a:rPr lang="en-GB" sz="2200" dirty="0"/>
-              <a:t>.</a:t>
-            </a:r>
-          </a:p>
-          <a:p>
-            <a:endParaRPr lang="en-GB" sz="2200" b="1" dirty="0"/>
-          </a:p>
-          <a:p>
-            <a:pPr marL="342900" indent="-342900">
-              <a:buFont typeface="Arial" panose="020B0604020202020204" pitchFamily="34" charset="0"/>
-              <a:buChar char="•"/>
-            </a:pPr>
-            <a:r>
-              <a:rPr lang="en-GB" sz="2200" dirty="0"/>
-              <a:t>Exceptions thrown within a task are always accessible from the </a:t>
-            </a:r>
-            <a:r>
-              <a:rPr lang="en-GB" sz="2200" b="1" dirty="0"/>
-              <a:t>Exception property</a:t>
-            </a:r>
-            <a:r>
-              <a:rPr lang="en-GB" sz="2200" dirty="0"/>
-              <a:t>. This is of type </a:t>
-            </a:r>
-            <a:r>
-              <a:rPr lang="en-GB" sz="2200" b="1" dirty="0" err="1"/>
-              <a:t>AggregateException</a:t>
-            </a:r>
-            <a:r>
-              <a:rPr lang="en-GB" sz="2200" dirty="0"/>
-              <a:t>. </a:t>
-            </a:r>
-          </a:p>
-          <a:p>
-            <a:endParaRPr lang="en-GB" sz="2200" b="1" dirty="0"/>
-          </a:p>
-          <a:p>
-            <a:pPr marL="342900" indent="-342900">
-              <a:buFont typeface="Arial" panose="020B0604020202020204" pitchFamily="34" charset="0"/>
-              <a:buChar char="•"/>
-            </a:pPr>
-            <a:r>
-              <a:rPr lang="en-GB" sz="2200" b="1" dirty="0"/>
-              <a:t>Using await or </a:t>
-            </a:r>
-            <a:r>
-              <a:rPr lang="en-GB" sz="2200" b="1" dirty="0" err="1"/>
-              <a:t>GetAwaiter</a:t>
-            </a:r>
-            <a:r>
-              <a:rPr lang="en-GB" sz="2200" b="1" dirty="0"/>
-              <a:t>().</a:t>
-            </a:r>
-            <a:r>
-              <a:rPr lang="en-GB" sz="2200" b="1" dirty="0" err="1"/>
-              <a:t>GetResult</a:t>
-            </a:r>
-            <a:r>
-              <a:rPr lang="en-GB" sz="2200" b="1" dirty="0"/>
-              <a:t>() will not throw an </a:t>
-            </a:r>
-            <a:r>
-              <a:rPr lang="en-GB" sz="2200" b="1" dirty="0" err="1"/>
-              <a:t>AggregateException</a:t>
-            </a:r>
-            <a:r>
-              <a:rPr lang="en-GB" sz="2200" dirty="0"/>
-              <a:t>. It will instead propagate the first exception which was thrown, just like when writing synchronous code. This is another key benefit to using async/await. You don’t have to worry about </a:t>
-            </a:r>
-            <a:r>
-              <a:rPr lang="en-GB" sz="2200" dirty="0" err="1"/>
-              <a:t>AggregateExceptions</a:t>
-            </a:r>
-            <a:r>
-              <a:rPr lang="en-GB" sz="2200" dirty="0"/>
-              <a:t>!</a:t>
-            </a:r>
-          </a:p>
-          <a:p>
-            <a:pPr marL="342900" indent="-342900">
-              <a:buFont typeface="Arial" panose="020B0604020202020204" pitchFamily="34" charset="0"/>
-              <a:buChar char="•"/>
-            </a:pPr>
-            <a:endParaRPr lang="en-GB" sz="2200" dirty="0"/>
-          </a:p>
-          <a:p>
-            <a:pPr marL="342900" indent="-342900">
-              <a:buFont typeface="Arial" panose="020B0604020202020204" pitchFamily="34" charset="0"/>
-              <a:buChar char="•"/>
-            </a:pPr>
-            <a:r>
-              <a:rPr lang="en-GB" sz="2200" dirty="0"/>
-              <a:t>If you don’t observe the completion of a task which has thrown an exception, the garbage collector will trigger the </a:t>
+              <a:t>the garbage collector will trigger the </a:t>
             </a:r>
             <a:r>
               <a:rPr lang="en-GB" sz="2200" b="1" dirty="0" err="1"/>
@@ -4726,7 +4681,7 @@
     </p:spTree>
     <p:extLst>
       <p:ext uri="{BB962C8B-B14F-4D97-AF65-F5344CB8AC3E}">
-        <p14:creationId xmlns:p14="http://schemas.microsoft.com/office/powerpoint/2010/main" val="25185311"/>
+        <p14:creationId xmlns:p14="http://schemas.microsoft.com/office/powerpoint/2010/main" val="4140557931"/>
       </p:ext>
     </p:extLst>
   </p:cSld>
@@ -5167,13 +5122,8 @@
             </a:pPr>
             <a:r>
               <a:rPr lang="en-GB" sz="2000" dirty="0"/>
-              <a:t>Mixing CPU-bound and I/O-bound code in </a:t>
-            </a:r>
-            <a:r>
-              <a:rPr lang="en-GB" sz="2000"/>
-              <a:t>the same method</a:t>
-            </a:r>
-            <a:endParaRPr lang="en-GB" sz="2000" dirty="0"/>
+              <a:t>Mixing CPU-bound and I/O-bound code in the same method</a:t>
+            </a:r>
           </a:p>
           <a:p>
             <a:endParaRPr lang="en-GB" sz="2000" dirty="0"/>
@@ -5185,7 +5135,7 @@
             </a:pPr>
             <a:r>
               <a:rPr lang="en-GB" sz="2000" dirty="0"/>
-              <a:t>Dealing with exceptions thrown when running tasks</a:t>
+              <a:t>Dealing with exceptions</a:t>
             </a:r>
           </a:p>
           <a:p>

</xml_diff>

<commit_message>
Updated slides on handling exceptions
</commit_message>
<xml_diff>
--- a/Async and await presentation.pptx
+++ b/Async and await presentation.pptx
@@ -4632,7 +4632,7 @@
           <a:p>
             <a:r>
               <a:rPr lang="en-GB" sz="2200" b="1" dirty="0"/>
-              <a:t>async void</a:t>
+              <a:t>The dangers of async void</a:t>
             </a:r>
           </a:p>
           <a:p>
@@ -5152,14 +5152,10 @@
             </a:pPr>
             <a:r>
               <a:rPr lang="en-GB" sz="2000" dirty="0"/>
-              <a:t>Cancelling tasks</a:t>
-            </a:r>
-          </a:p>
-          <a:p>
-            <a:pPr marL="457200" indent="-457200">
-              <a:buFont typeface="Arial" panose="020B0604020202020204" pitchFamily="34" charset="0"/>
-              <a:buChar char="•"/>
-            </a:pPr>
+              <a:t>The dangers of async void</a:t>
+            </a:r>
+          </a:p>
+          <a:p>
             <a:endParaRPr lang="en-GB" sz="2000" dirty="0"/>
           </a:p>
           <a:p>

</xml_diff>

<commit_message>
Updated slides and code examples for synchronous operations
</commit_message>
<xml_diff>
--- a/Async and await presentation.pptx
+++ b/Async and await presentation.pptx
@@ -329,7 +329,7 @@
           <a:p>
             <a:fld id="{BFEF692B-FC3E-4552-B87F-4B5A00EB12B2}" type="datetimeFigureOut">
               <a:rPr lang="en-GB" smtClean="0"/>
-              <a:t>08/03/2020</a:t>
+              <a:t>09/03/2020</a:t>
             </a:fld>
             <a:endParaRPr lang="en-GB"/>
           </a:p>
@@ -529,7 +529,7 @@
           <a:p>
             <a:fld id="{BFEF692B-FC3E-4552-B87F-4B5A00EB12B2}" type="datetimeFigureOut">
               <a:rPr lang="en-GB" smtClean="0"/>
-              <a:t>08/03/2020</a:t>
+              <a:t>09/03/2020</a:t>
             </a:fld>
             <a:endParaRPr lang="en-GB"/>
           </a:p>
@@ -739,7 +739,7 @@
           <a:p>
             <a:fld id="{BFEF692B-FC3E-4552-B87F-4B5A00EB12B2}" type="datetimeFigureOut">
               <a:rPr lang="en-GB" smtClean="0"/>
-              <a:t>08/03/2020</a:t>
+              <a:t>09/03/2020</a:t>
             </a:fld>
             <a:endParaRPr lang="en-GB"/>
           </a:p>
@@ -939,7 +939,7 @@
           <a:p>
             <a:fld id="{BFEF692B-FC3E-4552-B87F-4B5A00EB12B2}" type="datetimeFigureOut">
               <a:rPr lang="en-GB" smtClean="0"/>
-              <a:t>08/03/2020</a:t>
+              <a:t>09/03/2020</a:t>
             </a:fld>
             <a:endParaRPr lang="en-GB"/>
           </a:p>
@@ -1215,7 +1215,7 @@
           <a:p>
             <a:fld id="{BFEF692B-FC3E-4552-B87F-4B5A00EB12B2}" type="datetimeFigureOut">
               <a:rPr lang="en-GB" smtClean="0"/>
-              <a:t>08/03/2020</a:t>
+              <a:t>09/03/2020</a:t>
             </a:fld>
             <a:endParaRPr lang="en-GB"/>
           </a:p>
@@ -1483,7 +1483,7 @@
           <a:p>
             <a:fld id="{BFEF692B-FC3E-4552-B87F-4B5A00EB12B2}" type="datetimeFigureOut">
               <a:rPr lang="en-GB" smtClean="0"/>
-              <a:t>08/03/2020</a:t>
+              <a:t>09/03/2020</a:t>
             </a:fld>
             <a:endParaRPr lang="en-GB"/>
           </a:p>
@@ -1898,7 +1898,7 @@
           <a:p>
             <a:fld id="{BFEF692B-FC3E-4552-B87F-4B5A00EB12B2}" type="datetimeFigureOut">
               <a:rPr lang="en-GB" smtClean="0"/>
-              <a:t>08/03/2020</a:t>
+              <a:t>09/03/2020</a:t>
             </a:fld>
             <a:endParaRPr lang="en-GB"/>
           </a:p>
@@ -2040,7 +2040,7 @@
           <a:p>
             <a:fld id="{BFEF692B-FC3E-4552-B87F-4B5A00EB12B2}" type="datetimeFigureOut">
               <a:rPr lang="en-GB" smtClean="0"/>
-              <a:t>08/03/2020</a:t>
+              <a:t>09/03/2020</a:t>
             </a:fld>
             <a:endParaRPr lang="en-GB"/>
           </a:p>
@@ -2153,7 +2153,7 @@
           <a:p>
             <a:fld id="{BFEF692B-FC3E-4552-B87F-4B5A00EB12B2}" type="datetimeFigureOut">
               <a:rPr lang="en-GB" smtClean="0"/>
-              <a:t>08/03/2020</a:t>
+              <a:t>09/03/2020</a:t>
             </a:fld>
             <a:endParaRPr lang="en-GB"/>
           </a:p>
@@ -2466,7 +2466,7 @@
           <a:p>
             <a:fld id="{BFEF692B-FC3E-4552-B87F-4B5A00EB12B2}" type="datetimeFigureOut">
               <a:rPr lang="en-GB" smtClean="0"/>
-              <a:t>08/03/2020</a:t>
+              <a:t>09/03/2020</a:t>
             </a:fld>
             <a:endParaRPr lang="en-GB"/>
           </a:p>
@@ -2755,7 +2755,7 @@
           <a:p>
             <a:fld id="{BFEF692B-FC3E-4552-B87F-4B5A00EB12B2}" type="datetimeFigureOut">
               <a:rPr lang="en-GB" smtClean="0"/>
-              <a:t>08/03/2020</a:t>
+              <a:t>09/03/2020</a:t>
             </a:fld>
             <a:endParaRPr lang="en-GB"/>
           </a:p>
@@ -2998,7 +2998,7 @@
           <a:p>
             <a:fld id="{BFEF692B-FC3E-4552-B87F-4B5A00EB12B2}" type="datetimeFigureOut">
               <a:rPr lang="en-GB" smtClean="0"/>
-              <a:t>08/03/2020</a:t>
+              <a:t>09/03/2020</a:t>
             </a:fld>
             <a:endParaRPr lang="en-GB"/>
           </a:p>
@@ -4146,7 +4146,7 @@
             </a:pPr>
             <a:r>
               <a:rPr lang="en-GB" sz="2400" dirty="0"/>
-              <a:t>CPU-bound code is run until the I/O-bound code is reached. </a:t>
+              <a:t>CPU-bound code is run by the current thread until the I/O-bound code is reached. </a:t>
             </a:r>
           </a:p>
           <a:p>
@@ -4163,7 +4163,7 @@
             </a:pPr>
             <a:r>
               <a:rPr lang="en-GB" sz="2400" dirty="0"/>
-              <a:t>I/O operation is started and the code continues until the point it’s told to wait for the I/O operation to complete. </a:t>
+              <a:t>I/O operation is started and the thread continues running the method until the point it’s told it needs a result from the completed I/O operation. </a:t>
             </a:r>
           </a:p>
           <a:p>
@@ -4180,24 +4180,28 @@
             </a:pPr>
             <a:r>
               <a:rPr lang="en-GB" sz="2400" dirty="0"/>
-              <a:t>The method returns an incomplete task instance, signalling to the calling method that it has to wait for it to be completed before the result can be retrieved from it. </a:t>
-            </a:r>
+              <a:t>The method returns an task instance with </a:t>
+            </a:r>
+            <a:r>
+              <a:rPr lang="en-GB" sz="2400" dirty="0" err="1"/>
+              <a:t>IsCompleted</a:t>
+            </a:r>
+            <a:r>
+              <a:rPr lang="en-GB" sz="2400" dirty="0"/>
+              <a:t> set to false, signalling to the calling method that it has to wait for it to be completed before the result can be retrieved from it. </a:t>
+            </a:r>
+          </a:p>
+          <a:p>
+            <a:endParaRPr lang="en-GB" sz="2400" dirty="0"/>
           </a:p>
           <a:p>
             <a:pPr marL="342900" indent="-342900">
               <a:buFont typeface="Arial" panose="020B0604020202020204" pitchFamily="34" charset="0"/>
               <a:buChar char="•"/>
             </a:pPr>
-            <a:endParaRPr lang="en-GB" sz="2400" dirty="0"/>
-          </a:p>
-          <a:p>
-            <a:pPr marL="342900" indent="-342900">
-              <a:buFont typeface="Arial" panose="020B0604020202020204" pitchFamily="34" charset="0"/>
-              <a:buChar char="•"/>
-            </a:pPr>
             <a:r>
               <a:rPr lang="en-GB" sz="2400" dirty="0"/>
-              <a:t>The calling method then continues until the point that it’s told it has to wait for the task to be complete. </a:t>
+              <a:t>Execution then continues on the calling method until the point that the thread is told it has to wait for the task to be complete. </a:t>
             </a:r>
           </a:p>
           <a:p>

</xml_diff>